<commit_message>
Inserts 1 ao 149
</commit_message>
<xml_diff>
--- a/Documentação/Status_Report/Mod_Status_Report-PI20202.pptx
+++ b/Documentação/Status_Report/Mod_Status_Report-PI20202.pptx
@@ -7,10 +7,10 @@
     <p:sldMasterId id="2147483665" r:id="rId6"/>
   </p:sldMasterIdLst>
   <p:notesMasterIdLst>
-    <p:notesMasterId r:id="rId12"/>
+    <p:notesMasterId r:id="rId13"/>
   </p:notesMasterIdLst>
   <p:handoutMasterIdLst>
-    <p:handoutMasterId r:id="rId13"/>
+    <p:handoutMasterId r:id="rId14"/>
   </p:handoutMasterIdLst>
   <p:sldIdLst>
     <p:sldId id="256" r:id="rId7"/>
@@ -18,6 +18,7 @@
     <p:sldId id="471" r:id="rId9"/>
     <p:sldId id="472" r:id="rId10"/>
     <p:sldId id="473" r:id="rId11"/>
+    <p:sldId id="474" r:id="rId12"/>
   </p:sldIdLst>
   <p:sldSz cx="13442950" cy="7561263"/>
   <p:notesSz cx="7104063" cy="10234613"/>
@@ -130,6 +131,7 @@
             <p14:sldId id="471"/>
             <p14:sldId id="472"/>
             <p14:sldId id="473"/>
+            <p14:sldId id="474"/>
           </p14:sldIdLst>
         </p14:section>
       </p14:sectionLst>
@@ -1212,7 +1214,7 @@
             <a:fld id="{C3CD65D1-5C11-455D-9F9A-0E035F00A0DA}" type="datetimeFigureOut">
               <a:rPr lang="pt-BR" smtClean="0"/>
               <a:pPr/>
-              <a:t>18/03/2021</a:t>
+              <a:t>25/03/2021</a:t>
             </a:fld>
             <a:endParaRPr lang="pt-BR"/>
           </a:p>
@@ -1380,7 +1382,7 @@
             <a:fld id="{A05DA3EF-18EA-43DE-B1BB-402A3C558822}" type="datetimeFigureOut">
               <a:rPr lang="pt-BR" smtClean="0"/>
               <a:pPr/>
-              <a:t>18/03/2021</a:t>
+              <a:t>25/03/2021</a:t>
             </a:fld>
             <a:endParaRPr lang="pt-BR"/>
           </a:p>
@@ -2006,6 +2008,99 @@
     <p:extLst>
       <p:ext uri="{BB962C8B-B14F-4D97-AF65-F5344CB8AC3E}">
         <p14:creationId xmlns:p14="http://schemas.microsoft.com/office/powerpoint/2010/main" val="1318687605"/>
+      </p:ext>
+    </p:extLst>
+  </p:cSld>
+  <p:clrMapOvr>
+    <a:masterClrMapping/>
+  </p:clrMapOvr>
+</p:notes>
+</file>
+
+<file path=ppt/notesSlides/notesSlide5.xml><?xml version="1.0" encoding="utf-8"?>
+<p:notes xmlns:a="http://schemas.openxmlformats.org/drawingml/2006/main" xmlns:r="http://schemas.openxmlformats.org/officeDocument/2006/relationships" xmlns:p="http://schemas.openxmlformats.org/presentationml/2006/main">
+  <p:cSld>
+    <p:spTree>
+      <p:nvGrpSpPr>
+        <p:cNvPr id="1" name=""/>
+        <p:cNvGrpSpPr/>
+        <p:nvPr/>
+      </p:nvGrpSpPr>
+      <p:grpSpPr>
+        <a:xfrm>
+          <a:off x="0" y="0"/>
+          <a:ext cx="0" cy="0"/>
+          <a:chOff x="0" y="0"/>
+          <a:chExt cx="0" cy="0"/>
+        </a:xfrm>
+      </p:grpSpPr>
+      <p:sp>
+        <p:nvSpPr>
+          <p:cNvPr id="2" name="Slide Image Placeholder 1"/>
+          <p:cNvSpPr>
+            <a:spLocks noGrp="1" noRot="1" noChangeAspect="1"/>
+          </p:cNvSpPr>
+          <p:nvPr>
+            <p:ph type="sldImg"/>
+          </p:nvPr>
+        </p:nvSpPr>
+        <p:spPr/>
+      </p:sp>
+      <p:sp>
+        <p:nvSpPr>
+          <p:cNvPr id="3" name="Notes Placeholder 2"/>
+          <p:cNvSpPr>
+            <a:spLocks noGrp="1"/>
+          </p:cNvSpPr>
+          <p:nvPr>
+            <p:ph type="body" idx="1"/>
+          </p:nvPr>
+        </p:nvSpPr>
+        <p:spPr/>
+        <p:txBody>
+          <a:bodyPr/>
+          <a:lstStyle/>
+          <a:p>
+            <a:endParaRPr lang="en-US"/>
+          </a:p>
+        </p:txBody>
+      </p:sp>
+      <p:sp>
+        <p:nvSpPr>
+          <p:cNvPr id="4" name="Slide Number Placeholder 3"/>
+          <p:cNvSpPr>
+            <a:spLocks noGrp="1"/>
+          </p:cNvSpPr>
+          <p:nvPr>
+            <p:ph type="sldNum" sz="quarter" idx="10"/>
+          </p:nvPr>
+        </p:nvSpPr>
+        <p:spPr/>
+        <p:txBody>
+          <a:bodyPr/>
+          <a:lstStyle/>
+          <a:p>
+            <a:fld id="{B39AF3DB-B6A1-2444-9DD8-53D016F8E638}" type="slidenum">
+              <a:rPr lang="pt-BR" smtClean="0">
+                <a:solidFill>
+                  <a:prstClr val="black"/>
+                </a:solidFill>
+              </a:rPr>
+              <a:pPr/>
+              <a:t>6</a:t>
+            </a:fld>
+            <a:endParaRPr lang="pt-BR">
+              <a:solidFill>
+                <a:prstClr val="black"/>
+              </a:solidFill>
+            </a:endParaRPr>
+          </a:p>
+        </p:txBody>
+      </p:sp>
+    </p:spTree>
+    <p:extLst>
+      <p:ext uri="{BB962C8B-B14F-4D97-AF65-F5344CB8AC3E}">
+        <p14:creationId xmlns:p14="http://schemas.microsoft.com/office/powerpoint/2010/main" val="3058809985"/>
       </p:ext>
     </p:extLst>
   </p:cSld>
@@ -27900,7 +27995,7 @@
                 <a:latin typeface="Simplon Oi Headline"/>
                 <a:cs typeface="Simplon Oi Headline"/>
               </a:rPr>
-              <a:t>SEMANA 3- 11/02/2021</a:t>
+              <a:t>SEMANA 3- 04/03/2021 – 11/03/2021</a:t>
             </a:r>
           </a:p>
         </p:txBody>
@@ -29530,6 +29625,1738 @@
     <p:extLst>
       <p:ext uri="{BB962C8B-B14F-4D97-AF65-F5344CB8AC3E}">
         <p14:creationId xmlns:p14="http://schemas.microsoft.com/office/powerpoint/2010/main" val="568166261"/>
+      </p:ext>
+    </p:extLst>
+  </p:cSld>
+  <p:clrMapOvr>
+    <a:masterClrMapping/>
+  </p:clrMapOvr>
+</p:sld>
+</file>
+
+<file path=ppt/slides/slide6.xml><?xml version="1.0" encoding="utf-8"?>
+<p:sld xmlns:a="http://schemas.openxmlformats.org/drawingml/2006/main" xmlns:r="http://schemas.openxmlformats.org/officeDocument/2006/relationships" xmlns:p="http://schemas.openxmlformats.org/presentationml/2006/main">
+  <p:cSld>
+    <p:spTree>
+      <p:nvGrpSpPr>
+        <p:cNvPr id="1" name=""/>
+        <p:cNvGrpSpPr/>
+        <p:nvPr/>
+      </p:nvGrpSpPr>
+      <p:grpSpPr>
+        <a:xfrm>
+          <a:off x="0" y="0"/>
+          <a:ext cx="0" cy="0"/>
+          <a:chOff x="0" y="0"/>
+          <a:chExt cx="0" cy="0"/>
+        </a:xfrm>
+      </p:grpSpPr>
+      <p:sp>
+        <p:nvSpPr>
+          <p:cNvPr id="43" name="Rectangle 42"/>
+          <p:cNvSpPr/>
+          <p:nvPr/>
+        </p:nvSpPr>
+        <p:spPr>
+          <a:xfrm>
+            <a:off x="7810905" y="1369526"/>
+            <a:ext cx="5351116" cy="2095826"/>
+          </a:xfrm>
+          <a:prstGeom prst="rect">
+            <a:avLst/>
+          </a:prstGeom>
+          <a:noFill/>
+          <a:ln w="12700">
+            <a:solidFill>
+              <a:schemeClr val="bg1">
+                <a:lumMod val="50000"/>
+              </a:schemeClr>
+            </a:solidFill>
+          </a:ln>
+        </p:spPr>
+        <p:style>
+          <a:lnRef idx="2">
+            <a:schemeClr val="accent4"/>
+          </a:lnRef>
+          <a:fillRef idx="1">
+            <a:schemeClr val="lt1"/>
+          </a:fillRef>
+          <a:effectRef idx="0">
+            <a:schemeClr val="accent4"/>
+          </a:effectRef>
+          <a:fontRef idx="minor">
+            <a:schemeClr val="dk1"/>
+          </a:fontRef>
+        </p:style>
+        <p:txBody>
+          <a:bodyPr tIns="105844" rtlCol="0" anchor="t"/>
+          <a:lstStyle/>
+          <a:p>
+            <a:pPr defTabSz="672130">
+              <a:spcAft>
+                <a:spcPts val="882"/>
+              </a:spcAft>
+            </a:pPr>
+            <a:endParaRPr lang="pt-BR" sz="1470" dirty="0">
+              <a:solidFill>
+                <a:schemeClr val="tx1"/>
+              </a:solidFill>
+              <a:latin typeface="Calibri" panose="020F0502020204030204" pitchFamily="34" charset="0"/>
+              <a:cs typeface="Simplon BP Regular"/>
+            </a:endParaRPr>
+          </a:p>
+        </p:txBody>
+      </p:sp>
+      <p:sp>
+        <p:nvSpPr>
+          <p:cNvPr id="3" name="Title 2"/>
+          <p:cNvSpPr>
+            <a:spLocks noGrp="1"/>
+          </p:cNvSpPr>
+          <p:nvPr>
+            <p:ph type="title"/>
+          </p:nvPr>
+        </p:nvSpPr>
+        <p:spPr>
+          <a:xfrm>
+            <a:off x="469692" y="185232"/>
+            <a:ext cx="12098020" cy="800352"/>
+          </a:xfrm>
+        </p:spPr>
+        <p:txBody>
+          <a:bodyPr vert="horz" wrap="square" lIns="105844" tIns="0" rIns="105844" bIns="0" numCol="1" anchor="t" anchorCtr="0" compatLnSpc="1">
+            <a:prstTxWarp prst="textNoShape">
+              <a:avLst/>
+            </a:prstTxWarp>
+            <a:noAutofit/>
+          </a:bodyPr>
+          <a:lstStyle/>
+          <a:p>
+            <a:pPr algn="l">
+              <a:spcAft>
+                <a:spcPts val="882"/>
+              </a:spcAft>
+            </a:pPr>
+            <a:r>
+              <a:rPr lang="en-US" sz="2646" dirty="0">
+                <a:solidFill>
+                  <a:prstClr val="black"/>
+                </a:solidFill>
+                <a:latin typeface="Simplon Oi Headline"/>
+                <a:cs typeface="Simplon Oi Headline"/>
+              </a:rPr>
+              <a:t>SEMANA 4 – 18/03/2021</a:t>
+            </a:r>
+          </a:p>
+        </p:txBody>
+      </p:sp>
+      <p:sp>
+        <p:nvSpPr>
+          <p:cNvPr id="78" name="TextBox 118"/>
+          <p:cNvSpPr txBox="1"/>
+          <p:nvPr/>
+        </p:nvSpPr>
+        <p:spPr>
+          <a:xfrm>
+            <a:off x="11822773" y="576471"/>
+            <a:ext cx="899678" cy="179824"/>
+          </a:xfrm>
+          <a:prstGeom prst="rect">
+            <a:avLst/>
+          </a:prstGeom>
+          <a:noFill/>
+          <a:ln w="12700">
+            <a:noFill/>
+          </a:ln>
+        </p:spPr>
+        <p:style>
+          <a:lnRef idx="2">
+            <a:schemeClr val="accent4"/>
+          </a:lnRef>
+          <a:fillRef idx="1">
+            <a:schemeClr val="lt1"/>
+          </a:fillRef>
+          <a:effectRef idx="0">
+            <a:schemeClr val="accent4"/>
+          </a:effectRef>
+          <a:fontRef idx="minor">
+            <a:schemeClr val="dk1"/>
+          </a:fontRef>
+        </p:style>
+        <p:txBody>
+          <a:bodyPr wrap="none" lIns="52922" tIns="52922" rIns="52922" bIns="0" rtlCol="0" anchor="b"/>
+          <a:lstStyle>
+            <a:defPPr>
+              <a:defRPr lang="en-US"/>
+            </a:defPPr>
+            <a:lvl1pPr algn="ctr">
+              <a:defRPr sz="1000" b="1">
+                <a:latin typeface="Simplon BP Regular"/>
+                <a:cs typeface="Simplon BP Regular"/>
+              </a:defRPr>
+            </a:lvl1pPr>
+            <a:lvl2pPr>
+              <a:defRPr>
+                <a:solidFill>
+                  <a:schemeClr val="dk1"/>
+                </a:solidFill>
+              </a:defRPr>
+            </a:lvl2pPr>
+            <a:lvl3pPr>
+              <a:defRPr>
+                <a:solidFill>
+                  <a:schemeClr val="dk1"/>
+                </a:solidFill>
+              </a:defRPr>
+            </a:lvl3pPr>
+            <a:lvl4pPr>
+              <a:defRPr>
+                <a:solidFill>
+                  <a:schemeClr val="dk1"/>
+                </a:solidFill>
+              </a:defRPr>
+            </a:lvl4pPr>
+            <a:lvl5pPr>
+              <a:defRPr>
+                <a:solidFill>
+                  <a:schemeClr val="dk1"/>
+                </a:solidFill>
+              </a:defRPr>
+            </a:lvl5pPr>
+            <a:lvl6pPr>
+              <a:defRPr>
+                <a:solidFill>
+                  <a:schemeClr val="dk1"/>
+                </a:solidFill>
+              </a:defRPr>
+            </a:lvl6pPr>
+            <a:lvl7pPr>
+              <a:defRPr>
+                <a:solidFill>
+                  <a:schemeClr val="dk1"/>
+                </a:solidFill>
+              </a:defRPr>
+            </a:lvl7pPr>
+            <a:lvl8pPr>
+              <a:defRPr>
+                <a:solidFill>
+                  <a:schemeClr val="dk1"/>
+                </a:solidFill>
+              </a:defRPr>
+            </a:lvl8pPr>
+            <a:lvl9pPr>
+              <a:defRPr>
+                <a:solidFill>
+                  <a:schemeClr val="dk1"/>
+                </a:solidFill>
+              </a:defRPr>
+            </a:lvl9pPr>
+          </a:lstStyle>
+          <a:p>
+            <a:pPr defTabSz="672130"/>
+            <a:r>
+              <a:rPr lang="pt-BR" sz="1176" b="0" dirty="0">
+                <a:solidFill>
+                  <a:prstClr val="black"/>
+                </a:solidFill>
+                <a:latin typeface="Simplon BP Bold" pitchFamily="2" charset="0"/>
+              </a:rPr>
+              <a:t>Negócios</a:t>
+            </a:r>
+          </a:p>
+        </p:txBody>
+      </p:sp>
+      <p:sp>
+        <p:nvSpPr>
+          <p:cNvPr id="80" name="TextBox 123"/>
+          <p:cNvSpPr txBox="1"/>
+          <p:nvPr/>
+        </p:nvSpPr>
+        <p:spPr>
+          <a:xfrm>
+            <a:off x="10902774" y="589543"/>
+            <a:ext cx="899678" cy="179824"/>
+          </a:xfrm>
+          <a:prstGeom prst="rect">
+            <a:avLst/>
+          </a:prstGeom>
+          <a:noFill/>
+          <a:ln w="12700">
+            <a:noFill/>
+          </a:ln>
+        </p:spPr>
+        <p:style>
+          <a:lnRef idx="2">
+            <a:schemeClr val="accent4"/>
+          </a:lnRef>
+          <a:fillRef idx="1">
+            <a:schemeClr val="lt1"/>
+          </a:fillRef>
+          <a:effectRef idx="0">
+            <a:schemeClr val="accent4"/>
+          </a:effectRef>
+          <a:fontRef idx="minor">
+            <a:schemeClr val="dk1"/>
+          </a:fontRef>
+        </p:style>
+        <p:txBody>
+          <a:bodyPr wrap="none" lIns="52922" tIns="52922" rIns="52922" bIns="0" rtlCol="0" anchor="b"/>
+          <a:lstStyle>
+            <a:defPPr>
+              <a:defRPr lang="en-US"/>
+            </a:defPPr>
+            <a:lvl1pPr algn="ctr">
+              <a:defRPr sz="1000" b="1">
+                <a:latin typeface="Simplon BP Regular"/>
+                <a:cs typeface="Simplon BP Regular"/>
+              </a:defRPr>
+            </a:lvl1pPr>
+            <a:lvl2pPr>
+              <a:defRPr>
+                <a:solidFill>
+                  <a:schemeClr val="dk1"/>
+                </a:solidFill>
+              </a:defRPr>
+            </a:lvl2pPr>
+            <a:lvl3pPr>
+              <a:defRPr>
+                <a:solidFill>
+                  <a:schemeClr val="dk1"/>
+                </a:solidFill>
+              </a:defRPr>
+            </a:lvl3pPr>
+            <a:lvl4pPr>
+              <a:defRPr>
+                <a:solidFill>
+                  <a:schemeClr val="dk1"/>
+                </a:solidFill>
+              </a:defRPr>
+            </a:lvl4pPr>
+            <a:lvl5pPr>
+              <a:defRPr>
+                <a:solidFill>
+                  <a:schemeClr val="dk1"/>
+                </a:solidFill>
+              </a:defRPr>
+            </a:lvl5pPr>
+            <a:lvl6pPr>
+              <a:defRPr>
+                <a:solidFill>
+                  <a:schemeClr val="dk1"/>
+                </a:solidFill>
+              </a:defRPr>
+            </a:lvl6pPr>
+            <a:lvl7pPr>
+              <a:defRPr>
+                <a:solidFill>
+                  <a:schemeClr val="dk1"/>
+                </a:solidFill>
+              </a:defRPr>
+            </a:lvl7pPr>
+            <a:lvl8pPr>
+              <a:defRPr>
+                <a:solidFill>
+                  <a:schemeClr val="dk1"/>
+                </a:solidFill>
+              </a:defRPr>
+            </a:lvl8pPr>
+            <a:lvl9pPr>
+              <a:defRPr>
+                <a:solidFill>
+                  <a:schemeClr val="dk1"/>
+                </a:solidFill>
+              </a:defRPr>
+            </a:lvl9pPr>
+          </a:lstStyle>
+          <a:p>
+            <a:pPr defTabSz="672130"/>
+            <a:r>
+              <a:rPr lang="pt-BR" sz="1176" b="0" dirty="0">
+                <a:solidFill>
+                  <a:prstClr val="black"/>
+                </a:solidFill>
+                <a:latin typeface="Simplon BP Bold" pitchFamily="2" charset="0"/>
+              </a:rPr>
+              <a:t>Plataforma</a:t>
+            </a:r>
+          </a:p>
+        </p:txBody>
+      </p:sp>
+      <p:sp>
+        <p:nvSpPr>
+          <p:cNvPr id="82" name="TextBox 128"/>
+          <p:cNvSpPr txBox="1"/>
+          <p:nvPr/>
+        </p:nvSpPr>
+        <p:spPr>
+          <a:xfrm>
+            <a:off x="9844897" y="576471"/>
+            <a:ext cx="899678" cy="179824"/>
+          </a:xfrm>
+          <a:prstGeom prst="rect">
+            <a:avLst/>
+          </a:prstGeom>
+          <a:noFill/>
+          <a:ln w="12700">
+            <a:noFill/>
+          </a:ln>
+        </p:spPr>
+        <p:style>
+          <a:lnRef idx="2">
+            <a:schemeClr val="accent4"/>
+          </a:lnRef>
+          <a:fillRef idx="1">
+            <a:schemeClr val="lt1"/>
+          </a:fillRef>
+          <a:effectRef idx="0">
+            <a:schemeClr val="accent4"/>
+          </a:effectRef>
+          <a:fontRef idx="minor">
+            <a:schemeClr val="dk1"/>
+          </a:fontRef>
+        </p:style>
+        <p:txBody>
+          <a:bodyPr wrap="none" lIns="52922" tIns="52922" rIns="52922" bIns="0" rtlCol="0" anchor="b"/>
+          <a:lstStyle>
+            <a:defPPr>
+              <a:defRPr lang="en-US"/>
+            </a:defPPr>
+            <a:lvl1pPr algn="ctr">
+              <a:defRPr sz="1000" b="1">
+                <a:latin typeface="Simplon BP Regular"/>
+                <a:cs typeface="Simplon BP Regular"/>
+              </a:defRPr>
+            </a:lvl1pPr>
+            <a:lvl2pPr>
+              <a:defRPr>
+                <a:solidFill>
+                  <a:schemeClr val="dk1"/>
+                </a:solidFill>
+              </a:defRPr>
+            </a:lvl2pPr>
+            <a:lvl3pPr>
+              <a:defRPr>
+                <a:solidFill>
+                  <a:schemeClr val="dk1"/>
+                </a:solidFill>
+              </a:defRPr>
+            </a:lvl3pPr>
+            <a:lvl4pPr>
+              <a:defRPr>
+                <a:solidFill>
+                  <a:schemeClr val="dk1"/>
+                </a:solidFill>
+              </a:defRPr>
+            </a:lvl4pPr>
+            <a:lvl5pPr>
+              <a:defRPr>
+                <a:solidFill>
+                  <a:schemeClr val="dk1"/>
+                </a:solidFill>
+              </a:defRPr>
+            </a:lvl5pPr>
+            <a:lvl6pPr>
+              <a:defRPr>
+                <a:solidFill>
+                  <a:schemeClr val="dk1"/>
+                </a:solidFill>
+              </a:defRPr>
+            </a:lvl6pPr>
+            <a:lvl7pPr>
+              <a:defRPr>
+                <a:solidFill>
+                  <a:schemeClr val="dk1"/>
+                </a:solidFill>
+              </a:defRPr>
+            </a:lvl7pPr>
+            <a:lvl8pPr>
+              <a:defRPr>
+                <a:solidFill>
+                  <a:schemeClr val="dk1"/>
+                </a:solidFill>
+              </a:defRPr>
+            </a:lvl8pPr>
+            <a:lvl9pPr>
+              <a:defRPr>
+                <a:solidFill>
+                  <a:schemeClr val="dk1"/>
+                </a:solidFill>
+              </a:defRPr>
+            </a:lvl9pPr>
+          </a:lstStyle>
+          <a:p>
+            <a:pPr defTabSz="672130"/>
+            <a:r>
+              <a:rPr lang="pt-BR" sz="1176" b="0" dirty="0">
+                <a:solidFill>
+                  <a:prstClr val="black"/>
+                </a:solidFill>
+                <a:latin typeface="Simplon BP Bold" pitchFamily="2" charset="0"/>
+              </a:rPr>
+              <a:t>Back</a:t>
+            </a:r>
+          </a:p>
+        </p:txBody>
+      </p:sp>
+      <p:sp>
+        <p:nvSpPr>
+          <p:cNvPr id="84" name="TextBox 133"/>
+          <p:cNvSpPr txBox="1"/>
+          <p:nvPr/>
+        </p:nvSpPr>
+        <p:spPr>
+          <a:xfrm>
+            <a:off x="8934246" y="576471"/>
+            <a:ext cx="899678" cy="179824"/>
+          </a:xfrm>
+          <a:prstGeom prst="rect">
+            <a:avLst/>
+          </a:prstGeom>
+          <a:noFill/>
+          <a:ln w="12700">
+            <a:noFill/>
+          </a:ln>
+        </p:spPr>
+        <p:style>
+          <a:lnRef idx="2">
+            <a:schemeClr val="accent4"/>
+          </a:lnRef>
+          <a:fillRef idx="1">
+            <a:schemeClr val="lt1"/>
+          </a:fillRef>
+          <a:effectRef idx="0">
+            <a:schemeClr val="accent4"/>
+          </a:effectRef>
+          <a:fontRef idx="minor">
+            <a:schemeClr val="dk1"/>
+          </a:fontRef>
+        </p:style>
+        <p:txBody>
+          <a:bodyPr wrap="none" lIns="52922" tIns="52922" rIns="52922" bIns="0" rtlCol="0" anchor="b"/>
+          <a:lstStyle>
+            <a:defPPr>
+              <a:defRPr lang="en-US"/>
+            </a:defPPr>
+            <a:lvl1pPr algn="ctr">
+              <a:defRPr sz="1000" b="1">
+                <a:latin typeface="Simplon BP Regular"/>
+                <a:cs typeface="Simplon BP Regular"/>
+              </a:defRPr>
+            </a:lvl1pPr>
+            <a:lvl2pPr>
+              <a:defRPr>
+                <a:solidFill>
+                  <a:schemeClr val="dk1"/>
+                </a:solidFill>
+              </a:defRPr>
+            </a:lvl2pPr>
+            <a:lvl3pPr>
+              <a:defRPr>
+                <a:solidFill>
+                  <a:schemeClr val="dk1"/>
+                </a:solidFill>
+              </a:defRPr>
+            </a:lvl3pPr>
+            <a:lvl4pPr>
+              <a:defRPr>
+                <a:solidFill>
+                  <a:schemeClr val="dk1"/>
+                </a:solidFill>
+              </a:defRPr>
+            </a:lvl4pPr>
+            <a:lvl5pPr>
+              <a:defRPr>
+                <a:solidFill>
+                  <a:schemeClr val="dk1"/>
+                </a:solidFill>
+              </a:defRPr>
+            </a:lvl5pPr>
+            <a:lvl6pPr>
+              <a:defRPr>
+                <a:solidFill>
+                  <a:schemeClr val="dk1"/>
+                </a:solidFill>
+              </a:defRPr>
+            </a:lvl6pPr>
+            <a:lvl7pPr>
+              <a:defRPr>
+                <a:solidFill>
+                  <a:schemeClr val="dk1"/>
+                </a:solidFill>
+              </a:defRPr>
+            </a:lvl7pPr>
+            <a:lvl8pPr>
+              <a:defRPr>
+                <a:solidFill>
+                  <a:schemeClr val="dk1"/>
+                </a:solidFill>
+              </a:defRPr>
+            </a:lvl8pPr>
+            <a:lvl9pPr>
+              <a:defRPr>
+                <a:solidFill>
+                  <a:schemeClr val="dk1"/>
+                </a:solidFill>
+              </a:defRPr>
+            </a:lvl9pPr>
+          </a:lstStyle>
+          <a:p>
+            <a:pPr defTabSz="672130"/>
+            <a:r>
+              <a:rPr lang="pt-BR" sz="1176" b="0" dirty="0">
+                <a:solidFill>
+                  <a:prstClr val="black"/>
+                </a:solidFill>
+                <a:latin typeface="Simplon BP Bold" pitchFamily="2" charset="0"/>
+              </a:rPr>
+              <a:t>Front</a:t>
+            </a:r>
+          </a:p>
+        </p:txBody>
+      </p:sp>
+      <p:sp>
+        <p:nvSpPr>
+          <p:cNvPr id="88" name="Oval 134"/>
+          <p:cNvSpPr>
+            <a:spLocks noChangeAspect="1"/>
+          </p:cNvSpPr>
+          <p:nvPr/>
+        </p:nvSpPr>
+        <p:spPr>
+          <a:xfrm>
+            <a:off x="8470074" y="341965"/>
+            <a:ext cx="211404" cy="211689"/>
+          </a:xfrm>
+          <a:prstGeom prst="ellipse">
+            <a:avLst/>
+          </a:prstGeom>
+          <a:solidFill>
+            <a:srgbClr val="1BCF13"/>
+          </a:solidFill>
+          <a:ln w="12700">
+            <a:solidFill>
+              <a:schemeClr val="accent3"/>
+            </a:solidFill>
+          </a:ln>
+        </p:spPr>
+        <p:style>
+          <a:lnRef idx="2">
+            <a:schemeClr val="accent1">
+              <a:shade val="50000"/>
+            </a:schemeClr>
+          </a:lnRef>
+          <a:fillRef idx="1">
+            <a:schemeClr val="accent1"/>
+          </a:fillRef>
+          <a:effectRef idx="0">
+            <a:schemeClr val="accent1"/>
+          </a:effectRef>
+          <a:fontRef idx="minor">
+            <a:schemeClr val="lt1"/>
+          </a:fontRef>
+        </p:style>
+        <p:txBody>
+          <a:bodyPr wrap="none" lIns="52922" tIns="52922" rIns="52922" rtlCol="0" anchor="ctr"/>
+          <a:lstStyle/>
+          <a:p>
+            <a:pPr algn="ctr" defTabSz="672130"/>
+            <a:endParaRPr lang="en-US" sz="1176" dirty="0">
+              <a:solidFill>
+                <a:prstClr val="black"/>
+              </a:solidFill>
+              <a:latin typeface="Simplon BP Regular"/>
+              <a:cs typeface="Simplon BP Regular"/>
+            </a:endParaRPr>
+          </a:p>
+        </p:txBody>
+      </p:sp>
+      <p:sp>
+        <p:nvSpPr>
+          <p:cNvPr id="86" name="TextBox 138"/>
+          <p:cNvSpPr txBox="1"/>
+          <p:nvPr/>
+        </p:nvSpPr>
+        <p:spPr>
+          <a:xfrm>
+            <a:off x="8126053" y="576471"/>
+            <a:ext cx="899678" cy="179824"/>
+          </a:xfrm>
+          <a:prstGeom prst="rect">
+            <a:avLst/>
+          </a:prstGeom>
+          <a:noFill/>
+          <a:ln w="12700">
+            <a:noFill/>
+          </a:ln>
+        </p:spPr>
+        <p:style>
+          <a:lnRef idx="2">
+            <a:schemeClr val="accent4"/>
+          </a:lnRef>
+          <a:fillRef idx="1">
+            <a:schemeClr val="lt1"/>
+          </a:fillRef>
+          <a:effectRef idx="0">
+            <a:schemeClr val="accent4"/>
+          </a:effectRef>
+          <a:fontRef idx="minor">
+            <a:schemeClr val="dk1"/>
+          </a:fontRef>
+        </p:style>
+        <p:txBody>
+          <a:bodyPr wrap="none" lIns="52922" tIns="52922" rIns="52922" bIns="0" rtlCol="0" anchor="b"/>
+          <a:lstStyle>
+            <a:defPPr>
+              <a:defRPr lang="en-US"/>
+            </a:defPPr>
+            <a:lvl1pPr algn="ctr">
+              <a:defRPr sz="1000" b="1">
+                <a:latin typeface="Simplon BP Regular"/>
+                <a:cs typeface="Simplon BP Regular"/>
+              </a:defRPr>
+            </a:lvl1pPr>
+            <a:lvl2pPr>
+              <a:defRPr>
+                <a:solidFill>
+                  <a:schemeClr val="dk1"/>
+                </a:solidFill>
+              </a:defRPr>
+            </a:lvl2pPr>
+            <a:lvl3pPr>
+              <a:defRPr>
+                <a:solidFill>
+                  <a:schemeClr val="dk1"/>
+                </a:solidFill>
+              </a:defRPr>
+            </a:lvl3pPr>
+            <a:lvl4pPr>
+              <a:defRPr>
+                <a:solidFill>
+                  <a:schemeClr val="dk1"/>
+                </a:solidFill>
+              </a:defRPr>
+            </a:lvl4pPr>
+            <a:lvl5pPr>
+              <a:defRPr>
+                <a:solidFill>
+                  <a:schemeClr val="dk1"/>
+                </a:solidFill>
+              </a:defRPr>
+            </a:lvl5pPr>
+            <a:lvl6pPr>
+              <a:defRPr>
+                <a:solidFill>
+                  <a:schemeClr val="dk1"/>
+                </a:solidFill>
+              </a:defRPr>
+            </a:lvl6pPr>
+            <a:lvl7pPr>
+              <a:defRPr>
+                <a:solidFill>
+                  <a:schemeClr val="dk1"/>
+                </a:solidFill>
+              </a:defRPr>
+            </a:lvl7pPr>
+            <a:lvl8pPr>
+              <a:defRPr>
+                <a:solidFill>
+                  <a:schemeClr val="dk1"/>
+                </a:solidFill>
+              </a:defRPr>
+            </a:lvl8pPr>
+            <a:lvl9pPr>
+              <a:defRPr>
+                <a:solidFill>
+                  <a:schemeClr val="dk1"/>
+                </a:solidFill>
+              </a:defRPr>
+            </a:lvl9pPr>
+          </a:lstStyle>
+          <a:p>
+            <a:pPr defTabSz="672130"/>
+            <a:r>
+              <a:rPr lang="en-US" sz="1176" b="0" dirty="0" err="1">
+                <a:solidFill>
+                  <a:prstClr val="black"/>
+                </a:solidFill>
+                <a:latin typeface="Simplon BP Bold" pitchFamily="2" charset="0"/>
+              </a:rPr>
+              <a:t>Equipe</a:t>
+            </a:r>
+            <a:endParaRPr lang="en-US" sz="1176" b="0" dirty="0">
+              <a:solidFill>
+                <a:prstClr val="black"/>
+              </a:solidFill>
+              <a:latin typeface="Simplon BP Bold" pitchFamily="2" charset="0"/>
+            </a:endParaRPr>
+          </a:p>
+        </p:txBody>
+      </p:sp>
+      <p:sp>
+        <p:nvSpPr>
+          <p:cNvPr id="64" name="Retângulo 63"/>
+          <p:cNvSpPr/>
+          <p:nvPr/>
+        </p:nvSpPr>
+        <p:spPr>
+          <a:xfrm>
+            <a:off x="469692" y="559912"/>
+            <a:ext cx="7186474" cy="239087"/>
+          </a:xfrm>
+          <a:prstGeom prst="rect">
+            <a:avLst/>
+          </a:prstGeom>
+          <a:solidFill>
+            <a:schemeClr val="bg1">
+              <a:lumMod val="85000"/>
+            </a:schemeClr>
+          </a:solidFill>
+        </p:spPr>
+        <p:txBody>
+          <a:bodyPr vert="horz" lIns="134422" tIns="67211" rIns="134422" bIns="67211" rtlCol="0" anchor="ctr"/>
+          <a:lstStyle/>
+          <a:p>
+            <a:pPr defTabSz="672130"/>
+            <a:r>
+              <a:rPr lang="en-US" sz="1544" dirty="0">
+                <a:latin typeface="Simplon Oi Headline" charset="0"/>
+                <a:ea typeface="Simplon Oi Headline" charset="0"/>
+                <a:cs typeface="Simplon Oi Headline" charset="0"/>
+              </a:rPr>
+              <a:t>PROGRESSOS</a:t>
+            </a:r>
+            <a:endParaRPr lang="pt-BR" sz="1544" dirty="0">
+              <a:latin typeface="Simplon Oi Headline" charset="0"/>
+              <a:ea typeface="Simplon Oi Headline" charset="0"/>
+              <a:cs typeface="Simplon Oi Headline" charset="0"/>
+            </a:endParaRPr>
+          </a:p>
+        </p:txBody>
+      </p:sp>
+      <p:sp>
+        <p:nvSpPr>
+          <p:cNvPr id="65" name="Retângulo 64"/>
+          <p:cNvSpPr/>
+          <p:nvPr/>
+        </p:nvSpPr>
+        <p:spPr>
+          <a:xfrm>
+            <a:off x="7810906" y="927661"/>
+            <a:ext cx="5351116" cy="449162"/>
+          </a:xfrm>
+          <a:prstGeom prst="rect">
+            <a:avLst/>
+          </a:prstGeom>
+          <a:solidFill>
+            <a:schemeClr val="bg1">
+              <a:lumMod val="85000"/>
+            </a:schemeClr>
+          </a:solidFill>
+        </p:spPr>
+        <p:txBody>
+          <a:bodyPr vert="horz" lIns="134422" tIns="67211" rIns="134422" bIns="67211" rtlCol="0" anchor="ctr"/>
+          <a:lstStyle/>
+          <a:p>
+            <a:pPr defTabSz="672130"/>
+            <a:r>
+              <a:rPr lang="pt-BR" sz="1544" dirty="0">
+                <a:latin typeface="Simplon Oi Headline" charset="0"/>
+                <a:ea typeface="Simplon Oi Headline" charset="0"/>
+                <a:cs typeface="Simplon Oi Headline" charset="0"/>
+              </a:rPr>
+              <a:t>Pontos atenção/ Principais Riscos</a:t>
+            </a:r>
+          </a:p>
+        </p:txBody>
+      </p:sp>
+      <p:sp>
+        <p:nvSpPr>
+          <p:cNvPr id="66" name="Retângulo 65"/>
+          <p:cNvSpPr/>
+          <p:nvPr/>
+        </p:nvSpPr>
+        <p:spPr>
+          <a:xfrm>
+            <a:off x="469692" y="4982921"/>
+            <a:ext cx="11854636" cy="233106"/>
+          </a:xfrm>
+          <a:prstGeom prst="rect">
+            <a:avLst/>
+          </a:prstGeom>
+          <a:solidFill>
+            <a:schemeClr val="bg1">
+              <a:lumMod val="85000"/>
+            </a:schemeClr>
+          </a:solidFill>
+        </p:spPr>
+        <p:txBody>
+          <a:bodyPr vert="horz" lIns="134422" tIns="67211" rIns="134422" bIns="67211" rtlCol="0" anchor="ctr"/>
+          <a:lstStyle/>
+          <a:p>
+            <a:pPr defTabSz="672130"/>
+            <a:r>
+              <a:rPr lang="pt-BR" sz="1544" dirty="0">
+                <a:latin typeface="Simplon Oi Headline" charset="0"/>
+                <a:ea typeface="Simplon Oi Headline" charset="0"/>
+                <a:cs typeface="Simplon Oi Headline" charset="0"/>
+              </a:rPr>
+              <a:t>Próximos Passos/ Decisões a tomar</a:t>
+            </a:r>
+          </a:p>
+        </p:txBody>
+      </p:sp>
+      <p:sp>
+        <p:nvSpPr>
+          <p:cNvPr id="63" name="Rectangle 37"/>
+          <p:cNvSpPr/>
+          <p:nvPr/>
+        </p:nvSpPr>
+        <p:spPr>
+          <a:xfrm>
+            <a:off x="469132" y="818463"/>
+            <a:ext cx="7186474" cy="4078796"/>
+          </a:xfrm>
+          <a:prstGeom prst="rect">
+            <a:avLst/>
+          </a:prstGeom>
+          <a:noFill/>
+          <a:ln w="12700">
+            <a:solidFill>
+              <a:schemeClr val="bg1">
+                <a:lumMod val="50000"/>
+              </a:schemeClr>
+            </a:solidFill>
+          </a:ln>
+        </p:spPr>
+        <p:style>
+          <a:lnRef idx="2">
+            <a:schemeClr val="accent4"/>
+          </a:lnRef>
+          <a:fillRef idx="1">
+            <a:schemeClr val="lt1"/>
+          </a:fillRef>
+          <a:effectRef idx="0">
+            <a:schemeClr val="accent4"/>
+          </a:effectRef>
+          <a:fontRef idx="minor">
+            <a:schemeClr val="dk1"/>
+          </a:fontRef>
+        </p:style>
+        <p:txBody>
+          <a:bodyPr tIns="105844" rtlCol="0" anchor="t"/>
+          <a:lstStyle/>
+          <a:p>
+            <a:pPr marL="252049" indent="-252049" fontAlgn="base">
+              <a:spcBef>
+                <a:spcPct val="0"/>
+              </a:spcBef>
+              <a:buFont typeface="Wingdings" panose="05000000000000000000" pitchFamily="2" charset="2"/>
+              <a:buChar char="ü"/>
+              <a:defRPr/>
+            </a:pPr>
+            <a:r>
+              <a:rPr lang="pt-BR" sz="1600" b="1" dirty="0">
+                <a:solidFill>
+                  <a:schemeClr val="tx1"/>
+                </a:solidFill>
+                <a:latin typeface="Arial" panose="020B0604020202020204" pitchFamily="34" charset="0"/>
+                <a:cs typeface="Arial" panose="020B0604020202020204" pitchFamily="34" charset="0"/>
+              </a:rPr>
+              <a:t>Desenvolvemos a home do site institucional com </a:t>
+            </a:r>
+            <a:r>
+              <a:rPr lang="pt-BR" sz="1600" b="1" dirty="0" err="1">
+                <a:solidFill>
+                  <a:schemeClr val="tx1"/>
+                </a:solidFill>
+                <a:latin typeface="Arial" panose="020B0604020202020204" pitchFamily="34" charset="0"/>
+                <a:cs typeface="Arial" panose="020B0604020202020204" pitchFamily="34" charset="0"/>
+              </a:rPr>
+              <a:t>React</a:t>
+            </a:r>
+            <a:r>
+              <a:rPr lang="pt-BR" sz="1600" b="1" dirty="0">
+                <a:solidFill>
+                  <a:schemeClr val="tx1"/>
+                </a:solidFill>
+                <a:latin typeface="Arial" panose="020B0604020202020204" pitchFamily="34" charset="0"/>
+                <a:cs typeface="Arial" panose="020B0604020202020204" pitchFamily="34" charset="0"/>
+              </a:rPr>
+              <a:t> </a:t>
+            </a:r>
+          </a:p>
+          <a:p>
+            <a:pPr marL="252049" indent="-252049" fontAlgn="base">
+              <a:spcBef>
+                <a:spcPct val="0"/>
+              </a:spcBef>
+              <a:buFont typeface="Wingdings" panose="05000000000000000000" pitchFamily="2" charset="2"/>
+              <a:buChar char="ü"/>
+              <a:defRPr/>
+            </a:pPr>
+            <a:r>
+              <a:rPr lang="pt-BR" sz="1600" b="1" dirty="0">
+                <a:solidFill>
+                  <a:schemeClr val="tx1"/>
+                </a:solidFill>
+                <a:latin typeface="Arial" panose="020B0604020202020204" pitchFamily="34" charset="0"/>
+                <a:cs typeface="Arial" panose="020B0604020202020204" pitchFamily="34" charset="0"/>
+              </a:rPr>
+              <a:t>Decidimos que iremos desenvolver e utilizar a própria API</a:t>
+            </a:r>
+          </a:p>
+          <a:p>
+            <a:pPr marL="252049" indent="-252049" fontAlgn="base">
+              <a:spcBef>
+                <a:spcPct val="0"/>
+              </a:spcBef>
+              <a:buFont typeface="Wingdings" panose="05000000000000000000" pitchFamily="2" charset="2"/>
+              <a:buChar char="ü"/>
+              <a:defRPr/>
+            </a:pPr>
+            <a:r>
+              <a:rPr lang="pt-BR" sz="1600" b="1" dirty="0">
+                <a:solidFill>
+                  <a:schemeClr val="tx1"/>
+                </a:solidFill>
+                <a:latin typeface="Arial" panose="020B0604020202020204" pitchFamily="34" charset="0"/>
+                <a:cs typeface="Arial" panose="020B0604020202020204" pitchFamily="34" charset="0"/>
+              </a:rPr>
+              <a:t>Atualizamos a 3 versão do modelo lógico</a:t>
+            </a:r>
+          </a:p>
+          <a:p>
+            <a:pPr marL="252049" indent="-252049" fontAlgn="base">
+              <a:spcBef>
+                <a:spcPct val="0"/>
+              </a:spcBef>
+              <a:buFont typeface="Wingdings" panose="05000000000000000000" pitchFamily="2" charset="2"/>
+              <a:buChar char="ü"/>
+              <a:defRPr/>
+            </a:pPr>
+            <a:r>
+              <a:rPr lang="pt-BR" sz="1600" b="1" dirty="0">
+                <a:solidFill>
+                  <a:schemeClr val="tx1"/>
+                </a:solidFill>
+                <a:latin typeface="Arial" panose="020B0604020202020204" pitchFamily="34" charset="0"/>
+                <a:cs typeface="Arial" panose="020B0604020202020204" pitchFamily="34" charset="0"/>
+              </a:rPr>
+              <a:t>Atualizamos o Backlog</a:t>
+            </a:r>
+          </a:p>
+          <a:p>
+            <a:pPr marL="252049" indent="-252049" fontAlgn="base">
+              <a:spcBef>
+                <a:spcPct val="0"/>
+              </a:spcBef>
+              <a:buFont typeface="Wingdings" panose="05000000000000000000" pitchFamily="2" charset="2"/>
+              <a:buChar char="ü"/>
+              <a:defRPr/>
+            </a:pPr>
+            <a:r>
+              <a:rPr lang="pt-BR" sz="1600" b="1" dirty="0">
+                <a:solidFill>
+                  <a:schemeClr val="tx1"/>
+                </a:solidFill>
+                <a:latin typeface="Arial" panose="020B0604020202020204" pitchFamily="34" charset="0"/>
+                <a:cs typeface="Arial" panose="020B0604020202020204" pitchFamily="34" charset="0"/>
+              </a:rPr>
+              <a:t>Atualizamos e designados as tarefas no Sprint Backlog</a:t>
+            </a:r>
+          </a:p>
+          <a:p>
+            <a:pPr marL="252049" indent="-252049" fontAlgn="base">
+              <a:spcBef>
+                <a:spcPct val="0"/>
+              </a:spcBef>
+              <a:buFont typeface="Wingdings" panose="05000000000000000000" pitchFamily="2" charset="2"/>
+              <a:buChar char="ü"/>
+              <a:defRPr/>
+            </a:pPr>
+            <a:endParaRPr lang="pt-BR" sz="1600" b="1" dirty="0">
+              <a:solidFill>
+                <a:schemeClr val="tx1"/>
+              </a:solidFill>
+              <a:latin typeface="Arial" panose="020B0604020202020204" pitchFamily="34" charset="0"/>
+              <a:cs typeface="Arial" panose="020B0604020202020204" pitchFamily="34" charset="0"/>
+            </a:endParaRPr>
+          </a:p>
+          <a:p>
+            <a:pPr marL="0" lvl="1" defTabSz="672130"/>
+            <a:endParaRPr lang="pt-BR" sz="1800" b="1" dirty="0">
+              <a:solidFill>
+                <a:schemeClr val="tx1"/>
+              </a:solidFill>
+              <a:latin typeface="Calibri" panose="020F0502020204030204" pitchFamily="34" charset="0"/>
+              <a:cs typeface="Simplon BP Regular"/>
+            </a:endParaRPr>
+          </a:p>
+        </p:txBody>
+      </p:sp>
+      <p:sp>
+        <p:nvSpPr>
+          <p:cNvPr id="2" name="Rectangle 43">
+            <a:extLst>
+              <a:ext uri="{FF2B5EF4-FFF2-40B4-BE49-F238E27FC236}">
+                <a16:creationId xmlns:a16="http://schemas.microsoft.com/office/drawing/2014/main" id="{B15BA19F-C787-4E6A-ADAB-C0DFF09C66A8}"/>
+              </a:ext>
+            </a:extLst>
+          </p:cNvPr>
+          <p:cNvSpPr>
+            <a:spLocks/>
+          </p:cNvSpPr>
+          <p:nvPr/>
+        </p:nvSpPr>
+        <p:spPr>
+          <a:xfrm>
+            <a:off x="463325" y="5216027"/>
+            <a:ext cx="11854636" cy="2226277"/>
+          </a:xfrm>
+          <a:prstGeom prst="rect">
+            <a:avLst/>
+          </a:prstGeom>
+          <a:noFill/>
+          <a:ln w="12700">
+            <a:solidFill>
+              <a:schemeClr val="bg1">
+                <a:lumMod val="50000"/>
+              </a:schemeClr>
+            </a:solidFill>
+          </a:ln>
+        </p:spPr>
+        <p:style>
+          <a:lnRef idx="2">
+            <a:schemeClr val="accent4"/>
+          </a:lnRef>
+          <a:fillRef idx="1">
+            <a:schemeClr val="lt1"/>
+          </a:fillRef>
+          <a:effectRef idx="0">
+            <a:schemeClr val="accent4"/>
+          </a:effectRef>
+          <a:fontRef idx="minor">
+            <a:schemeClr val="dk1"/>
+          </a:fontRef>
+        </p:style>
+        <p:txBody>
+          <a:bodyPr wrap="square" tIns="105844" numCol="3" rtlCol="0" anchor="ctr"/>
+          <a:lstStyle/>
+          <a:p>
+            <a:pPr marL="0" lvl="1" defTabSz="672130"/>
+            <a:r>
+              <a:rPr lang="pt-BR" sz="1400" b="1" dirty="0">
+                <a:solidFill>
+                  <a:schemeClr val="tx1"/>
+                </a:solidFill>
+                <a:latin typeface="Arial" panose="020B0604020202020204" pitchFamily="34" charset="0"/>
+                <a:cs typeface="Arial" panose="020B0604020202020204" pitchFamily="34" charset="0"/>
+              </a:rPr>
+              <a:t>Frente </a:t>
+            </a:r>
+            <a:r>
+              <a:rPr lang="pt-BR" sz="1400" b="1" dirty="0" err="1">
+                <a:solidFill>
+                  <a:schemeClr val="tx1"/>
+                </a:solidFill>
+                <a:latin typeface="Arial" panose="020B0604020202020204" pitchFamily="34" charset="0"/>
+                <a:cs typeface="Arial" panose="020B0604020202020204" pitchFamily="34" charset="0"/>
+              </a:rPr>
+              <a:t>Backend</a:t>
+            </a:r>
+            <a:endParaRPr lang="pt-BR" sz="1400" b="1" dirty="0">
+              <a:solidFill>
+                <a:schemeClr val="tx1"/>
+              </a:solidFill>
+              <a:latin typeface="Arial" panose="020B0604020202020204" pitchFamily="34" charset="0"/>
+              <a:cs typeface="Arial" panose="020B0604020202020204" pitchFamily="34" charset="0"/>
+            </a:endParaRPr>
+          </a:p>
+          <a:p>
+            <a:pPr marL="285750" lvl="1" indent="-285750" defTabSz="672130">
+              <a:buFont typeface="Wingdings" panose="05000000000000000000" pitchFamily="2" charset="2"/>
+              <a:buChar char="§"/>
+            </a:pPr>
+            <a:r>
+              <a:rPr lang="pt-BR" sz="1400" b="1" dirty="0">
+                <a:solidFill>
+                  <a:schemeClr val="tx1"/>
+                </a:solidFill>
+                <a:latin typeface="Arial" panose="020B0604020202020204" pitchFamily="34" charset="0"/>
+                <a:cs typeface="Arial" panose="020B0604020202020204" pitchFamily="34" charset="0"/>
+              </a:rPr>
+              <a:t>Desenvolver script base de alimentos</a:t>
+            </a:r>
+          </a:p>
+          <a:p>
+            <a:pPr marL="285750" lvl="1" indent="-285750" defTabSz="672130">
+              <a:buFont typeface="Wingdings" panose="05000000000000000000" pitchFamily="2" charset="2"/>
+              <a:buChar char="§"/>
+            </a:pPr>
+            <a:r>
+              <a:rPr lang="pt-BR" sz="1400" b="1" dirty="0">
+                <a:solidFill>
+                  <a:schemeClr val="tx1"/>
+                </a:solidFill>
+                <a:latin typeface="Arial" panose="020B0604020202020204" pitchFamily="34" charset="0"/>
+                <a:cs typeface="Arial" panose="020B0604020202020204" pitchFamily="34" charset="0"/>
+              </a:rPr>
+              <a:t>Desenvolver script tabela de categoria</a:t>
+            </a:r>
+          </a:p>
+          <a:p>
+            <a:pPr marL="285750" lvl="1" indent="-285750" defTabSz="672130">
+              <a:buFont typeface="Wingdings" panose="05000000000000000000" pitchFamily="2" charset="2"/>
+              <a:buChar char="§"/>
+            </a:pPr>
+            <a:r>
+              <a:rPr lang="pt-BR" sz="1400" b="1" dirty="0">
+                <a:solidFill>
+                  <a:schemeClr val="tx1"/>
+                </a:solidFill>
+                <a:latin typeface="Arial" panose="020B0604020202020204" pitchFamily="34" charset="0"/>
+                <a:cs typeface="Arial" panose="020B0604020202020204" pitchFamily="34" charset="0"/>
+              </a:rPr>
+              <a:t>Criar BD no Azure</a:t>
+            </a:r>
+          </a:p>
+          <a:p>
+            <a:pPr marL="0" lvl="1" defTabSz="672130"/>
+            <a:r>
+              <a:rPr lang="pt-BR" sz="1400" b="1" dirty="0">
+                <a:solidFill>
+                  <a:schemeClr val="tx1"/>
+                </a:solidFill>
+                <a:latin typeface="Arial" panose="020B0604020202020204" pitchFamily="34" charset="0"/>
+                <a:cs typeface="Arial" panose="020B0604020202020204" pitchFamily="34" charset="0"/>
+              </a:rPr>
+              <a:t>Frente Front </a:t>
+            </a:r>
+            <a:r>
+              <a:rPr lang="pt-BR" sz="1400" b="1" dirty="0" err="1">
+                <a:solidFill>
+                  <a:schemeClr val="tx1"/>
+                </a:solidFill>
+                <a:latin typeface="Arial" panose="020B0604020202020204" pitchFamily="34" charset="0"/>
+                <a:cs typeface="Arial" panose="020B0604020202020204" pitchFamily="34" charset="0"/>
+              </a:rPr>
+              <a:t>end</a:t>
+            </a:r>
+            <a:endParaRPr lang="pt-BR" sz="1400" b="1" dirty="0">
+              <a:solidFill>
+                <a:schemeClr val="tx1"/>
+              </a:solidFill>
+              <a:latin typeface="Arial" panose="020B0604020202020204" pitchFamily="34" charset="0"/>
+              <a:cs typeface="Arial" panose="020B0604020202020204" pitchFamily="34" charset="0"/>
+            </a:endParaRPr>
+          </a:p>
+          <a:p>
+            <a:pPr marL="252049" lvl="1" indent="-252049">
+              <a:buFont typeface="Wingdings" panose="05000000000000000000" pitchFamily="2" charset="2"/>
+              <a:buChar char="§"/>
+            </a:pPr>
+            <a:r>
+              <a:rPr lang="pt-BR" sz="1400" b="1" dirty="0">
+                <a:solidFill>
+                  <a:schemeClr val="tx1"/>
+                </a:solidFill>
+                <a:latin typeface="Arial" panose="020B0604020202020204" pitchFamily="34" charset="0"/>
+                <a:cs typeface="Arial" panose="020B0604020202020204" pitchFamily="34" charset="0"/>
+              </a:rPr>
+              <a:t>Finalizar o desenvolvimento do site institucional</a:t>
+            </a:r>
+          </a:p>
+          <a:p>
+            <a:pPr marL="0" lvl="1" defTabSz="672130"/>
+            <a:endParaRPr lang="pt-BR" sz="1600" b="1" dirty="0">
+              <a:solidFill>
+                <a:schemeClr val="tx1"/>
+              </a:solidFill>
+              <a:latin typeface="Calibri" panose="020F0502020204030204" pitchFamily="34" charset="0"/>
+              <a:cs typeface="Simplon BP Regular"/>
+            </a:endParaRPr>
+          </a:p>
+          <a:p>
+            <a:pPr marL="0" lvl="1" defTabSz="672130"/>
+            <a:r>
+              <a:rPr lang="pt-BR" sz="1400" b="1" dirty="0">
+                <a:solidFill>
+                  <a:schemeClr val="tx1"/>
+                </a:solidFill>
+                <a:latin typeface="Arial" panose="020B0604020202020204" pitchFamily="34" charset="0"/>
+                <a:cs typeface="Arial" panose="020B0604020202020204" pitchFamily="34" charset="0"/>
+              </a:rPr>
+              <a:t>Frente Negócios</a:t>
+            </a:r>
+          </a:p>
+        </p:txBody>
+      </p:sp>
+      <p:sp>
+        <p:nvSpPr>
+          <p:cNvPr id="5" name="Retângulo 4">
+            <a:extLst>
+              <a:ext uri="{FF2B5EF4-FFF2-40B4-BE49-F238E27FC236}">
+                <a16:creationId xmlns:a16="http://schemas.microsoft.com/office/drawing/2014/main" id="{A1C14918-6027-46B3-96BF-C5F7FDEC3276}"/>
+              </a:ext>
+            </a:extLst>
+          </p:cNvPr>
+          <p:cNvSpPr/>
+          <p:nvPr/>
+        </p:nvSpPr>
+        <p:spPr>
+          <a:xfrm>
+            <a:off x="8017619" y="180231"/>
+            <a:ext cx="4937689" cy="618769"/>
+          </a:xfrm>
+          <a:prstGeom prst="rect">
+            <a:avLst/>
+          </a:prstGeom>
+          <a:noFill/>
+          <a:ln w="6350">
+            <a:solidFill>
+              <a:schemeClr val="bg1">
+                <a:lumMod val="75000"/>
+              </a:schemeClr>
+            </a:solidFill>
+          </a:ln>
+        </p:spPr>
+        <p:style>
+          <a:lnRef idx="2">
+            <a:schemeClr val="accent1">
+              <a:shade val="50000"/>
+            </a:schemeClr>
+          </a:lnRef>
+          <a:fillRef idx="1">
+            <a:schemeClr val="accent1"/>
+          </a:fillRef>
+          <a:effectRef idx="0">
+            <a:schemeClr val="accent1"/>
+          </a:effectRef>
+          <a:fontRef idx="minor">
+            <a:schemeClr val="lt1"/>
+          </a:fontRef>
+        </p:style>
+        <p:txBody>
+          <a:bodyPr rtlCol="0" anchor="ctr"/>
+          <a:lstStyle/>
+          <a:p>
+            <a:pPr algn="ctr"/>
+            <a:endParaRPr lang="pt-BR"/>
+          </a:p>
+        </p:txBody>
+      </p:sp>
+      <p:sp>
+        <p:nvSpPr>
+          <p:cNvPr id="8" name="TextBox 138">
+            <a:extLst>
+              <a:ext uri="{FF2B5EF4-FFF2-40B4-BE49-F238E27FC236}">
+                <a16:creationId xmlns:a16="http://schemas.microsoft.com/office/drawing/2014/main" id="{5CE7D08C-795B-4BF1-97F6-F9773F4E9F4C}"/>
+              </a:ext>
+            </a:extLst>
+          </p:cNvPr>
+          <p:cNvSpPr txBox="1"/>
+          <p:nvPr/>
+        </p:nvSpPr>
+        <p:spPr>
+          <a:xfrm>
+            <a:off x="9715810" y="51570"/>
+            <a:ext cx="1478088" cy="211688"/>
+          </a:xfrm>
+          <a:prstGeom prst="rect">
+            <a:avLst/>
+          </a:prstGeom>
+          <a:solidFill>
+            <a:schemeClr val="bg1"/>
+          </a:solidFill>
+          <a:ln w="12700">
+            <a:noFill/>
+          </a:ln>
+        </p:spPr>
+        <p:style>
+          <a:lnRef idx="2">
+            <a:schemeClr val="accent4"/>
+          </a:lnRef>
+          <a:fillRef idx="1">
+            <a:schemeClr val="lt1"/>
+          </a:fillRef>
+          <a:effectRef idx="0">
+            <a:schemeClr val="accent4"/>
+          </a:effectRef>
+          <a:fontRef idx="minor">
+            <a:schemeClr val="dk1"/>
+          </a:fontRef>
+        </p:style>
+        <p:txBody>
+          <a:bodyPr wrap="none" lIns="52922" tIns="52922" rIns="52922" bIns="0" rtlCol="0" anchor="b"/>
+          <a:lstStyle>
+            <a:defPPr>
+              <a:defRPr lang="en-US"/>
+            </a:defPPr>
+            <a:lvl1pPr algn="ctr">
+              <a:defRPr sz="1000" b="1">
+                <a:latin typeface="Simplon BP Regular"/>
+                <a:cs typeface="Simplon BP Regular"/>
+              </a:defRPr>
+            </a:lvl1pPr>
+            <a:lvl2pPr>
+              <a:defRPr>
+                <a:solidFill>
+                  <a:schemeClr val="dk1"/>
+                </a:solidFill>
+              </a:defRPr>
+            </a:lvl2pPr>
+            <a:lvl3pPr>
+              <a:defRPr>
+                <a:solidFill>
+                  <a:schemeClr val="dk1"/>
+                </a:solidFill>
+              </a:defRPr>
+            </a:lvl3pPr>
+            <a:lvl4pPr>
+              <a:defRPr>
+                <a:solidFill>
+                  <a:schemeClr val="dk1"/>
+                </a:solidFill>
+              </a:defRPr>
+            </a:lvl4pPr>
+            <a:lvl5pPr>
+              <a:defRPr>
+                <a:solidFill>
+                  <a:schemeClr val="dk1"/>
+                </a:solidFill>
+              </a:defRPr>
+            </a:lvl5pPr>
+            <a:lvl6pPr>
+              <a:defRPr>
+                <a:solidFill>
+                  <a:schemeClr val="dk1"/>
+                </a:solidFill>
+              </a:defRPr>
+            </a:lvl6pPr>
+            <a:lvl7pPr>
+              <a:defRPr>
+                <a:solidFill>
+                  <a:schemeClr val="dk1"/>
+                </a:solidFill>
+              </a:defRPr>
+            </a:lvl7pPr>
+            <a:lvl8pPr>
+              <a:defRPr>
+                <a:solidFill>
+                  <a:schemeClr val="dk1"/>
+                </a:solidFill>
+              </a:defRPr>
+            </a:lvl8pPr>
+            <a:lvl9pPr>
+              <a:defRPr>
+                <a:solidFill>
+                  <a:schemeClr val="dk1"/>
+                </a:solidFill>
+              </a:defRPr>
+            </a:lvl9pPr>
+          </a:lstStyle>
+          <a:p>
+            <a:pPr defTabSz="672130"/>
+            <a:r>
+              <a:rPr lang="en-US" sz="1176" b="0" dirty="0">
+                <a:solidFill>
+                  <a:prstClr val="black"/>
+                </a:solidFill>
+                <a:latin typeface="Simplon BP Bold" pitchFamily="2" charset="0"/>
+              </a:rPr>
+              <a:t>    </a:t>
+            </a:r>
+            <a:r>
+              <a:rPr lang="en-US" sz="1176" b="0" dirty="0" err="1">
+                <a:solidFill>
+                  <a:prstClr val="black"/>
+                </a:solidFill>
+                <a:latin typeface="Simplon BP Bold" pitchFamily="2" charset="0"/>
+              </a:rPr>
+              <a:t>Farol</a:t>
+            </a:r>
+            <a:r>
+              <a:rPr lang="en-US" sz="1176" b="0" dirty="0">
+                <a:solidFill>
+                  <a:prstClr val="black"/>
+                </a:solidFill>
+                <a:latin typeface="Simplon BP Bold" pitchFamily="2" charset="0"/>
+              </a:rPr>
+              <a:t> do </a:t>
+            </a:r>
+            <a:r>
+              <a:rPr lang="en-US" sz="1176" b="0" dirty="0" err="1">
+                <a:solidFill>
+                  <a:prstClr val="black"/>
+                </a:solidFill>
+                <a:latin typeface="Simplon BP Bold" pitchFamily="2" charset="0"/>
+              </a:rPr>
+              <a:t>Projeto</a:t>
+            </a:r>
+            <a:r>
+              <a:rPr lang="en-US" sz="1176" b="0" dirty="0">
+                <a:solidFill>
+                  <a:prstClr val="black"/>
+                </a:solidFill>
+                <a:latin typeface="Simplon BP Bold" pitchFamily="2" charset="0"/>
+              </a:rPr>
+              <a:t>   </a:t>
+            </a:r>
+          </a:p>
+        </p:txBody>
+      </p:sp>
+      <p:sp>
+        <p:nvSpPr>
+          <p:cNvPr id="21" name="Oval 134">
+            <a:extLst>
+              <a:ext uri="{FF2B5EF4-FFF2-40B4-BE49-F238E27FC236}">
+                <a16:creationId xmlns:a16="http://schemas.microsoft.com/office/drawing/2014/main" id="{C7687DA3-5EC5-4177-9DBB-6A09DC7F77ED}"/>
+              </a:ext>
+            </a:extLst>
+          </p:cNvPr>
+          <p:cNvSpPr>
+            <a:spLocks noChangeAspect="1"/>
+          </p:cNvSpPr>
+          <p:nvPr/>
+        </p:nvSpPr>
+        <p:spPr>
+          <a:xfrm>
+            <a:off x="10156945" y="362281"/>
+            <a:ext cx="211404" cy="211689"/>
+          </a:xfrm>
+          <a:prstGeom prst="ellipse">
+            <a:avLst/>
+          </a:prstGeom>
+          <a:solidFill>
+            <a:srgbClr val="1BCF13"/>
+          </a:solidFill>
+          <a:ln w="12700">
+            <a:solidFill>
+              <a:schemeClr val="accent3"/>
+            </a:solidFill>
+          </a:ln>
+        </p:spPr>
+        <p:style>
+          <a:lnRef idx="2">
+            <a:schemeClr val="accent1">
+              <a:shade val="50000"/>
+            </a:schemeClr>
+          </a:lnRef>
+          <a:fillRef idx="1">
+            <a:schemeClr val="accent1"/>
+          </a:fillRef>
+          <a:effectRef idx="0">
+            <a:schemeClr val="accent1"/>
+          </a:effectRef>
+          <a:fontRef idx="minor">
+            <a:schemeClr val="lt1"/>
+          </a:fontRef>
+        </p:style>
+        <p:txBody>
+          <a:bodyPr wrap="none" lIns="52922" tIns="52922" rIns="52922" rtlCol="0" anchor="ctr"/>
+          <a:lstStyle/>
+          <a:p>
+            <a:pPr algn="ctr" defTabSz="672130"/>
+            <a:endParaRPr lang="en-US" sz="1176" dirty="0">
+              <a:solidFill>
+                <a:prstClr val="black"/>
+              </a:solidFill>
+              <a:latin typeface="Simplon BP Regular"/>
+              <a:cs typeface="Simplon BP Regular"/>
+            </a:endParaRPr>
+          </a:p>
+        </p:txBody>
+      </p:sp>
+      <p:sp>
+        <p:nvSpPr>
+          <p:cNvPr id="22" name="Oval 134">
+            <a:extLst>
+              <a:ext uri="{FF2B5EF4-FFF2-40B4-BE49-F238E27FC236}">
+                <a16:creationId xmlns:a16="http://schemas.microsoft.com/office/drawing/2014/main" id="{B363CBDD-9D88-41D9-9F1B-E6F757DF80B1}"/>
+              </a:ext>
+            </a:extLst>
+          </p:cNvPr>
+          <p:cNvSpPr>
+            <a:spLocks noChangeAspect="1"/>
+          </p:cNvSpPr>
+          <p:nvPr/>
+        </p:nvSpPr>
+        <p:spPr>
+          <a:xfrm>
+            <a:off x="12180394" y="284502"/>
+            <a:ext cx="211404" cy="211689"/>
+          </a:xfrm>
+          <a:prstGeom prst="ellipse">
+            <a:avLst/>
+          </a:prstGeom>
+          <a:solidFill>
+            <a:srgbClr val="1BCF13"/>
+          </a:solidFill>
+          <a:ln w="12700">
+            <a:solidFill>
+              <a:schemeClr val="accent3"/>
+            </a:solidFill>
+          </a:ln>
+        </p:spPr>
+        <p:style>
+          <a:lnRef idx="2">
+            <a:schemeClr val="accent1">
+              <a:shade val="50000"/>
+            </a:schemeClr>
+          </a:lnRef>
+          <a:fillRef idx="1">
+            <a:schemeClr val="accent1"/>
+          </a:fillRef>
+          <a:effectRef idx="0">
+            <a:schemeClr val="accent1"/>
+          </a:effectRef>
+          <a:fontRef idx="minor">
+            <a:schemeClr val="lt1"/>
+          </a:fontRef>
+        </p:style>
+        <p:txBody>
+          <a:bodyPr wrap="none" lIns="52922" tIns="52922" rIns="52922" rtlCol="0" anchor="ctr"/>
+          <a:lstStyle/>
+          <a:p>
+            <a:pPr algn="ctr" defTabSz="672130"/>
+            <a:endParaRPr lang="en-US" sz="1176" dirty="0">
+              <a:solidFill>
+                <a:prstClr val="black"/>
+              </a:solidFill>
+              <a:latin typeface="Simplon BP Regular"/>
+              <a:cs typeface="Simplon BP Regular"/>
+            </a:endParaRPr>
+          </a:p>
+        </p:txBody>
+      </p:sp>
+      <p:sp>
+        <p:nvSpPr>
+          <p:cNvPr id="23" name="Oval 134">
+            <a:extLst>
+              <a:ext uri="{FF2B5EF4-FFF2-40B4-BE49-F238E27FC236}">
+                <a16:creationId xmlns:a16="http://schemas.microsoft.com/office/drawing/2014/main" id="{F42F78D9-B5A8-4A97-8925-8B5904C502F3}"/>
+              </a:ext>
+            </a:extLst>
+          </p:cNvPr>
+          <p:cNvSpPr>
+            <a:spLocks noChangeAspect="1"/>
+          </p:cNvSpPr>
+          <p:nvPr/>
+        </p:nvSpPr>
+        <p:spPr>
+          <a:xfrm>
+            <a:off x="11262832" y="305415"/>
+            <a:ext cx="211404" cy="211689"/>
+          </a:xfrm>
+          <a:prstGeom prst="ellipse">
+            <a:avLst/>
+          </a:prstGeom>
+          <a:solidFill>
+            <a:srgbClr val="1BCF13"/>
+          </a:solidFill>
+          <a:ln w="12700">
+            <a:solidFill>
+              <a:schemeClr val="accent3"/>
+            </a:solidFill>
+          </a:ln>
+        </p:spPr>
+        <p:style>
+          <a:lnRef idx="2">
+            <a:schemeClr val="accent1">
+              <a:shade val="50000"/>
+            </a:schemeClr>
+          </a:lnRef>
+          <a:fillRef idx="1">
+            <a:schemeClr val="accent1"/>
+          </a:fillRef>
+          <a:effectRef idx="0">
+            <a:schemeClr val="accent1"/>
+          </a:effectRef>
+          <a:fontRef idx="minor">
+            <a:schemeClr val="lt1"/>
+          </a:fontRef>
+        </p:style>
+        <p:txBody>
+          <a:bodyPr wrap="none" lIns="52922" tIns="52922" rIns="52922" rtlCol="0" anchor="ctr"/>
+          <a:lstStyle/>
+          <a:p>
+            <a:pPr algn="ctr" defTabSz="672130"/>
+            <a:endParaRPr lang="en-US" sz="1176" dirty="0">
+              <a:solidFill>
+                <a:prstClr val="black"/>
+              </a:solidFill>
+              <a:latin typeface="Simplon BP Regular"/>
+              <a:cs typeface="Simplon BP Regular"/>
+            </a:endParaRPr>
+          </a:p>
+        </p:txBody>
+      </p:sp>
+      <p:sp>
+        <p:nvSpPr>
+          <p:cNvPr id="24" name="Oval 134">
+            <a:extLst>
+              <a:ext uri="{FF2B5EF4-FFF2-40B4-BE49-F238E27FC236}">
+                <a16:creationId xmlns:a16="http://schemas.microsoft.com/office/drawing/2014/main" id="{1EBE2388-56B1-476A-9F0A-E2D66925E9B1}"/>
+              </a:ext>
+            </a:extLst>
+          </p:cNvPr>
+          <p:cNvSpPr>
+            <a:spLocks noChangeAspect="1"/>
+          </p:cNvSpPr>
+          <p:nvPr/>
+        </p:nvSpPr>
+        <p:spPr>
+          <a:xfrm>
+            <a:off x="9275679" y="332030"/>
+            <a:ext cx="211404" cy="211689"/>
+          </a:xfrm>
+          <a:prstGeom prst="ellipse">
+            <a:avLst/>
+          </a:prstGeom>
+          <a:solidFill>
+            <a:srgbClr val="1BCF13"/>
+          </a:solidFill>
+          <a:ln w="12700">
+            <a:solidFill>
+              <a:schemeClr val="accent3"/>
+            </a:solidFill>
+          </a:ln>
+        </p:spPr>
+        <p:style>
+          <a:lnRef idx="2">
+            <a:schemeClr val="accent1">
+              <a:shade val="50000"/>
+            </a:schemeClr>
+          </a:lnRef>
+          <a:fillRef idx="1">
+            <a:schemeClr val="accent1"/>
+          </a:fillRef>
+          <a:effectRef idx="0">
+            <a:schemeClr val="accent1"/>
+          </a:effectRef>
+          <a:fontRef idx="minor">
+            <a:schemeClr val="lt1"/>
+          </a:fontRef>
+        </p:style>
+        <p:txBody>
+          <a:bodyPr wrap="none" lIns="52922" tIns="52922" rIns="52922" rtlCol="0" anchor="ctr"/>
+          <a:lstStyle/>
+          <a:p>
+            <a:pPr algn="ctr" defTabSz="672130"/>
+            <a:endParaRPr lang="en-US" sz="1176" dirty="0">
+              <a:solidFill>
+                <a:prstClr val="black"/>
+              </a:solidFill>
+              <a:latin typeface="Simplon BP Regular"/>
+              <a:cs typeface="Simplon BP Regular"/>
+            </a:endParaRPr>
+          </a:p>
+        </p:txBody>
+      </p:sp>
+    </p:spTree>
+    <p:extLst>
+      <p:ext uri="{BB962C8B-B14F-4D97-AF65-F5344CB8AC3E}">
+        <p14:creationId xmlns:p14="http://schemas.microsoft.com/office/powerpoint/2010/main" val="237637447"/>
       </p:ext>
     </p:extLst>
   </p:cSld>
@@ -30998,67 +32825,6 @@
 </file>
 
 <file path=customXml/item1.xml><?xml version="1.0" encoding="utf-8"?>
-<p:properties xmlns:p="http://schemas.microsoft.com/office/2006/metadata/properties" xmlns:xsi="http://www.w3.org/2001/XMLSchema-instance" xmlns:pc="http://schemas.microsoft.com/office/infopath/2007/PartnerControls">
-  <documentManagement>
-    <Is_Collaboration_Space_Locked xmlns="bbcd8c33-6940-4d4c-a587-bbc736ca1e4d" xsi:nil="true"/>
-    <TeamsChannelId xmlns="bbcd8c33-6940-4d4c-a587-bbc736ca1e4d" xsi:nil="true"/>
-    <Self_Registration_Enabled xmlns="bbcd8c33-6940-4d4c-a587-bbc736ca1e4d" xsi:nil="true"/>
-    <Math_Settings xmlns="bbcd8c33-6940-4d4c-a587-bbc736ca1e4d" xsi:nil="true"/>
-    <AppVersion xmlns="bbcd8c33-6940-4d4c-a587-bbc736ca1e4d" xsi:nil="true"/>
-    <Invited_Teachers xmlns="bbcd8c33-6940-4d4c-a587-bbc736ca1e4d" xsi:nil="true"/>
-    <LMS_Mappings xmlns="bbcd8c33-6940-4d4c-a587-bbc736ca1e4d" xsi:nil="true"/>
-    <IsNotebookLocked xmlns="bbcd8c33-6940-4d4c-a587-bbc736ca1e4d" xsi:nil="true"/>
-    <NotebookType xmlns="bbcd8c33-6940-4d4c-a587-bbc736ca1e4d" xsi:nil="true"/>
-    <Templates xmlns="bbcd8c33-6940-4d4c-a587-bbc736ca1e4d" xsi:nil="true"/>
-    <Owner xmlns="bbcd8c33-6940-4d4c-a587-bbc736ca1e4d">
-      <UserInfo>
-        <DisplayName/>
-        <AccountId xsi:nil="true"/>
-        <AccountType/>
-      </UserInfo>
-    </Owner>
-    <Teachers xmlns="bbcd8c33-6940-4d4c-a587-bbc736ca1e4d">
-      <UserInfo>
-        <DisplayName/>
-        <AccountId xsi:nil="true"/>
-        <AccountType/>
-      </UserInfo>
-    </Teachers>
-    <Students xmlns="bbcd8c33-6940-4d4c-a587-bbc736ca1e4d">
-      <UserInfo>
-        <DisplayName/>
-        <AccountId xsi:nil="true"/>
-        <AccountType/>
-      </UserInfo>
-    </Students>
-    <Student_Groups xmlns="bbcd8c33-6940-4d4c-a587-bbc736ca1e4d">
-      <UserInfo>
-        <DisplayName/>
-        <AccountId xsi:nil="true"/>
-        <AccountType/>
-      </UserInfo>
-    </Student_Groups>
-    <Distribution_Groups xmlns="bbcd8c33-6940-4d4c-a587-bbc736ca1e4d" xsi:nil="true"/>
-    <Self_Registration_Enabled0 xmlns="bbcd8c33-6940-4d4c-a587-bbc736ca1e4d" xsi:nil="true"/>
-    <Has_Teacher_Only_SectionGroup xmlns="bbcd8c33-6940-4d4c-a587-bbc736ca1e4d" xsi:nil="true"/>
-    <DefaultSectionNames xmlns="bbcd8c33-6940-4d4c-a587-bbc736ca1e4d" xsi:nil="true"/>
-    <Invited_Students xmlns="bbcd8c33-6940-4d4c-a587-bbc736ca1e4d" xsi:nil="true"/>
-    <FolderType xmlns="bbcd8c33-6940-4d4c-a587-bbc736ca1e4d" xsi:nil="true"/>
-    <CultureName xmlns="bbcd8c33-6940-4d4c-a587-bbc736ca1e4d" xsi:nil="true"/>
-  </documentManagement>
-</p:properties>
-</file>
-
-<file path=customXml/item2.xml><?xml version="1.0" encoding="utf-8"?>
-<?mso-contentType ?>
-<FormTemplates xmlns="http://schemas.microsoft.com/sharepoint/v3/contenttype/forms">
-  <Display>DocumentLibraryForm</Display>
-  <Edit>DocumentLibraryForm</Edit>
-  <New>DocumentLibraryForm</New>
-</FormTemplates>
-</file>
-
-<file path=customXml/item3.xml><?xml version="1.0" encoding="utf-8"?>
 <ct:contentTypeSchema xmlns:ct="http://schemas.microsoft.com/office/2006/metadata/contentType" xmlns:ma="http://schemas.microsoft.com/office/2006/metadata/properties/metaAttributes" ct:_="" ma:_="" ma:contentTypeName="Document" ma:contentTypeID="0x0101001132905C37EA9847A7207C4BBCCCD8F4" ma:contentTypeVersion="34" ma:contentTypeDescription="Create a new document." ma:contentTypeScope="" ma:versionID="2f28daba72ca6e92be87ea70ebe5bb94">
   <xsd:schema xmlns:xsd="http://www.w3.org/2001/XMLSchema" xmlns:xs="http://www.w3.org/2001/XMLSchema" xmlns:p="http://schemas.microsoft.com/office/2006/metadata/properties" xmlns:ns3="4327b14a-fe89-488e-9f6d-9658cacf372b" xmlns:ns4="bbcd8c33-6940-4d4c-a587-bbc736ca1e4d" targetNamespace="http://schemas.microsoft.com/office/2006/metadata/properties" ma:root="true" ma:fieldsID="df18e839ce2650f1975b41376e6cdb6b" ns3:_="" ns4:_="">
     <xsd:import namespace="4327b14a-fe89-488e-9f6d-9658cacf372b"/>
@@ -31475,7 +33241,87 @@
 </ct:contentTypeSchema>
 </file>
 
+<file path=customXml/item2.xml><?xml version="1.0" encoding="utf-8"?>
+<p:properties xmlns:p="http://schemas.microsoft.com/office/2006/metadata/properties" xmlns:xsi="http://www.w3.org/2001/XMLSchema-instance" xmlns:pc="http://schemas.microsoft.com/office/infopath/2007/PartnerControls">
+  <documentManagement>
+    <Is_Collaboration_Space_Locked xmlns="bbcd8c33-6940-4d4c-a587-bbc736ca1e4d" xsi:nil="true"/>
+    <TeamsChannelId xmlns="bbcd8c33-6940-4d4c-a587-bbc736ca1e4d" xsi:nil="true"/>
+    <Self_Registration_Enabled xmlns="bbcd8c33-6940-4d4c-a587-bbc736ca1e4d" xsi:nil="true"/>
+    <Math_Settings xmlns="bbcd8c33-6940-4d4c-a587-bbc736ca1e4d" xsi:nil="true"/>
+    <AppVersion xmlns="bbcd8c33-6940-4d4c-a587-bbc736ca1e4d" xsi:nil="true"/>
+    <Invited_Teachers xmlns="bbcd8c33-6940-4d4c-a587-bbc736ca1e4d" xsi:nil="true"/>
+    <LMS_Mappings xmlns="bbcd8c33-6940-4d4c-a587-bbc736ca1e4d" xsi:nil="true"/>
+    <IsNotebookLocked xmlns="bbcd8c33-6940-4d4c-a587-bbc736ca1e4d" xsi:nil="true"/>
+    <NotebookType xmlns="bbcd8c33-6940-4d4c-a587-bbc736ca1e4d" xsi:nil="true"/>
+    <Templates xmlns="bbcd8c33-6940-4d4c-a587-bbc736ca1e4d" xsi:nil="true"/>
+    <Owner xmlns="bbcd8c33-6940-4d4c-a587-bbc736ca1e4d">
+      <UserInfo>
+        <DisplayName/>
+        <AccountId xsi:nil="true"/>
+        <AccountType/>
+      </UserInfo>
+    </Owner>
+    <Teachers xmlns="bbcd8c33-6940-4d4c-a587-bbc736ca1e4d">
+      <UserInfo>
+        <DisplayName/>
+        <AccountId xsi:nil="true"/>
+        <AccountType/>
+      </UserInfo>
+    </Teachers>
+    <Students xmlns="bbcd8c33-6940-4d4c-a587-bbc736ca1e4d">
+      <UserInfo>
+        <DisplayName/>
+        <AccountId xsi:nil="true"/>
+        <AccountType/>
+      </UserInfo>
+    </Students>
+    <Student_Groups xmlns="bbcd8c33-6940-4d4c-a587-bbc736ca1e4d">
+      <UserInfo>
+        <DisplayName/>
+        <AccountId xsi:nil="true"/>
+        <AccountType/>
+      </UserInfo>
+    </Student_Groups>
+    <Distribution_Groups xmlns="bbcd8c33-6940-4d4c-a587-bbc736ca1e4d" xsi:nil="true"/>
+    <Self_Registration_Enabled0 xmlns="bbcd8c33-6940-4d4c-a587-bbc736ca1e4d" xsi:nil="true"/>
+    <Has_Teacher_Only_SectionGroup xmlns="bbcd8c33-6940-4d4c-a587-bbc736ca1e4d" xsi:nil="true"/>
+    <DefaultSectionNames xmlns="bbcd8c33-6940-4d4c-a587-bbc736ca1e4d" xsi:nil="true"/>
+    <Invited_Students xmlns="bbcd8c33-6940-4d4c-a587-bbc736ca1e4d" xsi:nil="true"/>
+    <FolderType xmlns="bbcd8c33-6940-4d4c-a587-bbc736ca1e4d" xsi:nil="true"/>
+    <CultureName xmlns="bbcd8c33-6940-4d4c-a587-bbc736ca1e4d" xsi:nil="true"/>
+  </documentManagement>
+</p:properties>
+</file>
+
+<file path=customXml/item3.xml><?xml version="1.0" encoding="utf-8"?>
+<?mso-contentType ?>
+<FormTemplates xmlns="http://schemas.microsoft.com/sharepoint/v3/contenttype/forms">
+  <Display>DocumentLibraryForm</Display>
+  <Edit>DocumentLibraryForm</Edit>
+  <New>DocumentLibraryForm</New>
+</FormTemplates>
+</file>
+
 <file path=customXml/itemProps1.xml><?xml version="1.0" encoding="utf-8"?>
+<ds:datastoreItem xmlns:ds="http://schemas.openxmlformats.org/officeDocument/2006/customXml" ds:itemID="{3BE6CAF6-1F55-4A70-B10C-21633F74987A}">
+  <ds:schemaRefs>
+    <ds:schemaRef ds:uri="http://schemas.microsoft.com/office/2006/metadata/contentType"/>
+    <ds:schemaRef ds:uri="http://schemas.microsoft.com/office/2006/metadata/properties/metaAttributes"/>
+    <ds:schemaRef ds:uri="http://www.w3.org/2001/XMLSchema"/>
+    <ds:schemaRef ds:uri="http://schemas.microsoft.com/office/2006/metadata/properties"/>
+    <ds:schemaRef ds:uri="4327b14a-fe89-488e-9f6d-9658cacf372b"/>
+    <ds:schemaRef ds:uri="bbcd8c33-6940-4d4c-a587-bbc736ca1e4d"/>
+    <ds:schemaRef ds:uri="http://schemas.microsoft.com/office/2006/documentManagement/types"/>
+    <ds:schemaRef ds:uri="http://schemas.microsoft.com/office/infopath/2007/PartnerControls"/>
+    <ds:schemaRef ds:uri="http://schemas.openxmlformats.org/package/2006/metadata/core-properties"/>
+    <ds:schemaRef ds:uri="http://purl.org/dc/elements/1.1/"/>
+    <ds:schemaRef ds:uri="http://purl.org/dc/terms/"/>
+    <ds:schemaRef ds:uri="http://schemas.microsoft.com/internal/obd"/>
+  </ds:schemaRefs>
+</ds:datastoreItem>
+</file>
+
+<file path=customXml/itemProps2.xml><?xml version="1.0" encoding="utf-8"?>
 <ds:datastoreItem xmlns:ds="http://schemas.openxmlformats.org/officeDocument/2006/customXml" ds:itemID="{4B31267F-D399-4A8A-87F8-B75F56828412}">
   <ds:schemaRefs>
     <ds:schemaRef ds:uri="http://www.w3.org/XML/1998/namespace"/>
@@ -31492,29 +33338,10 @@
 </ds:datastoreItem>
 </file>
 
-<file path=customXml/itemProps2.xml><?xml version="1.0" encoding="utf-8"?>
+<file path=customXml/itemProps3.xml><?xml version="1.0" encoding="utf-8"?>
 <ds:datastoreItem xmlns:ds="http://schemas.openxmlformats.org/officeDocument/2006/customXml" ds:itemID="{E2481852-F24E-4532-AF30-C154D705D105}">
   <ds:schemaRefs>
     <ds:schemaRef ds:uri="http://schemas.microsoft.com/sharepoint/v3/contenttype/forms"/>
   </ds:schemaRefs>
 </ds:datastoreItem>
-</file>
-
-<file path=customXml/itemProps3.xml><?xml version="1.0" encoding="utf-8"?>
-<ds:datastoreItem xmlns:ds="http://schemas.openxmlformats.org/officeDocument/2006/customXml" ds:itemID="{3BE6CAF6-1F55-4A70-B10C-21633F74987A}">
-  <ds:schemaRefs>
-    <ds:schemaRef ds:uri="http://schemas.microsoft.com/office/2006/metadata/contentType"/>
-    <ds:schemaRef ds:uri="http://schemas.microsoft.com/office/2006/metadata/properties/metaAttributes"/>
-    <ds:schemaRef ds:uri="http://www.w3.org/2001/XMLSchema"/>
-    <ds:schemaRef ds:uri="http://schemas.microsoft.com/office/2006/metadata/properties"/>
-    <ds:schemaRef ds:uri="4327b14a-fe89-488e-9f6d-9658cacf372b"/>
-    <ds:schemaRef ds:uri="bbcd8c33-6940-4d4c-a587-bbc736ca1e4d"/>
-    <ds:schemaRef ds:uri="http://schemas.microsoft.com/office/2006/documentManagement/types"/>
-    <ds:schemaRef ds:uri="http://schemas.microsoft.com/office/infopath/2007/PartnerControls"/>
-    <ds:schemaRef ds:uri="http://schemas.openxmlformats.org/package/2006/metadata/core-properties"/>
-    <ds:schemaRef ds:uri="http://purl.org/dc/elements/1.1/"/>
-    <ds:schemaRef ds:uri="http://purl.org/dc/terms/"/>
-    <ds:schemaRef ds:uri="http://schemas.microsoft.com/internal/obd"/>
-  </ds:schemaRefs>
-</ds:datastoreItem>
 </file>
</xml_diff>

<commit_message>
Diagrama de software v1
</commit_message>
<xml_diff>
--- a/Documentação/Status_Report/Mod_Status_Report-PI20202.pptx
+++ b/Documentação/Status_Report/Mod_Status_Report-PI20202.pptx
@@ -7,10 +7,10 @@
     <p:sldMasterId id="2147483665" r:id="rId6"/>
   </p:sldMasterIdLst>
   <p:notesMasterIdLst>
-    <p:notesMasterId r:id="rId13"/>
+    <p:notesMasterId r:id="rId15"/>
   </p:notesMasterIdLst>
   <p:handoutMasterIdLst>
-    <p:handoutMasterId r:id="rId14"/>
+    <p:handoutMasterId r:id="rId16"/>
   </p:handoutMasterIdLst>
   <p:sldIdLst>
     <p:sldId id="256" r:id="rId7"/>
@@ -19,6 +19,8 @@
     <p:sldId id="472" r:id="rId10"/>
     <p:sldId id="473" r:id="rId11"/>
     <p:sldId id="474" r:id="rId12"/>
+    <p:sldId id="475" r:id="rId13"/>
+    <p:sldId id="476" r:id="rId14"/>
   </p:sldIdLst>
   <p:sldSz cx="13442950" cy="7561263"/>
   <p:notesSz cx="7104063" cy="10234613"/>
@@ -132,6 +134,8 @@
             <p14:sldId id="472"/>
             <p14:sldId id="473"/>
             <p14:sldId id="474"/>
+            <p14:sldId id="475"/>
+            <p14:sldId id="476"/>
           </p14:sldIdLst>
         </p14:section>
       </p14:sectionLst>
@@ -1214,7 +1218,7 @@
             <a:fld id="{C3CD65D1-5C11-455D-9F9A-0E035F00A0DA}" type="datetimeFigureOut">
               <a:rPr lang="pt-BR" smtClean="0"/>
               <a:pPr/>
-              <a:t>25/03/2021</a:t>
+              <a:t>07/04/2021</a:t>
             </a:fld>
             <a:endParaRPr lang="pt-BR"/>
           </a:p>
@@ -1382,7 +1386,7 @@
             <a:fld id="{A05DA3EF-18EA-43DE-B1BB-402A3C558822}" type="datetimeFigureOut">
               <a:rPr lang="pt-BR" smtClean="0"/>
               <a:pPr/>
-              <a:t>25/03/2021</a:t>
+              <a:t>07/04/2021</a:t>
             </a:fld>
             <a:endParaRPr lang="pt-BR"/>
           </a:p>
@@ -2101,6 +2105,192 @@
     <p:extLst>
       <p:ext uri="{BB962C8B-B14F-4D97-AF65-F5344CB8AC3E}">
         <p14:creationId xmlns:p14="http://schemas.microsoft.com/office/powerpoint/2010/main" val="3058809985"/>
+      </p:ext>
+    </p:extLst>
+  </p:cSld>
+  <p:clrMapOvr>
+    <a:masterClrMapping/>
+  </p:clrMapOvr>
+</p:notes>
+</file>
+
+<file path=ppt/notesSlides/notesSlide6.xml><?xml version="1.0" encoding="utf-8"?>
+<p:notes xmlns:a="http://schemas.openxmlformats.org/drawingml/2006/main" xmlns:r="http://schemas.openxmlformats.org/officeDocument/2006/relationships" xmlns:p="http://schemas.openxmlformats.org/presentationml/2006/main">
+  <p:cSld>
+    <p:spTree>
+      <p:nvGrpSpPr>
+        <p:cNvPr id="1" name=""/>
+        <p:cNvGrpSpPr/>
+        <p:nvPr/>
+      </p:nvGrpSpPr>
+      <p:grpSpPr>
+        <a:xfrm>
+          <a:off x="0" y="0"/>
+          <a:ext cx="0" cy="0"/>
+          <a:chOff x="0" y="0"/>
+          <a:chExt cx="0" cy="0"/>
+        </a:xfrm>
+      </p:grpSpPr>
+      <p:sp>
+        <p:nvSpPr>
+          <p:cNvPr id="2" name="Slide Image Placeholder 1"/>
+          <p:cNvSpPr>
+            <a:spLocks noGrp="1" noRot="1" noChangeAspect="1"/>
+          </p:cNvSpPr>
+          <p:nvPr>
+            <p:ph type="sldImg"/>
+          </p:nvPr>
+        </p:nvSpPr>
+        <p:spPr/>
+      </p:sp>
+      <p:sp>
+        <p:nvSpPr>
+          <p:cNvPr id="3" name="Notes Placeholder 2"/>
+          <p:cNvSpPr>
+            <a:spLocks noGrp="1"/>
+          </p:cNvSpPr>
+          <p:nvPr>
+            <p:ph type="body" idx="1"/>
+          </p:nvPr>
+        </p:nvSpPr>
+        <p:spPr/>
+        <p:txBody>
+          <a:bodyPr/>
+          <a:lstStyle/>
+          <a:p>
+            <a:endParaRPr lang="en-US"/>
+          </a:p>
+        </p:txBody>
+      </p:sp>
+      <p:sp>
+        <p:nvSpPr>
+          <p:cNvPr id="4" name="Slide Number Placeholder 3"/>
+          <p:cNvSpPr>
+            <a:spLocks noGrp="1"/>
+          </p:cNvSpPr>
+          <p:nvPr>
+            <p:ph type="sldNum" sz="quarter" idx="10"/>
+          </p:nvPr>
+        </p:nvSpPr>
+        <p:spPr/>
+        <p:txBody>
+          <a:bodyPr/>
+          <a:lstStyle/>
+          <a:p>
+            <a:fld id="{B39AF3DB-B6A1-2444-9DD8-53D016F8E638}" type="slidenum">
+              <a:rPr lang="pt-BR" smtClean="0">
+                <a:solidFill>
+                  <a:prstClr val="black"/>
+                </a:solidFill>
+              </a:rPr>
+              <a:pPr/>
+              <a:t>7</a:t>
+            </a:fld>
+            <a:endParaRPr lang="pt-BR">
+              <a:solidFill>
+                <a:prstClr val="black"/>
+              </a:solidFill>
+            </a:endParaRPr>
+          </a:p>
+        </p:txBody>
+      </p:sp>
+    </p:spTree>
+    <p:extLst>
+      <p:ext uri="{BB962C8B-B14F-4D97-AF65-F5344CB8AC3E}">
+        <p14:creationId xmlns:p14="http://schemas.microsoft.com/office/powerpoint/2010/main" val="2012847197"/>
+      </p:ext>
+    </p:extLst>
+  </p:cSld>
+  <p:clrMapOvr>
+    <a:masterClrMapping/>
+  </p:clrMapOvr>
+</p:notes>
+</file>
+
+<file path=ppt/notesSlides/notesSlide7.xml><?xml version="1.0" encoding="utf-8"?>
+<p:notes xmlns:a="http://schemas.openxmlformats.org/drawingml/2006/main" xmlns:r="http://schemas.openxmlformats.org/officeDocument/2006/relationships" xmlns:p="http://schemas.openxmlformats.org/presentationml/2006/main">
+  <p:cSld>
+    <p:spTree>
+      <p:nvGrpSpPr>
+        <p:cNvPr id="1" name=""/>
+        <p:cNvGrpSpPr/>
+        <p:nvPr/>
+      </p:nvGrpSpPr>
+      <p:grpSpPr>
+        <a:xfrm>
+          <a:off x="0" y="0"/>
+          <a:ext cx="0" cy="0"/>
+          <a:chOff x="0" y="0"/>
+          <a:chExt cx="0" cy="0"/>
+        </a:xfrm>
+      </p:grpSpPr>
+      <p:sp>
+        <p:nvSpPr>
+          <p:cNvPr id="2" name="Slide Image Placeholder 1"/>
+          <p:cNvSpPr>
+            <a:spLocks noGrp="1" noRot="1" noChangeAspect="1"/>
+          </p:cNvSpPr>
+          <p:nvPr>
+            <p:ph type="sldImg"/>
+          </p:nvPr>
+        </p:nvSpPr>
+        <p:spPr/>
+      </p:sp>
+      <p:sp>
+        <p:nvSpPr>
+          <p:cNvPr id="3" name="Notes Placeholder 2"/>
+          <p:cNvSpPr>
+            <a:spLocks noGrp="1"/>
+          </p:cNvSpPr>
+          <p:nvPr>
+            <p:ph type="body" idx="1"/>
+          </p:nvPr>
+        </p:nvSpPr>
+        <p:spPr/>
+        <p:txBody>
+          <a:bodyPr/>
+          <a:lstStyle/>
+          <a:p>
+            <a:endParaRPr lang="en-US"/>
+          </a:p>
+        </p:txBody>
+      </p:sp>
+      <p:sp>
+        <p:nvSpPr>
+          <p:cNvPr id="4" name="Slide Number Placeholder 3"/>
+          <p:cNvSpPr>
+            <a:spLocks noGrp="1"/>
+          </p:cNvSpPr>
+          <p:nvPr>
+            <p:ph type="sldNum" sz="quarter" idx="10"/>
+          </p:nvPr>
+        </p:nvSpPr>
+        <p:spPr/>
+        <p:txBody>
+          <a:bodyPr/>
+          <a:lstStyle/>
+          <a:p>
+            <a:fld id="{B39AF3DB-B6A1-2444-9DD8-53D016F8E638}" type="slidenum">
+              <a:rPr lang="pt-BR" smtClean="0">
+                <a:solidFill>
+                  <a:prstClr val="black"/>
+                </a:solidFill>
+              </a:rPr>
+              <a:pPr/>
+              <a:t>8</a:t>
+            </a:fld>
+            <a:endParaRPr lang="pt-BR">
+              <a:solidFill>
+                <a:prstClr val="black"/>
+              </a:solidFill>
+            </a:endParaRPr>
+          </a:p>
+        </p:txBody>
+      </p:sp>
+    </p:spTree>
+    <p:extLst>
+      <p:ext uri="{BB962C8B-B14F-4D97-AF65-F5344CB8AC3E}">
+        <p14:creationId xmlns:p14="http://schemas.microsoft.com/office/powerpoint/2010/main" val="3729790817"/>
       </p:ext>
     </p:extLst>
   </p:cSld>
@@ -31357,6 +31547,3315 @@
     <p:extLst>
       <p:ext uri="{BB962C8B-B14F-4D97-AF65-F5344CB8AC3E}">
         <p14:creationId xmlns:p14="http://schemas.microsoft.com/office/powerpoint/2010/main" val="237637447"/>
+      </p:ext>
+    </p:extLst>
+  </p:cSld>
+  <p:clrMapOvr>
+    <a:masterClrMapping/>
+  </p:clrMapOvr>
+</p:sld>
+</file>
+
+<file path=ppt/slides/slide7.xml><?xml version="1.0" encoding="utf-8"?>
+<p:sld xmlns:a="http://schemas.openxmlformats.org/drawingml/2006/main" xmlns:r="http://schemas.openxmlformats.org/officeDocument/2006/relationships" xmlns:p="http://schemas.openxmlformats.org/presentationml/2006/main">
+  <p:cSld>
+    <p:spTree>
+      <p:nvGrpSpPr>
+        <p:cNvPr id="1" name=""/>
+        <p:cNvGrpSpPr/>
+        <p:nvPr/>
+      </p:nvGrpSpPr>
+      <p:grpSpPr>
+        <a:xfrm>
+          <a:off x="0" y="0"/>
+          <a:ext cx="0" cy="0"/>
+          <a:chOff x="0" y="0"/>
+          <a:chExt cx="0" cy="0"/>
+        </a:xfrm>
+      </p:grpSpPr>
+      <p:sp>
+        <p:nvSpPr>
+          <p:cNvPr id="43" name="Rectangle 42"/>
+          <p:cNvSpPr/>
+          <p:nvPr/>
+        </p:nvSpPr>
+        <p:spPr>
+          <a:xfrm>
+            <a:off x="7810905" y="1369526"/>
+            <a:ext cx="5351116" cy="2095826"/>
+          </a:xfrm>
+          <a:prstGeom prst="rect">
+            <a:avLst/>
+          </a:prstGeom>
+          <a:noFill/>
+          <a:ln w="12700">
+            <a:solidFill>
+              <a:schemeClr val="bg1">
+                <a:lumMod val="50000"/>
+              </a:schemeClr>
+            </a:solidFill>
+          </a:ln>
+        </p:spPr>
+        <p:style>
+          <a:lnRef idx="2">
+            <a:schemeClr val="accent4"/>
+          </a:lnRef>
+          <a:fillRef idx="1">
+            <a:schemeClr val="lt1"/>
+          </a:fillRef>
+          <a:effectRef idx="0">
+            <a:schemeClr val="accent4"/>
+          </a:effectRef>
+          <a:fontRef idx="minor">
+            <a:schemeClr val="dk1"/>
+          </a:fontRef>
+        </p:style>
+        <p:txBody>
+          <a:bodyPr tIns="105844" rtlCol="0" anchor="t"/>
+          <a:lstStyle/>
+          <a:p>
+            <a:pPr defTabSz="672130">
+              <a:spcAft>
+                <a:spcPts val="882"/>
+              </a:spcAft>
+            </a:pPr>
+            <a:endParaRPr lang="pt-BR" sz="1470" dirty="0">
+              <a:solidFill>
+                <a:schemeClr val="tx1"/>
+              </a:solidFill>
+              <a:latin typeface="Calibri" panose="020F0502020204030204" pitchFamily="34" charset="0"/>
+              <a:cs typeface="Simplon BP Regular"/>
+            </a:endParaRPr>
+          </a:p>
+        </p:txBody>
+      </p:sp>
+      <p:sp>
+        <p:nvSpPr>
+          <p:cNvPr id="3" name="Title 2"/>
+          <p:cNvSpPr>
+            <a:spLocks noGrp="1"/>
+          </p:cNvSpPr>
+          <p:nvPr>
+            <p:ph type="title"/>
+          </p:nvPr>
+        </p:nvSpPr>
+        <p:spPr>
+          <a:xfrm>
+            <a:off x="469692" y="185232"/>
+            <a:ext cx="12098020" cy="800352"/>
+          </a:xfrm>
+        </p:spPr>
+        <p:txBody>
+          <a:bodyPr vert="horz" wrap="square" lIns="105844" tIns="0" rIns="105844" bIns="0" numCol="1" anchor="t" anchorCtr="0" compatLnSpc="1">
+            <a:prstTxWarp prst="textNoShape">
+              <a:avLst/>
+            </a:prstTxWarp>
+            <a:noAutofit/>
+          </a:bodyPr>
+          <a:lstStyle/>
+          <a:p>
+            <a:pPr algn="l">
+              <a:spcAft>
+                <a:spcPts val="882"/>
+              </a:spcAft>
+            </a:pPr>
+            <a:r>
+              <a:rPr lang="en-US" sz="2646" dirty="0">
+                <a:solidFill>
+                  <a:prstClr val="black"/>
+                </a:solidFill>
+                <a:latin typeface="Simplon Oi Headline"/>
+                <a:cs typeface="Simplon Oi Headline"/>
+              </a:rPr>
+              <a:t>SEMANA 5 – 25/03/2021</a:t>
+            </a:r>
+          </a:p>
+        </p:txBody>
+      </p:sp>
+      <p:sp>
+        <p:nvSpPr>
+          <p:cNvPr id="78" name="TextBox 118"/>
+          <p:cNvSpPr txBox="1"/>
+          <p:nvPr/>
+        </p:nvSpPr>
+        <p:spPr>
+          <a:xfrm>
+            <a:off x="11822773" y="576471"/>
+            <a:ext cx="899678" cy="179824"/>
+          </a:xfrm>
+          <a:prstGeom prst="rect">
+            <a:avLst/>
+          </a:prstGeom>
+          <a:noFill/>
+          <a:ln w="12700">
+            <a:noFill/>
+          </a:ln>
+        </p:spPr>
+        <p:style>
+          <a:lnRef idx="2">
+            <a:schemeClr val="accent4"/>
+          </a:lnRef>
+          <a:fillRef idx="1">
+            <a:schemeClr val="lt1"/>
+          </a:fillRef>
+          <a:effectRef idx="0">
+            <a:schemeClr val="accent4"/>
+          </a:effectRef>
+          <a:fontRef idx="minor">
+            <a:schemeClr val="dk1"/>
+          </a:fontRef>
+        </p:style>
+        <p:txBody>
+          <a:bodyPr wrap="none" lIns="52922" tIns="52922" rIns="52922" bIns="0" rtlCol="0" anchor="b"/>
+          <a:lstStyle>
+            <a:defPPr>
+              <a:defRPr lang="en-US"/>
+            </a:defPPr>
+            <a:lvl1pPr algn="ctr">
+              <a:defRPr sz="1000" b="1">
+                <a:latin typeface="Simplon BP Regular"/>
+                <a:cs typeface="Simplon BP Regular"/>
+              </a:defRPr>
+            </a:lvl1pPr>
+            <a:lvl2pPr>
+              <a:defRPr>
+                <a:solidFill>
+                  <a:schemeClr val="dk1"/>
+                </a:solidFill>
+              </a:defRPr>
+            </a:lvl2pPr>
+            <a:lvl3pPr>
+              <a:defRPr>
+                <a:solidFill>
+                  <a:schemeClr val="dk1"/>
+                </a:solidFill>
+              </a:defRPr>
+            </a:lvl3pPr>
+            <a:lvl4pPr>
+              <a:defRPr>
+                <a:solidFill>
+                  <a:schemeClr val="dk1"/>
+                </a:solidFill>
+              </a:defRPr>
+            </a:lvl4pPr>
+            <a:lvl5pPr>
+              <a:defRPr>
+                <a:solidFill>
+                  <a:schemeClr val="dk1"/>
+                </a:solidFill>
+              </a:defRPr>
+            </a:lvl5pPr>
+            <a:lvl6pPr>
+              <a:defRPr>
+                <a:solidFill>
+                  <a:schemeClr val="dk1"/>
+                </a:solidFill>
+              </a:defRPr>
+            </a:lvl6pPr>
+            <a:lvl7pPr>
+              <a:defRPr>
+                <a:solidFill>
+                  <a:schemeClr val="dk1"/>
+                </a:solidFill>
+              </a:defRPr>
+            </a:lvl7pPr>
+            <a:lvl8pPr>
+              <a:defRPr>
+                <a:solidFill>
+                  <a:schemeClr val="dk1"/>
+                </a:solidFill>
+              </a:defRPr>
+            </a:lvl8pPr>
+            <a:lvl9pPr>
+              <a:defRPr>
+                <a:solidFill>
+                  <a:schemeClr val="dk1"/>
+                </a:solidFill>
+              </a:defRPr>
+            </a:lvl9pPr>
+          </a:lstStyle>
+          <a:p>
+            <a:pPr defTabSz="672130"/>
+            <a:r>
+              <a:rPr lang="pt-BR" sz="1176" b="0" dirty="0">
+                <a:solidFill>
+                  <a:prstClr val="black"/>
+                </a:solidFill>
+                <a:latin typeface="Simplon BP Bold" pitchFamily="2" charset="0"/>
+              </a:rPr>
+              <a:t>Negócios</a:t>
+            </a:r>
+          </a:p>
+        </p:txBody>
+      </p:sp>
+      <p:sp>
+        <p:nvSpPr>
+          <p:cNvPr id="80" name="TextBox 123"/>
+          <p:cNvSpPr txBox="1"/>
+          <p:nvPr/>
+        </p:nvSpPr>
+        <p:spPr>
+          <a:xfrm>
+            <a:off x="10902774" y="589543"/>
+            <a:ext cx="899678" cy="179824"/>
+          </a:xfrm>
+          <a:prstGeom prst="rect">
+            <a:avLst/>
+          </a:prstGeom>
+          <a:noFill/>
+          <a:ln w="12700">
+            <a:noFill/>
+          </a:ln>
+        </p:spPr>
+        <p:style>
+          <a:lnRef idx="2">
+            <a:schemeClr val="accent4"/>
+          </a:lnRef>
+          <a:fillRef idx="1">
+            <a:schemeClr val="lt1"/>
+          </a:fillRef>
+          <a:effectRef idx="0">
+            <a:schemeClr val="accent4"/>
+          </a:effectRef>
+          <a:fontRef idx="minor">
+            <a:schemeClr val="dk1"/>
+          </a:fontRef>
+        </p:style>
+        <p:txBody>
+          <a:bodyPr wrap="none" lIns="52922" tIns="52922" rIns="52922" bIns="0" rtlCol="0" anchor="b"/>
+          <a:lstStyle>
+            <a:defPPr>
+              <a:defRPr lang="en-US"/>
+            </a:defPPr>
+            <a:lvl1pPr algn="ctr">
+              <a:defRPr sz="1000" b="1">
+                <a:latin typeface="Simplon BP Regular"/>
+                <a:cs typeface="Simplon BP Regular"/>
+              </a:defRPr>
+            </a:lvl1pPr>
+            <a:lvl2pPr>
+              <a:defRPr>
+                <a:solidFill>
+                  <a:schemeClr val="dk1"/>
+                </a:solidFill>
+              </a:defRPr>
+            </a:lvl2pPr>
+            <a:lvl3pPr>
+              <a:defRPr>
+                <a:solidFill>
+                  <a:schemeClr val="dk1"/>
+                </a:solidFill>
+              </a:defRPr>
+            </a:lvl3pPr>
+            <a:lvl4pPr>
+              <a:defRPr>
+                <a:solidFill>
+                  <a:schemeClr val="dk1"/>
+                </a:solidFill>
+              </a:defRPr>
+            </a:lvl4pPr>
+            <a:lvl5pPr>
+              <a:defRPr>
+                <a:solidFill>
+                  <a:schemeClr val="dk1"/>
+                </a:solidFill>
+              </a:defRPr>
+            </a:lvl5pPr>
+            <a:lvl6pPr>
+              <a:defRPr>
+                <a:solidFill>
+                  <a:schemeClr val="dk1"/>
+                </a:solidFill>
+              </a:defRPr>
+            </a:lvl6pPr>
+            <a:lvl7pPr>
+              <a:defRPr>
+                <a:solidFill>
+                  <a:schemeClr val="dk1"/>
+                </a:solidFill>
+              </a:defRPr>
+            </a:lvl7pPr>
+            <a:lvl8pPr>
+              <a:defRPr>
+                <a:solidFill>
+                  <a:schemeClr val="dk1"/>
+                </a:solidFill>
+              </a:defRPr>
+            </a:lvl8pPr>
+            <a:lvl9pPr>
+              <a:defRPr>
+                <a:solidFill>
+                  <a:schemeClr val="dk1"/>
+                </a:solidFill>
+              </a:defRPr>
+            </a:lvl9pPr>
+          </a:lstStyle>
+          <a:p>
+            <a:pPr defTabSz="672130"/>
+            <a:r>
+              <a:rPr lang="pt-BR" sz="1176" b="0" dirty="0">
+                <a:solidFill>
+                  <a:prstClr val="black"/>
+                </a:solidFill>
+                <a:latin typeface="Simplon BP Bold" pitchFamily="2" charset="0"/>
+              </a:rPr>
+              <a:t>Plataforma</a:t>
+            </a:r>
+          </a:p>
+        </p:txBody>
+      </p:sp>
+      <p:sp>
+        <p:nvSpPr>
+          <p:cNvPr id="82" name="TextBox 128"/>
+          <p:cNvSpPr txBox="1"/>
+          <p:nvPr/>
+        </p:nvSpPr>
+        <p:spPr>
+          <a:xfrm>
+            <a:off x="9844897" y="576471"/>
+            <a:ext cx="899678" cy="179824"/>
+          </a:xfrm>
+          <a:prstGeom prst="rect">
+            <a:avLst/>
+          </a:prstGeom>
+          <a:noFill/>
+          <a:ln w="12700">
+            <a:noFill/>
+          </a:ln>
+        </p:spPr>
+        <p:style>
+          <a:lnRef idx="2">
+            <a:schemeClr val="accent4"/>
+          </a:lnRef>
+          <a:fillRef idx="1">
+            <a:schemeClr val="lt1"/>
+          </a:fillRef>
+          <a:effectRef idx="0">
+            <a:schemeClr val="accent4"/>
+          </a:effectRef>
+          <a:fontRef idx="minor">
+            <a:schemeClr val="dk1"/>
+          </a:fontRef>
+        </p:style>
+        <p:txBody>
+          <a:bodyPr wrap="none" lIns="52922" tIns="52922" rIns="52922" bIns="0" rtlCol="0" anchor="b"/>
+          <a:lstStyle>
+            <a:defPPr>
+              <a:defRPr lang="en-US"/>
+            </a:defPPr>
+            <a:lvl1pPr algn="ctr">
+              <a:defRPr sz="1000" b="1">
+                <a:latin typeface="Simplon BP Regular"/>
+                <a:cs typeface="Simplon BP Regular"/>
+              </a:defRPr>
+            </a:lvl1pPr>
+            <a:lvl2pPr>
+              <a:defRPr>
+                <a:solidFill>
+                  <a:schemeClr val="dk1"/>
+                </a:solidFill>
+              </a:defRPr>
+            </a:lvl2pPr>
+            <a:lvl3pPr>
+              <a:defRPr>
+                <a:solidFill>
+                  <a:schemeClr val="dk1"/>
+                </a:solidFill>
+              </a:defRPr>
+            </a:lvl3pPr>
+            <a:lvl4pPr>
+              <a:defRPr>
+                <a:solidFill>
+                  <a:schemeClr val="dk1"/>
+                </a:solidFill>
+              </a:defRPr>
+            </a:lvl4pPr>
+            <a:lvl5pPr>
+              <a:defRPr>
+                <a:solidFill>
+                  <a:schemeClr val="dk1"/>
+                </a:solidFill>
+              </a:defRPr>
+            </a:lvl5pPr>
+            <a:lvl6pPr>
+              <a:defRPr>
+                <a:solidFill>
+                  <a:schemeClr val="dk1"/>
+                </a:solidFill>
+              </a:defRPr>
+            </a:lvl6pPr>
+            <a:lvl7pPr>
+              <a:defRPr>
+                <a:solidFill>
+                  <a:schemeClr val="dk1"/>
+                </a:solidFill>
+              </a:defRPr>
+            </a:lvl7pPr>
+            <a:lvl8pPr>
+              <a:defRPr>
+                <a:solidFill>
+                  <a:schemeClr val="dk1"/>
+                </a:solidFill>
+              </a:defRPr>
+            </a:lvl8pPr>
+            <a:lvl9pPr>
+              <a:defRPr>
+                <a:solidFill>
+                  <a:schemeClr val="dk1"/>
+                </a:solidFill>
+              </a:defRPr>
+            </a:lvl9pPr>
+          </a:lstStyle>
+          <a:p>
+            <a:pPr defTabSz="672130"/>
+            <a:r>
+              <a:rPr lang="pt-BR" sz="1176" b="0" dirty="0">
+                <a:solidFill>
+                  <a:prstClr val="black"/>
+                </a:solidFill>
+                <a:latin typeface="Simplon BP Bold" pitchFamily="2" charset="0"/>
+              </a:rPr>
+              <a:t>Back</a:t>
+            </a:r>
+          </a:p>
+        </p:txBody>
+      </p:sp>
+      <p:sp>
+        <p:nvSpPr>
+          <p:cNvPr id="84" name="TextBox 133"/>
+          <p:cNvSpPr txBox="1"/>
+          <p:nvPr/>
+        </p:nvSpPr>
+        <p:spPr>
+          <a:xfrm>
+            <a:off x="8934246" y="576471"/>
+            <a:ext cx="899678" cy="179824"/>
+          </a:xfrm>
+          <a:prstGeom prst="rect">
+            <a:avLst/>
+          </a:prstGeom>
+          <a:noFill/>
+          <a:ln w="12700">
+            <a:noFill/>
+          </a:ln>
+        </p:spPr>
+        <p:style>
+          <a:lnRef idx="2">
+            <a:schemeClr val="accent4"/>
+          </a:lnRef>
+          <a:fillRef idx="1">
+            <a:schemeClr val="lt1"/>
+          </a:fillRef>
+          <a:effectRef idx="0">
+            <a:schemeClr val="accent4"/>
+          </a:effectRef>
+          <a:fontRef idx="minor">
+            <a:schemeClr val="dk1"/>
+          </a:fontRef>
+        </p:style>
+        <p:txBody>
+          <a:bodyPr wrap="none" lIns="52922" tIns="52922" rIns="52922" bIns="0" rtlCol="0" anchor="b"/>
+          <a:lstStyle>
+            <a:defPPr>
+              <a:defRPr lang="en-US"/>
+            </a:defPPr>
+            <a:lvl1pPr algn="ctr">
+              <a:defRPr sz="1000" b="1">
+                <a:latin typeface="Simplon BP Regular"/>
+                <a:cs typeface="Simplon BP Regular"/>
+              </a:defRPr>
+            </a:lvl1pPr>
+            <a:lvl2pPr>
+              <a:defRPr>
+                <a:solidFill>
+                  <a:schemeClr val="dk1"/>
+                </a:solidFill>
+              </a:defRPr>
+            </a:lvl2pPr>
+            <a:lvl3pPr>
+              <a:defRPr>
+                <a:solidFill>
+                  <a:schemeClr val="dk1"/>
+                </a:solidFill>
+              </a:defRPr>
+            </a:lvl3pPr>
+            <a:lvl4pPr>
+              <a:defRPr>
+                <a:solidFill>
+                  <a:schemeClr val="dk1"/>
+                </a:solidFill>
+              </a:defRPr>
+            </a:lvl4pPr>
+            <a:lvl5pPr>
+              <a:defRPr>
+                <a:solidFill>
+                  <a:schemeClr val="dk1"/>
+                </a:solidFill>
+              </a:defRPr>
+            </a:lvl5pPr>
+            <a:lvl6pPr>
+              <a:defRPr>
+                <a:solidFill>
+                  <a:schemeClr val="dk1"/>
+                </a:solidFill>
+              </a:defRPr>
+            </a:lvl6pPr>
+            <a:lvl7pPr>
+              <a:defRPr>
+                <a:solidFill>
+                  <a:schemeClr val="dk1"/>
+                </a:solidFill>
+              </a:defRPr>
+            </a:lvl7pPr>
+            <a:lvl8pPr>
+              <a:defRPr>
+                <a:solidFill>
+                  <a:schemeClr val="dk1"/>
+                </a:solidFill>
+              </a:defRPr>
+            </a:lvl8pPr>
+            <a:lvl9pPr>
+              <a:defRPr>
+                <a:solidFill>
+                  <a:schemeClr val="dk1"/>
+                </a:solidFill>
+              </a:defRPr>
+            </a:lvl9pPr>
+          </a:lstStyle>
+          <a:p>
+            <a:pPr defTabSz="672130"/>
+            <a:r>
+              <a:rPr lang="pt-BR" sz="1176" b="0" dirty="0">
+                <a:solidFill>
+                  <a:prstClr val="black"/>
+                </a:solidFill>
+                <a:latin typeface="Simplon BP Bold" pitchFamily="2" charset="0"/>
+              </a:rPr>
+              <a:t>Front</a:t>
+            </a:r>
+          </a:p>
+        </p:txBody>
+      </p:sp>
+      <p:sp>
+        <p:nvSpPr>
+          <p:cNvPr id="88" name="Oval 134"/>
+          <p:cNvSpPr>
+            <a:spLocks noChangeAspect="1"/>
+          </p:cNvSpPr>
+          <p:nvPr/>
+        </p:nvSpPr>
+        <p:spPr>
+          <a:xfrm>
+            <a:off x="8470074" y="341965"/>
+            <a:ext cx="211404" cy="211689"/>
+          </a:xfrm>
+          <a:prstGeom prst="ellipse">
+            <a:avLst/>
+          </a:prstGeom>
+          <a:solidFill>
+            <a:srgbClr val="1BCF13"/>
+          </a:solidFill>
+          <a:ln w="12700">
+            <a:solidFill>
+              <a:schemeClr val="accent3"/>
+            </a:solidFill>
+          </a:ln>
+        </p:spPr>
+        <p:style>
+          <a:lnRef idx="2">
+            <a:schemeClr val="accent1">
+              <a:shade val="50000"/>
+            </a:schemeClr>
+          </a:lnRef>
+          <a:fillRef idx="1">
+            <a:schemeClr val="accent1"/>
+          </a:fillRef>
+          <a:effectRef idx="0">
+            <a:schemeClr val="accent1"/>
+          </a:effectRef>
+          <a:fontRef idx="minor">
+            <a:schemeClr val="lt1"/>
+          </a:fontRef>
+        </p:style>
+        <p:txBody>
+          <a:bodyPr wrap="none" lIns="52922" tIns="52922" rIns="52922" rtlCol="0" anchor="ctr"/>
+          <a:lstStyle/>
+          <a:p>
+            <a:pPr algn="ctr" defTabSz="672130"/>
+            <a:endParaRPr lang="en-US" sz="1176" dirty="0">
+              <a:solidFill>
+                <a:prstClr val="black"/>
+              </a:solidFill>
+              <a:latin typeface="Simplon BP Regular"/>
+              <a:cs typeface="Simplon BP Regular"/>
+            </a:endParaRPr>
+          </a:p>
+        </p:txBody>
+      </p:sp>
+      <p:sp>
+        <p:nvSpPr>
+          <p:cNvPr id="86" name="TextBox 138"/>
+          <p:cNvSpPr txBox="1"/>
+          <p:nvPr/>
+        </p:nvSpPr>
+        <p:spPr>
+          <a:xfrm>
+            <a:off x="8126053" y="576471"/>
+            <a:ext cx="899678" cy="179824"/>
+          </a:xfrm>
+          <a:prstGeom prst="rect">
+            <a:avLst/>
+          </a:prstGeom>
+          <a:noFill/>
+          <a:ln w="12700">
+            <a:noFill/>
+          </a:ln>
+        </p:spPr>
+        <p:style>
+          <a:lnRef idx="2">
+            <a:schemeClr val="accent4"/>
+          </a:lnRef>
+          <a:fillRef idx="1">
+            <a:schemeClr val="lt1"/>
+          </a:fillRef>
+          <a:effectRef idx="0">
+            <a:schemeClr val="accent4"/>
+          </a:effectRef>
+          <a:fontRef idx="minor">
+            <a:schemeClr val="dk1"/>
+          </a:fontRef>
+        </p:style>
+        <p:txBody>
+          <a:bodyPr wrap="none" lIns="52922" tIns="52922" rIns="52922" bIns="0" rtlCol="0" anchor="b"/>
+          <a:lstStyle>
+            <a:defPPr>
+              <a:defRPr lang="en-US"/>
+            </a:defPPr>
+            <a:lvl1pPr algn="ctr">
+              <a:defRPr sz="1000" b="1">
+                <a:latin typeface="Simplon BP Regular"/>
+                <a:cs typeface="Simplon BP Regular"/>
+              </a:defRPr>
+            </a:lvl1pPr>
+            <a:lvl2pPr>
+              <a:defRPr>
+                <a:solidFill>
+                  <a:schemeClr val="dk1"/>
+                </a:solidFill>
+              </a:defRPr>
+            </a:lvl2pPr>
+            <a:lvl3pPr>
+              <a:defRPr>
+                <a:solidFill>
+                  <a:schemeClr val="dk1"/>
+                </a:solidFill>
+              </a:defRPr>
+            </a:lvl3pPr>
+            <a:lvl4pPr>
+              <a:defRPr>
+                <a:solidFill>
+                  <a:schemeClr val="dk1"/>
+                </a:solidFill>
+              </a:defRPr>
+            </a:lvl4pPr>
+            <a:lvl5pPr>
+              <a:defRPr>
+                <a:solidFill>
+                  <a:schemeClr val="dk1"/>
+                </a:solidFill>
+              </a:defRPr>
+            </a:lvl5pPr>
+            <a:lvl6pPr>
+              <a:defRPr>
+                <a:solidFill>
+                  <a:schemeClr val="dk1"/>
+                </a:solidFill>
+              </a:defRPr>
+            </a:lvl6pPr>
+            <a:lvl7pPr>
+              <a:defRPr>
+                <a:solidFill>
+                  <a:schemeClr val="dk1"/>
+                </a:solidFill>
+              </a:defRPr>
+            </a:lvl7pPr>
+            <a:lvl8pPr>
+              <a:defRPr>
+                <a:solidFill>
+                  <a:schemeClr val="dk1"/>
+                </a:solidFill>
+              </a:defRPr>
+            </a:lvl8pPr>
+            <a:lvl9pPr>
+              <a:defRPr>
+                <a:solidFill>
+                  <a:schemeClr val="dk1"/>
+                </a:solidFill>
+              </a:defRPr>
+            </a:lvl9pPr>
+          </a:lstStyle>
+          <a:p>
+            <a:pPr defTabSz="672130"/>
+            <a:r>
+              <a:rPr lang="en-US" sz="1176" b="0" dirty="0" err="1">
+                <a:solidFill>
+                  <a:prstClr val="black"/>
+                </a:solidFill>
+                <a:latin typeface="Simplon BP Bold" pitchFamily="2" charset="0"/>
+              </a:rPr>
+              <a:t>Equipe</a:t>
+            </a:r>
+            <a:endParaRPr lang="en-US" sz="1176" b="0" dirty="0">
+              <a:solidFill>
+                <a:prstClr val="black"/>
+              </a:solidFill>
+              <a:latin typeface="Simplon BP Bold" pitchFamily="2" charset="0"/>
+            </a:endParaRPr>
+          </a:p>
+        </p:txBody>
+      </p:sp>
+      <p:sp>
+        <p:nvSpPr>
+          <p:cNvPr id="64" name="Retângulo 63"/>
+          <p:cNvSpPr/>
+          <p:nvPr/>
+        </p:nvSpPr>
+        <p:spPr>
+          <a:xfrm>
+            <a:off x="469692" y="559912"/>
+            <a:ext cx="7186474" cy="239087"/>
+          </a:xfrm>
+          <a:prstGeom prst="rect">
+            <a:avLst/>
+          </a:prstGeom>
+          <a:solidFill>
+            <a:schemeClr val="bg1">
+              <a:lumMod val="85000"/>
+            </a:schemeClr>
+          </a:solidFill>
+        </p:spPr>
+        <p:txBody>
+          <a:bodyPr vert="horz" lIns="134422" tIns="67211" rIns="134422" bIns="67211" rtlCol="0" anchor="ctr"/>
+          <a:lstStyle/>
+          <a:p>
+            <a:pPr defTabSz="672130"/>
+            <a:r>
+              <a:rPr lang="en-US" sz="1544" dirty="0">
+                <a:latin typeface="Simplon Oi Headline" charset="0"/>
+                <a:ea typeface="Simplon Oi Headline" charset="0"/>
+                <a:cs typeface="Simplon Oi Headline" charset="0"/>
+              </a:rPr>
+              <a:t>PROGRESSOS</a:t>
+            </a:r>
+            <a:endParaRPr lang="pt-BR" sz="1544" dirty="0">
+              <a:latin typeface="Simplon Oi Headline" charset="0"/>
+              <a:ea typeface="Simplon Oi Headline" charset="0"/>
+              <a:cs typeface="Simplon Oi Headline" charset="0"/>
+            </a:endParaRPr>
+          </a:p>
+        </p:txBody>
+      </p:sp>
+      <p:sp>
+        <p:nvSpPr>
+          <p:cNvPr id="65" name="Retângulo 64"/>
+          <p:cNvSpPr/>
+          <p:nvPr/>
+        </p:nvSpPr>
+        <p:spPr>
+          <a:xfrm>
+            <a:off x="7810906" y="927661"/>
+            <a:ext cx="5351116" cy="449162"/>
+          </a:xfrm>
+          <a:prstGeom prst="rect">
+            <a:avLst/>
+          </a:prstGeom>
+          <a:solidFill>
+            <a:schemeClr val="bg1">
+              <a:lumMod val="85000"/>
+            </a:schemeClr>
+          </a:solidFill>
+        </p:spPr>
+        <p:txBody>
+          <a:bodyPr vert="horz" lIns="134422" tIns="67211" rIns="134422" bIns="67211" rtlCol="0" anchor="ctr"/>
+          <a:lstStyle/>
+          <a:p>
+            <a:pPr defTabSz="672130"/>
+            <a:r>
+              <a:rPr lang="pt-BR" sz="1544" dirty="0">
+                <a:latin typeface="Simplon Oi Headline" charset="0"/>
+                <a:ea typeface="Simplon Oi Headline" charset="0"/>
+                <a:cs typeface="Simplon Oi Headline" charset="0"/>
+              </a:rPr>
+              <a:t>Pontos atenção/ Principais Riscos</a:t>
+            </a:r>
+          </a:p>
+        </p:txBody>
+      </p:sp>
+      <p:sp>
+        <p:nvSpPr>
+          <p:cNvPr id="66" name="Retângulo 65"/>
+          <p:cNvSpPr/>
+          <p:nvPr/>
+        </p:nvSpPr>
+        <p:spPr>
+          <a:xfrm>
+            <a:off x="469692" y="4982921"/>
+            <a:ext cx="11854636" cy="233106"/>
+          </a:xfrm>
+          <a:prstGeom prst="rect">
+            <a:avLst/>
+          </a:prstGeom>
+          <a:solidFill>
+            <a:schemeClr val="bg1">
+              <a:lumMod val="85000"/>
+            </a:schemeClr>
+          </a:solidFill>
+        </p:spPr>
+        <p:txBody>
+          <a:bodyPr vert="horz" lIns="134422" tIns="67211" rIns="134422" bIns="67211" rtlCol="0" anchor="ctr"/>
+          <a:lstStyle/>
+          <a:p>
+            <a:pPr defTabSz="672130"/>
+            <a:r>
+              <a:rPr lang="pt-BR" sz="1544" dirty="0">
+                <a:latin typeface="Simplon Oi Headline" charset="0"/>
+                <a:ea typeface="Simplon Oi Headline" charset="0"/>
+                <a:cs typeface="Simplon Oi Headline" charset="0"/>
+              </a:rPr>
+              <a:t>Próximos Passos/ Decisões a tomar</a:t>
+            </a:r>
+          </a:p>
+        </p:txBody>
+      </p:sp>
+      <p:sp>
+        <p:nvSpPr>
+          <p:cNvPr id="63" name="Rectangle 37"/>
+          <p:cNvSpPr/>
+          <p:nvPr/>
+        </p:nvSpPr>
+        <p:spPr>
+          <a:xfrm>
+            <a:off x="469132" y="818463"/>
+            <a:ext cx="7186474" cy="4078796"/>
+          </a:xfrm>
+          <a:prstGeom prst="rect">
+            <a:avLst/>
+          </a:prstGeom>
+          <a:noFill/>
+          <a:ln w="12700">
+            <a:solidFill>
+              <a:schemeClr val="bg1">
+                <a:lumMod val="50000"/>
+              </a:schemeClr>
+            </a:solidFill>
+          </a:ln>
+        </p:spPr>
+        <p:style>
+          <a:lnRef idx="2">
+            <a:schemeClr val="accent4"/>
+          </a:lnRef>
+          <a:fillRef idx="1">
+            <a:schemeClr val="lt1"/>
+          </a:fillRef>
+          <a:effectRef idx="0">
+            <a:schemeClr val="accent4"/>
+          </a:effectRef>
+          <a:fontRef idx="minor">
+            <a:schemeClr val="dk1"/>
+          </a:fontRef>
+        </p:style>
+        <p:txBody>
+          <a:bodyPr tIns="105844" rtlCol="0" anchor="t"/>
+          <a:lstStyle/>
+          <a:p>
+            <a:pPr marL="252049" indent="-252049" fontAlgn="base">
+              <a:spcBef>
+                <a:spcPct val="0"/>
+              </a:spcBef>
+              <a:buFont typeface="Wingdings" panose="05000000000000000000" pitchFamily="2" charset="2"/>
+              <a:buChar char="ü"/>
+              <a:defRPr/>
+            </a:pPr>
+            <a:r>
+              <a:rPr lang="pt-BR" sz="1600" b="1" dirty="0">
+                <a:solidFill>
+                  <a:schemeClr val="tx1"/>
+                </a:solidFill>
+                <a:latin typeface="Arial" panose="020B0604020202020204" pitchFamily="34" charset="0"/>
+                <a:cs typeface="Arial" panose="020B0604020202020204" pitchFamily="34" charset="0"/>
+              </a:rPr>
+              <a:t>Finalizamos o desenvolvimento do SITE INSTITUCIONAL.</a:t>
+            </a:r>
+          </a:p>
+          <a:p>
+            <a:pPr marL="252049" indent="-252049" fontAlgn="base">
+              <a:spcBef>
+                <a:spcPct val="0"/>
+              </a:spcBef>
+              <a:buFont typeface="Wingdings" panose="05000000000000000000" pitchFamily="2" charset="2"/>
+              <a:buChar char="ü"/>
+              <a:defRPr/>
+            </a:pPr>
+            <a:r>
+              <a:rPr lang="pt-BR" sz="1600" b="1" dirty="0">
+                <a:solidFill>
+                  <a:schemeClr val="tx1"/>
+                </a:solidFill>
+                <a:latin typeface="Arial" panose="020B0604020202020204" pitchFamily="34" charset="0"/>
+                <a:cs typeface="Arial" panose="020B0604020202020204" pitchFamily="34" charset="0"/>
+              </a:rPr>
+              <a:t>Desenvolvemos o script da tabela de categoria.</a:t>
+            </a:r>
+          </a:p>
+          <a:p>
+            <a:pPr marL="252049" indent="-252049" fontAlgn="base">
+              <a:spcBef>
+                <a:spcPct val="0"/>
+              </a:spcBef>
+              <a:buFont typeface="Wingdings" panose="05000000000000000000" pitchFamily="2" charset="2"/>
+              <a:buChar char="ü"/>
+              <a:defRPr/>
+            </a:pPr>
+            <a:r>
+              <a:rPr lang="pt-BR" sz="1600" b="1" dirty="0">
+                <a:solidFill>
+                  <a:schemeClr val="tx1"/>
+                </a:solidFill>
+                <a:latin typeface="Arial" panose="020B0604020202020204" pitchFamily="34" charset="0"/>
+                <a:cs typeface="Arial" panose="020B0604020202020204" pitchFamily="34" charset="0"/>
+              </a:rPr>
+              <a:t>Desenvolvemos o script da tabela de alimentos.</a:t>
+            </a:r>
+          </a:p>
+          <a:p>
+            <a:pPr marL="252049" indent="-252049" fontAlgn="base">
+              <a:spcBef>
+                <a:spcPct val="0"/>
+              </a:spcBef>
+              <a:buFont typeface="Wingdings" panose="05000000000000000000" pitchFamily="2" charset="2"/>
+              <a:buChar char="ü"/>
+              <a:defRPr/>
+            </a:pPr>
+            <a:r>
+              <a:rPr lang="pt-BR" sz="1600" b="1" dirty="0">
+                <a:solidFill>
+                  <a:schemeClr val="tx1"/>
+                </a:solidFill>
+                <a:latin typeface="Arial" panose="020B0604020202020204" pitchFamily="34" charset="0"/>
+                <a:cs typeface="Arial" panose="020B0604020202020204" pitchFamily="34" charset="0"/>
+              </a:rPr>
+              <a:t>Finalizamos a tela de Login e Cadastro.</a:t>
+            </a:r>
+          </a:p>
+          <a:p>
+            <a:pPr fontAlgn="base">
+              <a:spcBef>
+                <a:spcPct val="0"/>
+              </a:spcBef>
+              <a:defRPr/>
+            </a:pPr>
+            <a:endParaRPr lang="pt-BR" sz="1600" b="1" dirty="0">
+              <a:solidFill>
+                <a:schemeClr val="tx1"/>
+              </a:solidFill>
+              <a:latin typeface="Arial" panose="020B0604020202020204" pitchFamily="34" charset="0"/>
+              <a:cs typeface="Arial" panose="020B0604020202020204" pitchFamily="34" charset="0"/>
+            </a:endParaRPr>
+          </a:p>
+          <a:p>
+            <a:pPr marL="0" lvl="1" defTabSz="672130"/>
+            <a:endParaRPr lang="pt-BR" sz="1800" b="1" dirty="0">
+              <a:solidFill>
+                <a:schemeClr val="tx1"/>
+              </a:solidFill>
+              <a:latin typeface="Calibri" panose="020F0502020204030204" pitchFamily="34" charset="0"/>
+              <a:cs typeface="Simplon BP Regular"/>
+            </a:endParaRPr>
+          </a:p>
+        </p:txBody>
+      </p:sp>
+      <p:sp>
+        <p:nvSpPr>
+          <p:cNvPr id="2" name="Rectangle 43">
+            <a:extLst>
+              <a:ext uri="{FF2B5EF4-FFF2-40B4-BE49-F238E27FC236}">
+                <a16:creationId xmlns:a16="http://schemas.microsoft.com/office/drawing/2014/main" id="{B15BA19F-C787-4E6A-ADAB-C0DFF09C66A8}"/>
+              </a:ext>
+            </a:extLst>
+          </p:cNvPr>
+          <p:cNvSpPr>
+            <a:spLocks/>
+          </p:cNvSpPr>
+          <p:nvPr/>
+        </p:nvSpPr>
+        <p:spPr>
+          <a:xfrm>
+            <a:off x="463325" y="5216027"/>
+            <a:ext cx="11854636" cy="2226277"/>
+          </a:xfrm>
+          <a:prstGeom prst="rect">
+            <a:avLst/>
+          </a:prstGeom>
+          <a:noFill/>
+          <a:ln w="12700">
+            <a:solidFill>
+              <a:schemeClr val="bg1">
+                <a:lumMod val="50000"/>
+              </a:schemeClr>
+            </a:solidFill>
+          </a:ln>
+        </p:spPr>
+        <p:style>
+          <a:lnRef idx="2">
+            <a:schemeClr val="accent4"/>
+          </a:lnRef>
+          <a:fillRef idx="1">
+            <a:schemeClr val="lt1"/>
+          </a:fillRef>
+          <a:effectRef idx="0">
+            <a:schemeClr val="accent4"/>
+          </a:effectRef>
+          <a:fontRef idx="minor">
+            <a:schemeClr val="dk1"/>
+          </a:fontRef>
+        </p:style>
+        <p:txBody>
+          <a:bodyPr wrap="square" tIns="105844" numCol="3" rtlCol="0" anchor="ctr"/>
+          <a:lstStyle/>
+          <a:p>
+            <a:pPr marL="0" lvl="1" defTabSz="672130"/>
+            <a:r>
+              <a:rPr lang="pt-BR" sz="1400" b="1" dirty="0">
+                <a:solidFill>
+                  <a:schemeClr val="tx1"/>
+                </a:solidFill>
+                <a:latin typeface="Arial" panose="020B0604020202020204" pitchFamily="34" charset="0"/>
+                <a:cs typeface="Arial" panose="020B0604020202020204" pitchFamily="34" charset="0"/>
+              </a:rPr>
+              <a:t>Frente </a:t>
+            </a:r>
+            <a:r>
+              <a:rPr lang="pt-BR" sz="1400" b="1" dirty="0" err="1">
+                <a:solidFill>
+                  <a:schemeClr val="tx1"/>
+                </a:solidFill>
+                <a:latin typeface="Arial" panose="020B0604020202020204" pitchFamily="34" charset="0"/>
+                <a:cs typeface="Arial" panose="020B0604020202020204" pitchFamily="34" charset="0"/>
+              </a:rPr>
+              <a:t>Backend</a:t>
+            </a:r>
+            <a:endParaRPr lang="pt-BR" sz="1400" b="1" dirty="0">
+              <a:solidFill>
+                <a:schemeClr val="tx1"/>
+              </a:solidFill>
+              <a:latin typeface="Arial" panose="020B0604020202020204" pitchFamily="34" charset="0"/>
+              <a:cs typeface="Arial" panose="020B0604020202020204" pitchFamily="34" charset="0"/>
+            </a:endParaRPr>
+          </a:p>
+          <a:p>
+            <a:pPr marL="285750" lvl="1" indent="-285750" defTabSz="672130">
+              <a:buFont typeface="Wingdings" panose="05000000000000000000" pitchFamily="2" charset="2"/>
+              <a:buChar char="§"/>
+            </a:pPr>
+            <a:r>
+              <a:rPr lang="pt-BR" sz="1400" b="1" dirty="0">
+                <a:solidFill>
+                  <a:schemeClr val="tx1"/>
+                </a:solidFill>
+                <a:latin typeface="Arial" panose="020B0604020202020204" pitchFamily="34" charset="0"/>
+                <a:cs typeface="Arial" panose="020B0604020202020204" pitchFamily="34" charset="0"/>
+              </a:rPr>
+              <a:t>Arquitetura inicial da API</a:t>
+            </a:r>
+          </a:p>
+          <a:p>
+            <a:pPr marL="285750" lvl="1" indent="-285750" defTabSz="672130">
+              <a:buFont typeface="Wingdings" panose="05000000000000000000" pitchFamily="2" charset="2"/>
+              <a:buChar char="§"/>
+            </a:pPr>
+            <a:r>
+              <a:rPr lang="pt-BR" sz="1400" b="1" dirty="0">
+                <a:solidFill>
+                  <a:schemeClr val="tx1"/>
+                </a:solidFill>
+                <a:latin typeface="Arial" panose="020B0604020202020204" pitchFamily="34" charset="0"/>
+                <a:cs typeface="Arial" panose="020B0604020202020204" pitchFamily="34" charset="0"/>
+              </a:rPr>
+              <a:t>Conexão com SQL</a:t>
+            </a:r>
+          </a:p>
+          <a:p>
+            <a:pPr marL="0" lvl="1" defTabSz="672130"/>
+            <a:endParaRPr lang="pt-BR" sz="1400" b="1" dirty="0">
+              <a:solidFill>
+                <a:schemeClr val="tx1"/>
+              </a:solidFill>
+              <a:latin typeface="Arial" panose="020B0604020202020204" pitchFamily="34" charset="0"/>
+              <a:cs typeface="Arial" panose="020B0604020202020204" pitchFamily="34" charset="0"/>
+            </a:endParaRPr>
+          </a:p>
+          <a:p>
+            <a:pPr marL="0" lvl="1" defTabSz="672130"/>
+            <a:r>
+              <a:rPr lang="pt-BR" sz="1400" b="1" dirty="0">
+                <a:solidFill>
+                  <a:schemeClr val="tx1"/>
+                </a:solidFill>
+                <a:latin typeface="Arial" panose="020B0604020202020204" pitchFamily="34" charset="0"/>
+                <a:cs typeface="Arial" panose="020B0604020202020204" pitchFamily="34" charset="0"/>
+              </a:rPr>
+              <a:t>Frente Front-</a:t>
+            </a:r>
+            <a:r>
+              <a:rPr lang="pt-BR" sz="1400" b="1" dirty="0" err="1">
+                <a:solidFill>
+                  <a:schemeClr val="tx1"/>
+                </a:solidFill>
+                <a:latin typeface="Arial" panose="020B0604020202020204" pitchFamily="34" charset="0"/>
+                <a:cs typeface="Arial" panose="020B0604020202020204" pitchFamily="34" charset="0"/>
+              </a:rPr>
+              <a:t>end</a:t>
+            </a:r>
+            <a:endParaRPr lang="pt-BR" sz="1400" b="1" dirty="0">
+              <a:solidFill>
+                <a:schemeClr val="tx1"/>
+              </a:solidFill>
+              <a:latin typeface="Arial" panose="020B0604020202020204" pitchFamily="34" charset="0"/>
+              <a:cs typeface="Arial" panose="020B0604020202020204" pitchFamily="34" charset="0"/>
+            </a:endParaRPr>
+          </a:p>
+          <a:p>
+            <a:pPr marL="252049" lvl="1" indent="-252049">
+              <a:buFont typeface="Wingdings" panose="05000000000000000000" pitchFamily="2" charset="2"/>
+              <a:buChar char="§"/>
+            </a:pPr>
+            <a:r>
+              <a:rPr lang="pt-BR" sz="1400" b="1" dirty="0">
+                <a:solidFill>
+                  <a:schemeClr val="tx1"/>
+                </a:solidFill>
+                <a:latin typeface="Arial" panose="020B0604020202020204" pitchFamily="34" charset="0"/>
+                <a:cs typeface="Arial" panose="020B0604020202020204" pitchFamily="34" charset="0"/>
+              </a:rPr>
+              <a:t>Finalizar 4 telas existentes no sistema.</a:t>
+            </a:r>
+          </a:p>
+          <a:p>
+            <a:pPr marL="0" lvl="1" defTabSz="672130"/>
+            <a:endParaRPr lang="pt-BR" sz="1600" b="1" dirty="0">
+              <a:solidFill>
+                <a:schemeClr val="tx1"/>
+              </a:solidFill>
+              <a:latin typeface="Calibri" panose="020F0502020204030204" pitchFamily="34" charset="0"/>
+              <a:cs typeface="Simplon BP Regular"/>
+            </a:endParaRPr>
+          </a:p>
+          <a:p>
+            <a:pPr marL="0" lvl="1" defTabSz="672130"/>
+            <a:r>
+              <a:rPr lang="pt-BR" sz="1400" b="1" dirty="0">
+                <a:solidFill>
+                  <a:schemeClr val="tx1"/>
+                </a:solidFill>
+                <a:latin typeface="Arial" panose="020B0604020202020204" pitchFamily="34" charset="0"/>
+                <a:cs typeface="Arial" panose="020B0604020202020204" pitchFamily="34" charset="0"/>
+              </a:rPr>
+              <a:t>Frente Negócios</a:t>
+            </a:r>
+          </a:p>
+          <a:p>
+            <a:pPr marL="285750" lvl="1" indent="-285750" defTabSz="672130">
+              <a:buFont typeface="Wingdings" panose="05000000000000000000" pitchFamily="2" charset="2"/>
+              <a:buChar char="§"/>
+            </a:pPr>
+            <a:r>
+              <a:rPr lang="pt-BR" sz="1400" b="1" dirty="0">
+                <a:solidFill>
+                  <a:schemeClr val="tx1"/>
+                </a:solidFill>
+                <a:latin typeface="Arial" panose="020B0604020202020204" pitchFamily="34" charset="0"/>
+                <a:cs typeface="Arial" panose="020B0604020202020204" pitchFamily="34" charset="0"/>
+              </a:rPr>
+              <a:t>Diagrama de solução de software</a:t>
+            </a:r>
+          </a:p>
+          <a:p>
+            <a:pPr marL="0" lvl="1" defTabSz="672130"/>
+            <a:endParaRPr lang="pt-BR" sz="1400" b="1" dirty="0">
+              <a:solidFill>
+                <a:schemeClr val="tx1"/>
+              </a:solidFill>
+              <a:latin typeface="Arial" panose="020B0604020202020204" pitchFamily="34" charset="0"/>
+              <a:cs typeface="Arial" panose="020B0604020202020204" pitchFamily="34" charset="0"/>
+            </a:endParaRPr>
+          </a:p>
+        </p:txBody>
+      </p:sp>
+      <p:sp>
+        <p:nvSpPr>
+          <p:cNvPr id="5" name="Retângulo 4">
+            <a:extLst>
+              <a:ext uri="{FF2B5EF4-FFF2-40B4-BE49-F238E27FC236}">
+                <a16:creationId xmlns:a16="http://schemas.microsoft.com/office/drawing/2014/main" id="{A1C14918-6027-46B3-96BF-C5F7FDEC3276}"/>
+              </a:ext>
+            </a:extLst>
+          </p:cNvPr>
+          <p:cNvSpPr/>
+          <p:nvPr/>
+        </p:nvSpPr>
+        <p:spPr>
+          <a:xfrm>
+            <a:off x="8017619" y="180231"/>
+            <a:ext cx="4937689" cy="618769"/>
+          </a:xfrm>
+          <a:prstGeom prst="rect">
+            <a:avLst/>
+          </a:prstGeom>
+          <a:noFill/>
+          <a:ln w="6350">
+            <a:solidFill>
+              <a:schemeClr val="bg1">
+                <a:lumMod val="75000"/>
+              </a:schemeClr>
+            </a:solidFill>
+          </a:ln>
+        </p:spPr>
+        <p:style>
+          <a:lnRef idx="2">
+            <a:schemeClr val="accent1">
+              <a:shade val="50000"/>
+            </a:schemeClr>
+          </a:lnRef>
+          <a:fillRef idx="1">
+            <a:schemeClr val="accent1"/>
+          </a:fillRef>
+          <a:effectRef idx="0">
+            <a:schemeClr val="accent1"/>
+          </a:effectRef>
+          <a:fontRef idx="minor">
+            <a:schemeClr val="lt1"/>
+          </a:fontRef>
+        </p:style>
+        <p:txBody>
+          <a:bodyPr rtlCol="0" anchor="ctr"/>
+          <a:lstStyle/>
+          <a:p>
+            <a:pPr algn="ctr"/>
+            <a:endParaRPr lang="pt-BR"/>
+          </a:p>
+        </p:txBody>
+      </p:sp>
+      <p:sp>
+        <p:nvSpPr>
+          <p:cNvPr id="8" name="TextBox 138">
+            <a:extLst>
+              <a:ext uri="{FF2B5EF4-FFF2-40B4-BE49-F238E27FC236}">
+                <a16:creationId xmlns:a16="http://schemas.microsoft.com/office/drawing/2014/main" id="{5CE7D08C-795B-4BF1-97F6-F9773F4E9F4C}"/>
+              </a:ext>
+            </a:extLst>
+          </p:cNvPr>
+          <p:cNvSpPr txBox="1"/>
+          <p:nvPr/>
+        </p:nvSpPr>
+        <p:spPr>
+          <a:xfrm>
+            <a:off x="9715810" y="51570"/>
+            <a:ext cx="1478088" cy="211688"/>
+          </a:xfrm>
+          <a:prstGeom prst="rect">
+            <a:avLst/>
+          </a:prstGeom>
+          <a:solidFill>
+            <a:schemeClr val="bg1"/>
+          </a:solidFill>
+          <a:ln w="12700">
+            <a:noFill/>
+          </a:ln>
+        </p:spPr>
+        <p:style>
+          <a:lnRef idx="2">
+            <a:schemeClr val="accent4"/>
+          </a:lnRef>
+          <a:fillRef idx="1">
+            <a:schemeClr val="lt1"/>
+          </a:fillRef>
+          <a:effectRef idx="0">
+            <a:schemeClr val="accent4"/>
+          </a:effectRef>
+          <a:fontRef idx="minor">
+            <a:schemeClr val="dk1"/>
+          </a:fontRef>
+        </p:style>
+        <p:txBody>
+          <a:bodyPr wrap="none" lIns="52922" tIns="52922" rIns="52922" bIns="0" rtlCol="0" anchor="b"/>
+          <a:lstStyle>
+            <a:defPPr>
+              <a:defRPr lang="en-US"/>
+            </a:defPPr>
+            <a:lvl1pPr algn="ctr">
+              <a:defRPr sz="1000" b="1">
+                <a:latin typeface="Simplon BP Regular"/>
+                <a:cs typeface="Simplon BP Regular"/>
+              </a:defRPr>
+            </a:lvl1pPr>
+            <a:lvl2pPr>
+              <a:defRPr>
+                <a:solidFill>
+                  <a:schemeClr val="dk1"/>
+                </a:solidFill>
+              </a:defRPr>
+            </a:lvl2pPr>
+            <a:lvl3pPr>
+              <a:defRPr>
+                <a:solidFill>
+                  <a:schemeClr val="dk1"/>
+                </a:solidFill>
+              </a:defRPr>
+            </a:lvl3pPr>
+            <a:lvl4pPr>
+              <a:defRPr>
+                <a:solidFill>
+                  <a:schemeClr val="dk1"/>
+                </a:solidFill>
+              </a:defRPr>
+            </a:lvl4pPr>
+            <a:lvl5pPr>
+              <a:defRPr>
+                <a:solidFill>
+                  <a:schemeClr val="dk1"/>
+                </a:solidFill>
+              </a:defRPr>
+            </a:lvl5pPr>
+            <a:lvl6pPr>
+              <a:defRPr>
+                <a:solidFill>
+                  <a:schemeClr val="dk1"/>
+                </a:solidFill>
+              </a:defRPr>
+            </a:lvl6pPr>
+            <a:lvl7pPr>
+              <a:defRPr>
+                <a:solidFill>
+                  <a:schemeClr val="dk1"/>
+                </a:solidFill>
+              </a:defRPr>
+            </a:lvl7pPr>
+            <a:lvl8pPr>
+              <a:defRPr>
+                <a:solidFill>
+                  <a:schemeClr val="dk1"/>
+                </a:solidFill>
+              </a:defRPr>
+            </a:lvl8pPr>
+            <a:lvl9pPr>
+              <a:defRPr>
+                <a:solidFill>
+                  <a:schemeClr val="dk1"/>
+                </a:solidFill>
+              </a:defRPr>
+            </a:lvl9pPr>
+          </a:lstStyle>
+          <a:p>
+            <a:pPr defTabSz="672130"/>
+            <a:r>
+              <a:rPr lang="en-US" sz="1176" b="0" dirty="0">
+                <a:solidFill>
+                  <a:prstClr val="black"/>
+                </a:solidFill>
+                <a:latin typeface="Simplon BP Bold" pitchFamily="2" charset="0"/>
+              </a:rPr>
+              <a:t>    </a:t>
+            </a:r>
+            <a:r>
+              <a:rPr lang="en-US" sz="1176" b="0" dirty="0" err="1">
+                <a:solidFill>
+                  <a:prstClr val="black"/>
+                </a:solidFill>
+                <a:latin typeface="Simplon BP Bold" pitchFamily="2" charset="0"/>
+              </a:rPr>
+              <a:t>Farol</a:t>
+            </a:r>
+            <a:r>
+              <a:rPr lang="en-US" sz="1176" b="0" dirty="0">
+                <a:solidFill>
+                  <a:prstClr val="black"/>
+                </a:solidFill>
+                <a:latin typeface="Simplon BP Bold" pitchFamily="2" charset="0"/>
+              </a:rPr>
+              <a:t> do </a:t>
+            </a:r>
+            <a:r>
+              <a:rPr lang="en-US" sz="1176" b="0" dirty="0" err="1">
+                <a:solidFill>
+                  <a:prstClr val="black"/>
+                </a:solidFill>
+                <a:latin typeface="Simplon BP Bold" pitchFamily="2" charset="0"/>
+              </a:rPr>
+              <a:t>Projeto</a:t>
+            </a:r>
+            <a:r>
+              <a:rPr lang="en-US" sz="1176" b="0" dirty="0">
+                <a:solidFill>
+                  <a:prstClr val="black"/>
+                </a:solidFill>
+                <a:latin typeface="Simplon BP Bold" pitchFamily="2" charset="0"/>
+              </a:rPr>
+              <a:t>   </a:t>
+            </a:r>
+          </a:p>
+        </p:txBody>
+      </p:sp>
+      <p:sp>
+        <p:nvSpPr>
+          <p:cNvPr id="21" name="Oval 134">
+            <a:extLst>
+              <a:ext uri="{FF2B5EF4-FFF2-40B4-BE49-F238E27FC236}">
+                <a16:creationId xmlns:a16="http://schemas.microsoft.com/office/drawing/2014/main" id="{C7687DA3-5EC5-4177-9DBB-6A09DC7F77ED}"/>
+              </a:ext>
+            </a:extLst>
+          </p:cNvPr>
+          <p:cNvSpPr>
+            <a:spLocks noChangeAspect="1"/>
+          </p:cNvSpPr>
+          <p:nvPr/>
+        </p:nvSpPr>
+        <p:spPr>
+          <a:xfrm>
+            <a:off x="10156945" y="362281"/>
+            <a:ext cx="211404" cy="211689"/>
+          </a:xfrm>
+          <a:prstGeom prst="ellipse">
+            <a:avLst/>
+          </a:prstGeom>
+          <a:solidFill>
+            <a:srgbClr val="1BCF13"/>
+          </a:solidFill>
+          <a:ln w="12700">
+            <a:solidFill>
+              <a:schemeClr val="accent3"/>
+            </a:solidFill>
+          </a:ln>
+        </p:spPr>
+        <p:style>
+          <a:lnRef idx="2">
+            <a:schemeClr val="accent1">
+              <a:shade val="50000"/>
+            </a:schemeClr>
+          </a:lnRef>
+          <a:fillRef idx="1">
+            <a:schemeClr val="accent1"/>
+          </a:fillRef>
+          <a:effectRef idx="0">
+            <a:schemeClr val="accent1"/>
+          </a:effectRef>
+          <a:fontRef idx="minor">
+            <a:schemeClr val="lt1"/>
+          </a:fontRef>
+        </p:style>
+        <p:txBody>
+          <a:bodyPr wrap="none" lIns="52922" tIns="52922" rIns="52922" rtlCol="0" anchor="ctr"/>
+          <a:lstStyle/>
+          <a:p>
+            <a:pPr algn="ctr" defTabSz="672130"/>
+            <a:endParaRPr lang="en-US" sz="1176" dirty="0">
+              <a:solidFill>
+                <a:prstClr val="black"/>
+              </a:solidFill>
+              <a:latin typeface="Simplon BP Regular"/>
+              <a:cs typeface="Simplon BP Regular"/>
+            </a:endParaRPr>
+          </a:p>
+        </p:txBody>
+      </p:sp>
+      <p:sp>
+        <p:nvSpPr>
+          <p:cNvPr id="22" name="Oval 134">
+            <a:extLst>
+              <a:ext uri="{FF2B5EF4-FFF2-40B4-BE49-F238E27FC236}">
+                <a16:creationId xmlns:a16="http://schemas.microsoft.com/office/drawing/2014/main" id="{B363CBDD-9D88-41D9-9F1B-E6F757DF80B1}"/>
+              </a:ext>
+            </a:extLst>
+          </p:cNvPr>
+          <p:cNvSpPr>
+            <a:spLocks noChangeAspect="1"/>
+          </p:cNvSpPr>
+          <p:nvPr/>
+        </p:nvSpPr>
+        <p:spPr>
+          <a:xfrm>
+            <a:off x="12180394" y="284502"/>
+            <a:ext cx="211404" cy="211689"/>
+          </a:xfrm>
+          <a:prstGeom prst="ellipse">
+            <a:avLst/>
+          </a:prstGeom>
+          <a:solidFill>
+            <a:srgbClr val="1BCF13"/>
+          </a:solidFill>
+          <a:ln w="12700">
+            <a:solidFill>
+              <a:schemeClr val="accent3"/>
+            </a:solidFill>
+          </a:ln>
+        </p:spPr>
+        <p:style>
+          <a:lnRef idx="2">
+            <a:schemeClr val="accent1">
+              <a:shade val="50000"/>
+            </a:schemeClr>
+          </a:lnRef>
+          <a:fillRef idx="1">
+            <a:schemeClr val="accent1"/>
+          </a:fillRef>
+          <a:effectRef idx="0">
+            <a:schemeClr val="accent1"/>
+          </a:effectRef>
+          <a:fontRef idx="minor">
+            <a:schemeClr val="lt1"/>
+          </a:fontRef>
+        </p:style>
+        <p:txBody>
+          <a:bodyPr wrap="none" lIns="52922" tIns="52922" rIns="52922" rtlCol="0" anchor="ctr"/>
+          <a:lstStyle/>
+          <a:p>
+            <a:pPr algn="ctr" defTabSz="672130"/>
+            <a:endParaRPr lang="en-US" sz="1176" dirty="0">
+              <a:solidFill>
+                <a:prstClr val="black"/>
+              </a:solidFill>
+              <a:latin typeface="Simplon BP Regular"/>
+              <a:cs typeface="Simplon BP Regular"/>
+            </a:endParaRPr>
+          </a:p>
+        </p:txBody>
+      </p:sp>
+      <p:sp>
+        <p:nvSpPr>
+          <p:cNvPr id="23" name="Oval 134">
+            <a:extLst>
+              <a:ext uri="{FF2B5EF4-FFF2-40B4-BE49-F238E27FC236}">
+                <a16:creationId xmlns:a16="http://schemas.microsoft.com/office/drawing/2014/main" id="{F42F78D9-B5A8-4A97-8925-8B5904C502F3}"/>
+              </a:ext>
+            </a:extLst>
+          </p:cNvPr>
+          <p:cNvSpPr>
+            <a:spLocks noChangeAspect="1"/>
+          </p:cNvSpPr>
+          <p:nvPr/>
+        </p:nvSpPr>
+        <p:spPr>
+          <a:xfrm>
+            <a:off x="11262832" y="305415"/>
+            <a:ext cx="211404" cy="211689"/>
+          </a:xfrm>
+          <a:prstGeom prst="ellipse">
+            <a:avLst/>
+          </a:prstGeom>
+          <a:solidFill>
+            <a:srgbClr val="1BCF13"/>
+          </a:solidFill>
+          <a:ln w="12700">
+            <a:solidFill>
+              <a:schemeClr val="accent3"/>
+            </a:solidFill>
+          </a:ln>
+        </p:spPr>
+        <p:style>
+          <a:lnRef idx="2">
+            <a:schemeClr val="accent1">
+              <a:shade val="50000"/>
+            </a:schemeClr>
+          </a:lnRef>
+          <a:fillRef idx="1">
+            <a:schemeClr val="accent1"/>
+          </a:fillRef>
+          <a:effectRef idx="0">
+            <a:schemeClr val="accent1"/>
+          </a:effectRef>
+          <a:fontRef idx="minor">
+            <a:schemeClr val="lt1"/>
+          </a:fontRef>
+        </p:style>
+        <p:txBody>
+          <a:bodyPr wrap="none" lIns="52922" tIns="52922" rIns="52922" rtlCol="0" anchor="ctr"/>
+          <a:lstStyle/>
+          <a:p>
+            <a:pPr algn="ctr" defTabSz="672130"/>
+            <a:endParaRPr lang="en-US" sz="1176" dirty="0">
+              <a:solidFill>
+                <a:prstClr val="black"/>
+              </a:solidFill>
+              <a:latin typeface="Simplon BP Regular"/>
+              <a:cs typeface="Simplon BP Regular"/>
+            </a:endParaRPr>
+          </a:p>
+        </p:txBody>
+      </p:sp>
+      <p:sp>
+        <p:nvSpPr>
+          <p:cNvPr id="24" name="Oval 134">
+            <a:extLst>
+              <a:ext uri="{FF2B5EF4-FFF2-40B4-BE49-F238E27FC236}">
+                <a16:creationId xmlns:a16="http://schemas.microsoft.com/office/drawing/2014/main" id="{1EBE2388-56B1-476A-9F0A-E2D66925E9B1}"/>
+              </a:ext>
+            </a:extLst>
+          </p:cNvPr>
+          <p:cNvSpPr>
+            <a:spLocks noChangeAspect="1"/>
+          </p:cNvSpPr>
+          <p:nvPr/>
+        </p:nvSpPr>
+        <p:spPr>
+          <a:xfrm>
+            <a:off x="9275679" y="332030"/>
+            <a:ext cx="211404" cy="211689"/>
+          </a:xfrm>
+          <a:prstGeom prst="ellipse">
+            <a:avLst/>
+          </a:prstGeom>
+          <a:solidFill>
+            <a:srgbClr val="1BCF13"/>
+          </a:solidFill>
+          <a:ln w="12700">
+            <a:solidFill>
+              <a:schemeClr val="accent3"/>
+            </a:solidFill>
+          </a:ln>
+        </p:spPr>
+        <p:style>
+          <a:lnRef idx="2">
+            <a:schemeClr val="accent1">
+              <a:shade val="50000"/>
+            </a:schemeClr>
+          </a:lnRef>
+          <a:fillRef idx="1">
+            <a:schemeClr val="accent1"/>
+          </a:fillRef>
+          <a:effectRef idx="0">
+            <a:schemeClr val="accent1"/>
+          </a:effectRef>
+          <a:fontRef idx="minor">
+            <a:schemeClr val="lt1"/>
+          </a:fontRef>
+        </p:style>
+        <p:txBody>
+          <a:bodyPr wrap="none" lIns="52922" tIns="52922" rIns="52922" rtlCol="0" anchor="ctr"/>
+          <a:lstStyle/>
+          <a:p>
+            <a:pPr algn="ctr" defTabSz="672130"/>
+            <a:endParaRPr lang="en-US" sz="1176" dirty="0">
+              <a:solidFill>
+                <a:prstClr val="black"/>
+              </a:solidFill>
+              <a:latin typeface="Simplon BP Regular"/>
+              <a:cs typeface="Simplon BP Regular"/>
+            </a:endParaRPr>
+          </a:p>
+        </p:txBody>
+      </p:sp>
+    </p:spTree>
+    <p:extLst>
+      <p:ext uri="{BB962C8B-B14F-4D97-AF65-F5344CB8AC3E}">
+        <p14:creationId xmlns:p14="http://schemas.microsoft.com/office/powerpoint/2010/main" val="3826345946"/>
+      </p:ext>
+    </p:extLst>
+  </p:cSld>
+  <p:clrMapOvr>
+    <a:masterClrMapping/>
+  </p:clrMapOvr>
+</p:sld>
+</file>
+
+<file path=ppt/slides/slide8.xml><?xml version="1.0" encoding="utf-8"?>
+<p:sld xmlns:a="http://schemas.openxmlformats.org/drawingml/2006/main" xmlns:r="http://schemas.openxmlformats.org/officeDocument/2006/relationships" xmlns:p="http://schemas.openxmlformats.org/presentationml/2006/main">
+  <p:cSld>
+    <p:spTree>
+      <p:nvGrpSpPr>
+        <p:cNvPr id="1" name=""/>
+        <p:cNvGrpSpPr/>
+        <p:nvPr/>
+      </p:nvGrpSpPr>
+      <p:grpSpPr>
+        <a:xfrm>
+          <a:off x="0" y="0"/>
+          <a:ext cx="0" cy="0"/>
+          <a:chOff x="0" y="0"/>
+          <a:chExt cx="0" cy="0"/>
+        </a:xfrm>
+      </p:grpSpPr>
+      <p:sp>
+        <p:nvSpPr>
+          <p:cNvPr id="43" name="Rectangle 42"/>
+          <p:cNvSpPr/>
+          <p:nvPr/>
+        </p:nvSpPr>
+        <p:spPr>
+          <a:xfrm>
+            <a:off x="7810905" y="1369526"/>
+            <a:ext cx="5351116" cy="2095826"/>
+          </a:xfrm>
+          <a:prstGeom prst="rect">
+            <a:avLst/>
+          </a:prstGeom>
+          <a:noFill/>
+          <a:ln w="12700">
+            <a:solidFill>
+              <a:schemeClr val="bg1">
+                <a:lumMod val="50000"/>
+              </a:schemeClr>
+            </a:solidFill>
+          </a:ln>
+        </p:spPr>
+        <p:style>
+          <a:lnRef idx="2">
+            <a:schemeClr val="accent4"/>
+          </a:lnRef>
+          <a:fillRef idx="1">
+            <a:schemeClr val="lt1"/>
+          </a:fillRef>
+          <a:effectRef idx="0">
+            <a:schemeClr val="accent4"/>
+          </a:effectRef>
+          <a:fontRef idx="minor">
+            <a:schemeClr val="dk1"/>
+          </a:fontRef>
+        </p:style>
+        <p:txBody>
+          <a:bodyPr tIns="105844" rtlCol="0" anchor="t"/>
+          <a:lstStyle/>
+          <a:p>
+            <a:pPr defTabSz="672130">
+              <a:spcAft>
+                <a:spcPts val="882"/>
+              </a:spcAft>
+            </a:pPr>
+            <a:endParaRPr lang="pt-BR" sz="1470" dirty="0">
+              <a:solidFill>
+                <a:schemeClr val="tx1"/>
+              </a:solidFill>
+              <a:latin typeface="Calibri" panose="020F0502020204030204" pitchFamily="34" charset="0"/>
+              <a:cs typeface="Simplon BP Regular"/>
+            </a:endParaRPr>
+          </a:p>
+        </p:txBody>
+      </p:sp>
+      <p:sp>
+        <p:nvSpPr>
+          <p:cNvPr id="3" name="Title 2"/>
+          <p:cNvSpPr>
+            <a:spLocks noGrp="1"/>
+          </p:cNvSpPr>
+          <p:nvPr>
+            <p:ph type="title"/>
+          </p:nvPr>
+        </p:nvSpPr>
+        <p:spPr>
+          <a:xfrm>
+            <a:off x="469692" y="185232"/>
+            <a:ext cx="12098020" cy="800352"/>
+          </a:xfrm>
+        </p:spPr>
+        <p:txBody>
+          <a:bodyPr vert="horz" wrap="square" lIns="105844" tIns="0" rIns="105844" bIns="0" numCol="1" anchor="t" anchorCtr="0" compatLnSpc="1">
+            <a:prstTxWarp prst="textNoShape">
+              <a:avLst/>
+            </a:prstTxWarp>
+            <a:noAutofit/>
+          </a:bodyPr>
+          <a:lstStyle/>
+          <a:p>
+            <a:pPr algn="l">
+              <a:spcAft>
+                <a:spcPts val="882"/>
+              </a:spcAft>
+            </a:pPr>
+            <a:r>
+              <a:rPr lang="en-US" sz="2646" dirty="0">
+                <a:solidFill>
+                  <a:prstClr val="black"/>
+                </a:solidFill>
+                <a:latin typeface="Simplon Oi Headline"/>
+                <a:cs typeface="Simplon Oi Headline"/>
+              </a:rPr>
+              <a:t>SEMANA 5 – 25/03/2021</a:t>
+            </a:r>
+          </a:p>
+        </p:txBody>
+      </p:sp>
+      <p:sp>
+        <p:nvSpPr>
+          <p:cNvPr id="78" name="TextBox 118"/>
+          <p:cNvSpPr txBox="1"/>
+          <p:nvPr/>
+        </p:nvSpPr>
+        <p:spPr>
+          <a:xfrm>
+            <a:off x="11822773" y="576471"/>
+            <a:ext cx="899678" cy="179824"/>
+          </a:xfrm>
+          <a:prstGeom prst="rect">
+            <a:avLst/>
+          </a:prstGeom>
+          <a:noFill/>
+          <a:ln w="12700">
+            <a:noFill/>
+          </a:ln>
+        </p:spPr>
+        <p:style>
+          <a:lnRef idx="2">
+            <a:schemeClr val="accent4"/>
+          </a:lnRef>
+          <a:fillRef idx="1">
+            <a:schemeClr val="lt1"/>
+          </a:fillRef>
+          <a:effectRef idx="0">
+            <a:schemeClr val="accent4"/>
+          </a:effectRef>
+          <a:fontRef idx="minor">
+            <a:schemeClr val="dk1"/>
+          </a:fontRef>
+        </p:style>
+        <p:txBody>
+          <a:bodyPr wrap="none" lIns="52922" tIns="52922" rIns="52922" bIns="0" rtlCol="0" anchor="b"/>
+          <a:lstStyle>
+            <a:defPPr>
+              <a:defRPr lang="en-US"/>
+            </a:defPPr>
+            <a:lvl1pPr algn="ctr">
+              <a:defRPr sz="1000" b="1">
+                <a:latin typeface="Simplon BP Regular"/>
+                <a:cs typeface="Simplon BP Regular"/>
+              </a:defRPr>
+            </a:lvl1pPr>
+            <a:lvl2pPr>
+              <a:defRPr>
+                <a:solidFill>
+                  <a:schemeClr val="dk1"/>
+                </a:solidFill>
+              </a:defRPr>
+            </a:lvl2pPr>
+            <a:lvl3pPr>
+              <a:defRPr>
+                <a:solidFill>
+                  <a:schemeClr val="dk1"/>
+                </a:solidFill>
+              </a:defRPr>
+            </a:lvl3pPr>
+            <a:lvl4pPr>
+              <a:defRPr>
+                <a:solidFill>
+                  <a:schemeClr val="dk1"/>
+                </a:solidFill>
+              </a:defRPr>
+            </a:lvl4pPr>
+            <a:lvl5pPr>
+              <a:defRPr>
+                <a:solidFill>
+                  <a:schemeClr val="dk1"/>
+                </a:solidFill>
+              </a:defRPr>
+            </a:lvl5pPr>
+            <a:lvl6pPr>
+              <a:defRPr>
+                <a:solidFill>
+                  <a:schemeClr val="dk1"/>
+                </a:solidFill>
+              </a:defRPr>
+            </a:lvl6pPr>
+            <a:lvl7pPr>
+              <a:defRPr>
+                <a:solidFill>
+                  <a:schemeClr val="dk1"/>
+                </a:solidFill>
+              </a:defRPr>
+            </a:lvl7pPr>
+            <a:lvl8pPr>
+              <a:defRPr>
+                <a:solidFill>
+                  <a:schemeClr val="dk1"/>
+                </a:solidFill>
+              </a:defRPr>
+            </a:lvl8pPr>
+            <a:lvl9pPr>
+              <a:defRPr>
+                <a:solidFill>
+                  <a:schemeClr val="dk1"/>
+                </a:solidFill>
+              </a:defRPr>
+            </a:lvl9pPr>
+          </a:lstStyle>
+          <a:p>
+            <a:pPr defTabSz="672130"/>
+            <a:r>
+              <a:rPr lang="pt-BR" sz="1176" b="0" dirty="0">
+                <a:solidFill>
+                  <a:prstClr val="black"/>
+                </a:solidFill>
+                <a:latin typeface="Simplon BP Bold" pitchFamily="2" charset="0"/>
+              </a:rPr>
+              <a:t>Negócios</a:t>
+            </a:r>
+          </a:p>
+        </p:txBody>
+      </p:sp>
+      <p:sp>
+        <p:nvSpPr>
+          <p:cNvPr id="80" name="TextBox 123"/>
+          <p:cNvSpPr txBox="1"/>
+          <p:nvPr/>
+        </p:nvSpPr>
+        <p:spPr>
+          <a:xfrm>
+            <a:off x="10902774" y="589543"/>
+            <a:ext cx="899678" cy="179824"/>
+          </a:xfrm>
+          <a:prstGeom prst="rect">
+            <a:avLst/>
+          </a:prstGeom>
+          <a:noFill/>
+          <a:ln w="12700">
+            <a:noFill/>
+          </a:ln>
+        </p:spPr>
+        <p:style>
+          <a:lnRef idx="2">
+            <a:schemeClr val="accent4"/>
+          </a:lnRef>
+          <a:fillRef idx="1">
+            <a:schemeClr val="lt1"/>
+          </a:fillRef>
+          <a:effectRef idx="0">
+            <a:schemeClr val="accent4"/>
+          </a:effectRef>
+          <a:fontRef idx="minor">
+            <a:schemeClr val="dk1"/>
+          </a:fontRef>
+        </p:style>
+        <p:txBody>
+          <a:bodyPr wrap="none" lIns="52922" tIns="52922" rIns="52922" bIns="0" rtlCol="0" anchor="b"/>
+          <a:lstStyle>
+            <a:defPPr>
+              <a:defRPr lang="en-US"/>
+            </a:defPPr>
+            <a:lvl1pPr algn="ctr">
+              <a:defRPr sz="1000" b="1">
+                <a:latin typeface="Simplon BP Regular"/>
+                <a:cs typeface="Simplon BP Regular"/>
+              </a:defRPr>
+            </a:lvl1pPr>
+            <a:lvl2pPr>
+              <a:defRPr>
+                <a:solidFill>
+                  <a:schemeClr val="dk1"/>
+                </a:solidFill>
+              </a:defRPr>
+            </a:lvl2pPr>
+            <a:lvl3pPr>
+              <a:defRPr>
+                <a:solidFill>
+                  <a:schemeClr val="dk1"/>
+                </a:solidFill>
+              </a:defRPr>
+            </a:lvl3pPr>
+            <a:lvl4pPr>
+              <a:defRPr>
+                <a:solidFill>
+                  <a:schemeClr val="dk1"/>
+                </a:solidFill>
+              </a:defRPr>
+            </a:lvl4pPr>
+            <a:lvl5pPr>
+              <a:defRPr>
+                <a:solidFill>
+                  <a:schemeClr val="dk1"/>
+                </a:solidFill>
+              </a:defRPr>
+            </a:lvl5pPr>
+            <a:lvl6pPr>
+              <a:defRPr>
+                <a:solidFill>
+                  <a:schemeClr val="dk1"/>
+                </a:solidFill>
+              </a:defRPr>
+            </a:lvl6pPr>
+            <a:lvl7pPr>
+              <a:defRPr>
+                <a:solidFill>
+                  <a:schemeClr val="dk1"/>
+                </a:solidFill>
+              </a:defRPr>
+            </a:lvl7pPr>
+            <a:lvl8pPr>
+              <a:defRPr>
+                <a:solidFill>
+                  <a:schemeClr val="dk1"/>
+                </a:solidFill>
+              </a:defRPr>
+            </a:lvl8pPr>
+            <a:lvl9pPr>
+              <a:defRPr>
+                <a:solidFill>
+                  <a:schemeClr val="dk1"/>
+                </a:solidFill>
+              </a:defRPr>
+            </a:lvl9pPr>
+          </a:lstStyle>
+          <a:p>
+            <a:pPr defTabSz="672130"/>
+            <a:r>
+              <a:rPr lang="pt-BR" sz="1176" b="0" dirty="0">
+                <a:solidFill>
+                  <a:prstClr val="black"/>
+                </a:solidFill>
+                <a:latin typeface="Simplon BP Bold" pitchFamily="2" charset="0"/>
+              </a:rPr>
+              <a:t>Plataforma</a:t>
+            </a:r>
+          </a:p>
+        </p:txBody>
+      </p:sp>
+      <p:sp>
+        <p:nvSpPr>
+          <p:cNvPr id="82" name="TextBox 128"/>
+          <p:cNvSpPr txBox="1"/>
+          <p:nvPr/>
+        </p:nvSpPr>
+        <p:spPr>
+          <a:xfrm>
+            <a:off x="9844897" y="576471"/>
+            <a:ext cx="899678" cy="179824"/>
+          </a:xfrm>
+          <a:prstGeom prst="rect">
+            <a:avLst/>
+          </a:prstGeom>
+          <a:noFill/>
+          <a:ln w="12700">
+            <a:noFill/>
+          </a:ln>
+        </p:spPr>
+        <p:style>
+          <a:lnRef idx="2">
+            <a:schemeClr val="accent4"/>
+          </a:lnRef>
+          <a:fillRef idx="1">
+            <a:schemeClr val="lt1"/>
+          </a:fillRef>
+          <a:effectRef idx="0">
+            <a:schemeClr val="accent4"/>
+          </a:effectRef>
+          <a:fontRef idx="minor">
+            <a:schemeClr val="dk1"/>
+          </a:fontRef>
+        </p:style>
+        <p:txBody>
+          <a:bodyPr wrap="none" lIns="52922" tIns="52922" rIns="52922" bIns="0" rtlCol="0" anchor="b"/>
+          <a:lstStyle>
+            <a:defPPr>
+              <a:defRPr lang="en-US"/>
+            </a:defPPr>
+            <a:lvl1pPr algn="ctr">
+              <a:defRPr sz="1000" b="1">
+                <a:latin typeface="Simplon BP Regular"/>
+                <a:cs typeface="Simplon BP Regular"/>
+              </a:defRPr>
+            </a:lvl1pPr>
+            <a:lvl2pPr>
+              <a:defRPr>
+                <a:solidFill>
+                  <a:schemeClr val="dk1"/>
+                </a:solidFill>
+              </a:defRPr>
+            </a:lvl2pPr>
+            <a:lvl3pPr>
+              <a:defRPr>
+                <a:solidFill>
+                  <a:schemeClr val="dk1"/>
+                </a:solidFill>
+              </a:defRPr>
+            </a:lvl3pPr>
+            <a:lvl4pPr>
+              <a:defRPr>
+                <a:solidFill>
+                  <a:schemeClr val="dk1"/>
+                </a:solidFill>
+              </a:defRPr>
+            </a:lvl4pPr>
+            <a:lvl5pPr>
+              <a:defRPr>
+                <a:solidFill>
+                  <a:schemeClr val="dk1"/>
+                </a:solidFill>
+              </a:defRPr>
+            </a:lvl5pPr>
+            <a:lvl6pPr>
+              <a:defRPr>
+                <a:solidFill>
+                  <a:schemeClr val="dk1"/>
+                </a:solidFill>
+              </a:defRPr>
+            </a:lvl6pPr>
+            <a:lvl7pPr>
+              <a:defRPr>
+                <a:solidFill>
+                  <a:schemeClr val="dk1"/>
+                </a:solidFill>
+              </a:defRPr>
+            </a:lvl7pPr>
+            <a:lvl8pPr>
+              <a:defRPr>
+                <a:solidFill>
+                  <a:schemeClr val="dk1"/>
+                </a:solidFill>
+              </a:defRPr>
+            </a:lvl8pPr>
+            <a:lvl9pPr>
+              <a:defRPr>
+                <a:solidFill>
+                  <a:schemeClr val="dk1"/>
+                </a:solidFill>
+              </a:defRPr>
+            </a:lvl9pPr>
+          </a:lstStyle>
+          <a:p>
+            <a:pPr defTabSz="672130"/>
+            <a:r>
+              <a:rPr lang="pt-BR" sz="1176" b="0" dirty="0">
+                <a:solidFill>
+                  <a:prstClr val="black"/>
+                </a:solidFill>
+                <a:latin typeface="Simplon BP Bold" pitchFamily="2" charset="0"/>
+              </a:rPr>
+              <a:t>Back</a:t>
+            </a:r>
+          </a:p>
+        </p:txBody>
+      </p:sp>
+      <p:sp>
+        <p:nvSpPr>
+          <p:cNvPr id="84" name="TextBox 133"/>
+          <p:cNvSpPr txBox="1"/>
+          <p:nvPr/>
+        </p:nvSpPr>
+        <p:spPr>
+          <a:xfrm>
+            <a:off x="8934246" y="576471"/>
+            <a:ext cx="899678" cy="179824"/>
+          </a:xfrm>
+          <a:prstGeom prst="rect">
+            <a:avLst/>
+          </a:prstGeom>
+          <a:noFill/>
+          <a:ln w="12700">
+            <a:noFill/>
+          </a:ln>
+        </p:spPr>
+        <p:style>
+          <a:lnRef idx="2">
+            <a:schemeClr val="accent4"/>
+          </a:lnRef>
+          <a:fillRef idx="1">
+            <a:schemeClr val="lt1"/>
+          </a:fillRef>
+          <a:effectRef idx="0">
+            <a:schemeClr val="accent4"/>
+          </a:effectRef>
+          <a:fontRef idx="minor">
+            <a:schemeClr val="dk1"/>
+          </a:fontRef>
+        </p:style>
+        <p:txBody>
+          <a:bodyPr wrap="none" lIns="52922" tIns="52922" rIns="52922" bIns="0" rtlCol="0" anchor="b"/>
+          <a:lstStyle>
+            <a:defPPr>
+              <a:defRPr lang="en-US"/>
+            </a:defPPr>
+            <a:lvl1pPr algn="ctr">
+              <a:defRPr sz="1000" b="1">
+                <a:latin typeface="Simplon BP Regular"/>
+                <a:cs typeface="Simplon BP Regular"/>
+              </a:defRPr>
+            </a:lvl1pPr>
+            <a:lvl2pPr>
+              <a:defRPr>
+                <a:solidFill>
+                  <a:schemeClr val="dk1"/>
+                </a:solidFill>
+              </a:defRPr>
+            </a:lvl2pPr>
+            <a:lvl3pPr>
+              <a:defRPr>
+                <a:solidFill>
+                  <a:schemeClr val="dk1"/>
+                </a:solidFill>
+              </a:defRPr>
+            </a:lvl3pPr>
+            <a:lvl4pPr>
+              <a:defRPr>
+                <a:solidFill>
+                  <a:schemeClr val="dk1"/>
+                </a:solidFill>
+              </a:defRPr>
+            </a:lvl4pPr>
+            <a:lvl5pPr>
+              <a:defRPr>
+                <a:solidFill>
+                  <a:schemeClr val="dk1"/>
+                </a:solidFill>
+              </a:defRPr>
+            </a:lvl5pPr>
+            <a:lvl6pPr>
+              <a:defRPr>
+                <a:solidFill>
+                  <a:schemeClr val="dk1"/>
+                </a:solidFill>
+              </a:defRPr>
+            </a:lvl6pPr>
+            <a:lvl7pPr>
+              <a:defRPr>
+                <a:solidFill>
+                  <a:schemeClr val="dk1"/>
+                </a:solidFill>
+              </a:defRPr>
+            </a:lvl7pPr>
+            <a:lvl8pPr>
+              <a:defRPr>
+                <a:solidFill>
+                  <a:schemeClr val="dk1"/>
+                </a:solidFill>
+              </a:defRPr>
+            </a:lvl8pPr>
+            <a:lvl9pPr>
+              <a:defRPr>
+                <a:solidFill>
+                  <a:schemeClr val="dk1"/>
+                </a:solidFill>
+              </a:defRPr>
+            </a:lvl9pPr>
+          </a:lstStyle>
+          <a:p>
+            <a:pPr defTabSz="672130"/>
+            <a:r>
+              <a:rPr lang="pt-BR" sz="1176" b="0" dirty="0">
+                <a:solidFill>
+                  <a:prstClr val="black"/>
+                </a:solidFill>
+                <a:latin typeface="Simplon BP Bold" pitchFamily="2" charset="0"/>
+              </a:rPr>
+              <a:t>Front</a:t>
+            </a:r>
+          </a:p>
+        </p:txBody>
+      </p:sp>
+      <p:sp>
+        <p:nvSpPr>
+          <p:cNvPr id="88" name="Oval 134"/>
+          <p:cNvSpPr>
+            <a:spLocks noChangeAspect="1"/>
+          </p:cNvSpPr>
+          <p:nvPr/>
+        </p:nvSpPr>
+        <p:spPr>
+          <a:xfrm>
+            <a:off x="8470074" y="341965"/>
+            <a:ext cx="211404" cy="211689"/>
+          </a:xfrm>
+          <a:prstGeom prst="ellipse">
+            <a:avLst/>
+          </a:prstGeom>
+          <a:solidFill>
+            <a:srgbClr val="1BCF13"/>
+          </a:solidFill>
+          <a:ln w="12700">
+            <a:solidFill>
+              <a:schemeClr val="accent3"/>
+            </a:solidFill>
+          </a:ln>
+        </p:spPr>
+        <p:style>
+          <a:lnRef idx="2">
+            <a:schemeClr val="accent1">
+              <a:shade val="50000"/>
+            </a:schemeClr>
+          </a:lnRef>
+          <a:fillRef idx="1">
+            <a:schemeClr val="accent1"/>
+          </a:fillRef>
+          <a:effectRef idx="0">
+            <a:schemeClr val="accent1"/>
+          </a:effectRef>
+          <a:fontRef idx="minor">
+            <a:schemeClr val="lt1"/>
+          </a:fontRef>
+        </p:style>
+        <p:txBody>
+          <a:bodyPr wrap="none" lIns="52922" tIns="52922" rIns="52922" rtlCol="0" anchor="ctr"/>
+          <a:lstStyle/>
+          <a:p>
+            <a:pPr algn="ctr" defTabSz="672130"/>
+            <a:endParaRPr lang="en-US" sz="1176" dirty="0">
+              <a:solidFill>
+                <a:prstClr val="black"/>
+              </a:solidFill>
+              <a:latin typeface="Simplon BP Regular"/>
+              <a:cs typeface="Simplon BP Regular"/>
+            </a:endParaRPr>
+          </a:p>
+        </p:txBody>
+      </p:sp>
+      <p:sp>
+        <p:nvSpPr>
+          <p:cNvPr id="86" name="TextBox 138"/>
+          <p:cNvSpPr txBox="1"/>
+          <p:nvPr/>
+        </p:nvSpPr>
+        <p:spPr>
+          <a:xfrm>
+            <a:off x="8126053" y="576471"/>
+            <a:ext cx="899678" cy="179824"/>
+          </a:xfrm>
+          <a:prstGeom prst="rect">
+            <a:avLst/>
+          </a:prstGeom>
+          <a:noFill/>
+          <a:ln w="12700">
+            <a:noFill/>
+          </a:ln>
+        </p:spPr>
+        <p:style>
+          <a:lnRef idx="2">
+            <a:schemeClr val="accent4"/>
+          </a:lnRef>
+          <a:fillRef idx="1">
+            <a:schemeClr val="lt1"/>
+          </a:fillRef>
+          <a:effectRef idx="0">
+            <a:schemeClr val="accent4"/>
+          </a:effectRef>
+          <a:fontRef idx="minor">
+            <a:schemeClr val="dk1"/>
+          </a:fontRef>
+        </p:style>
+        <p:txBody>
+          <a:bodyPr wrap="none" lIns="52922" tIns="52922" rIns="52922" bIns="0" rtlCol="0" anchor="b"/>
+          <a:lstStyle>
+            <a:defPPr>
+              <a:defRPr lang="en-US"/>
+            </a:defPPr>
+            <a:lvl1pPr algn="ctr">
+              <a:defRPr sz="1000" b="1">
+                <a:latin typeface="Simplon BP Regular"/>
+                <a:cs typeface="Simplon BP Regular"/>
+              </a:defRPr>
+            </a:lvl1pPr>
+            <a:lvl2pPr>
+              <a:defRPr>
+                <a:solidFill>
+                  <a:schemeClr val="dk1"/>
+                </a:solidFill>
+              </a:defRPr>
+            </a:lvl2pPr>
+            <a:lvl3pPr>
+              <a:defRPr>
+                <a:solidFill>
+                  <a:schemeClr val="dk1"/>
+                </a:solidFill>
+              </a:defRPr>
+            </a:lvl3pPr>
+            <a:lvl4pPr>
+              <a:defRPr>
+                <a:solidFill>
+                  <a:schemeClr val="dk1"/>
+                </a:solidFill>
+              </a:defRPr>
+            </a:lvl4pPr>
+            <a:lvl5pPr>
+              <a:defRPr>
+                <a:solidFill>
+                  <a:schemeClr val="dk1"/>
+                </a:solidFill>
+              </a:defRPr>
+            </a:lvl5pPr>
+            <a:lvl6pPr>
+              <a:defRPr>
+                <a:solidFill>
+                  <a:schemeClr val="dk1"/>
+                </a:solidFill>
+              </a:defRPr>
+            </a:lvl6pPr>
+            <a:lvl7pPr>
+              <a:defRPr>
+                <a:solidFill>
+                  <a:schemeClr val="dk1"/>
+                </a:solidFill>
+              </a:defRPr>
+            </a:lvl7pPr>
+            <a:lvl8pPr>
+              <a:defRPr>
+                <a:solidFill>
+                  <a:schemeClr val="dk1"/>
+                </a:solidFill>
+              </a:defRPr>
+            </a:lvl8pPr>
+            <a:lvl9pPr>
+              <a:defRPr>
+                <a:solidFill>
+                  <a:schemeClr val="dk1"/>
+                </a:solidFill>
+              </a:defRPr>
+            </a:lvl9pPr>
+          </a:lstStyle>
+          <a:p>
+            <a:pPr defTabSz="672130"/>
+            <a:r>
+              <a:rPr lang="en-US" sz="1176" b="0" dirty="0" err="1">
+                <a:solidFill>
+                  <a:prstClr val="black"/>
+                </a:solidFill>
+                <a:latin typeface="Simplon BP Bold" pitchFamily="2" charset="0"/>
+              </a:rPr>
+              <a:t>Equipe</a:t>
+            </a:r>
+            <a:endParaRPr lang="en-US" sz="1176" b="0" dirty="0">
+              <a:solidFill>
+                <a:prstClr val="black"/>
+              </a:solidFill>
+              <a:latin typeface="Simplon BP Bold" pitchFamily="2" charset="0"/>
+            </a:endParaRPr>
+          </a:p>
+        </p:txBody>
+      </p:sp>
+      <p:sp>
+        <p:nvSpPr>
+          <p:cNvPr id="64" name="Retângulo 63"/>
+          <p:cNvSpPr/>
+          <p:nvPr/>
+        </p:nvSpPr>
+        <p:spPr>
+          <a:xfrm>
+            <a:off x="469692" y="559912"/>
+            <a:ext cx="7186474" cy="239087"/>
+          </a:xfrm>
+          <a:prstGeom prst="rect">
+            <a:avLst/>
+          </a:prstGeom>
+          <a:solidFill>
+            <a:schemeClr val="bg1">
+              <a:lumMod val="85000"/>
+            </a:schemeClr>
+          </a:solidFill>
+        </p:spPr>
+        <p:txBody>
+          <a:bodyPr vert="horz" lIns="134422" tIns="67211" rIns="134422" bIns="67211" rtlCol="0" anchor="ctr"/>
+          <a:lstStyle/>
+          <a:p>
+            <a:pPr defTabSz="672130"/>
+            <a:r>
+              <a:rPr lang="en-US" sz="1544" dirty="0">
+                <a:latin typeface="Simplon Oi Headline" charset="0"/>
+                <a:ea typeface="Simplon Oi Headline" charset="0"/>
+                <a:cs typeface="Simplon Oi Headline" charset="0"/>
+              </a:rPr>
+              <a:t>PROGRESSOS</a:t>
+            </a:r>
+            <a:endParaRPr lang="pt-BR" sz="1544" dirty="0">
+              <a:latin typeface="Simplon Oi Headline" charset="0"/>
+              <a:ea typeface="Simplon Oi Headline" charset="0"/>
+              <a:cs typeface="Simplon Oi Headline" charset="0"/>
+            </a:endParaRPr>
+          </a:p>
+        </p:txBody>
+      </p:sp>
+      <p:sp>
+        <p:nvSpPr>
+          <p:cNvPr id="65" name="Retângulo 64"/>
+          <p:cNvSpPr/>
+          <p:nvPr/>
+        </p:nvSpPr>
+        <p:spPr>
+          <a:xfrm>
+            <a:off x="7810906" y="927661"/>
+            <a:ext cx="5351116" cy="449162"/>
+          </a:xfrm>
+          <a:prstGeom prst="rect">
+            <a:avLst/>
+          </a:prstGeom>
+          <a:solidFill>
+            <a:schemeClr val="bg1">
+              <a:lumMod val="85000"/>
+            </a:schemeClr>
+          </a:solidFill>
+        </p:spPr>
+        <p:txBody>
+          <a:bodyPr vert="horz" lIns="134422" tIns="67211" rIns="134422" bIns="67211" rtlCol="0" anchor="ctr"/>
+          <a:lstStyle/>
+          <a:p>
+            <a:pPr defTabSz="672130"/>
+            <a:r>
+              <a:rPr lang="pt-BR" sz="1544" dirty="0">
+                <a:latin typeface="Simplon Oi Headline" charset="0"/>
+                <a:ea typeface="Simplon Oi Headline" charset="0"/>
+                <a:cs typeface="Simplon Oi Headline" charset="0"/>
+              </a:rPr>
+              <a:t>Pontos atenção/ Principais Riscos</a:t>
+            </a:r>
+          </a:p>
+        </p:txBody>
+      </p:sp>
+      <p:sp>
+        <p:nvSpPr>
+          <p:cNvPr id="66" name="Retângulo 65"/>
+          <p:cNvSpPr/>
+          <p:nvPr/>
+        </p:nvSpPr>
+        <p:spPr>
+          <a:xfrm>
+            <a:off x="469692" y="4982921"/>
+            <a:ext cx="11854636" cy="233106"/>
+          </a:xfrm>
+          <a:prstGeom prst="rect">
+            <a:avLst/>
+          </a:prstGeom>
+          <a:solidFill>
+            <a:schemeClr val="bg1">
+              <a:lumMod val="85000"/>
+            </a:schemeClr>
+          </a:solidFill>
+        </p:spPr>
+        <p:txBody>
+          <a:bodyPr vert="horz" lIns="134422" tIns="67211" rIns="134422" bIns="67211" rtlCol="0" anchor="ctr"/>
+          <a:lstStyle/>
+          <a:p>
+            <a:pPr defTabSz="672130"/>
+            <a:r>
+              <a:rPr lang="pt-BR" sz="1544" dirty="0">
+                <a:latin typeface="Simplon Oi Headline" charset="0"/>
+                <a:ea typeface="Simplon Oi Headline" charset="0"/>
+                <a:cs typeface="Simplon Oi Headline" charset="0"/>
+              </a:rPr>
+              <a:t>Próximos Passos/ Decisões a tomar</a:t>
+            </a:r>
+          </a:p>
+        </p:txBody>
+      </p:sp>
+      <p:sp>
+        <p:nvSpPr>
+          <p:cNvPr id="63" name="Rectangle 37"/>
+          <p:cNvSpPr/>
+          <p:nvPr/>
+        </p:nvSpPr>
+        <p:spPr>
+          <a:xfrm>
+            <a:off x="469132" y="818463"/>
+            <a:ext cx="7186474" cy="4078796"/>
+          </a:xfrm>
+          <a:prstGeom prst="rect">
+            <a:avLst/>
+          </a:prstGeom>
+          <a:noFill/>
+          <a:ln w="12700">
+            <a:solidFill>
+              <a:schemeClr val="bg1">
+                <a:lumMod val="50000"/>
+              </a:schemeClr>
+            </a:solidFill>
+          </a:ln>
+        </p:spPr>
+        <p:style>
+          <a:lnRef idx="2">
+            <a:schemeClr val="accent4"/>
+          </a:lnRef>
+          <a:fillRef idx="1">
+            <a:schemeClr val="lt1"/>
+          </a:fillRef>
+          <a:effectRef idx="0">
+            <a:schemeClr val="accent4"/>
+          </a:effectRef>
+          <a:fontRef idx="minor">
+            <a:schemeClr val="dk1"/>
+          </a:fontRef>
+        </p:style>
+        <p:txBody>
+          <a:bodyPr tIns="105844" rtlCol="0" anchor="t"/>
+          <a:lstStyle/>
+          <a:p>
+            <a:pPr marL="252049" indent="-252049" fontAlgn="base">
+              <a:spcBef>
+                <a:spcPct val="0"/>
+              </a:spcBef>
+              <a:buFont typeface="Wingdings" panose="05000000000000000000" pitchFamily="2" charset="2"/>
+              <a:buChar char="ü"/>
+              <a:defRPr/>
+            </a:pPr>
+            <a:r>
+              <a:rPr lang="pt-BR" sz="1600" b="1" dirty="0">
+                <a:solidFill>
+                  <a:schemeClr val="tx1"/>
+                </a:solidFill>
+                <a:latin typeface="Arial" panose="020B0604020202020204" pitchFamily="34" charset="0"/>
+                <a:cs typeface="Arial" panose="020B0604020202020204" pitchFamily="34" charset="0"/>
+              </a:rPr>
+              <a:t>F</a:t>
+            </a:r>
+          </a:p>
+          <a:p>
+            <a:pPr marL="0" lvl="1" defTabSz="672130"/>
+            <a:endParaRPr lang="pt-BR" sz="1800" b="1" dirty="0">
+              <a:solidFill>
+                <a:schemeClr val="tx1"/>
+              </a:solidFill>
+              <a:latin typeface="Calibri" panose="020F0502020204030204" pitchFamily="34" charset="0"/>
+              <a:cs typeface="Simplon BP Regular"/>
+            </a:endParaRPr>
+          </a:p>
+        </p:txBody>
+      </p:sp>
+      <p:sp>
+        <p:nvSpPr>
+          <p:cNvPr id="2" name="Rectangle 43">
+            <a:extLst>
+              <a:ext uri="{FF2B5EF4-FFF2-40B4-BE49-F238E27FC236}">
+                <a16:creationId xmlns:a16="http://schemas.microsoft.com/office/drawing/2014/main" id="{B15BA19F-C787-4E6A-ADAB-C0DFF09C66A8}"/>
+              </a:ext>
+            </a:extLst>
+          </p:cNvPr>
+          <p:cNvSpPr>
+            <a:spLocks/>
+          </p:cNvSpPr>
+          <p:nvPr/>
+        </p:nvSpPr>
+        <p:spPr>
+          <a:xfrm>
+            <a:off x="463325" y="5216027"/>
+            <a:ext cx="11854636" cy="2226277"/>
+          </a:xfrm>
+          <a:prstGeom prst="rect">
+            <a:avLst/>
+          </a:prstGeom>
+          <a:noFill/>
+          <a:ln w="12700">
+            <a:solidFill>
+              <a:schemeClr val="bg1">
+                <a:lumMod val="50000"/>
+              </a:schemeClr>
+            </a:solidFill>
+          </a:ln>
+        </p:spPr>
+        <p:style>
+          <a:lnRef idx="2">
+            <a:schemeClr val="accent4"/>
+          </a:lnRef>
+          <a:fillRef idx="1">
+            <a:schemeClr val="lt1"/>
+          </a:fillRef>
+          <a:effectRef idx="0">
+            <a:schemeClr val="accent4"/>
+          </a:effectRef>
+          <a:fontRef idx="minor">
+            <a:schemeClr val="dk1"/>
+          </a:fontRef>
+        </p:style>
+        <p:txBody>
+          <a:bodyPr wrap="square" tIns="105844" numCol="3" rtlCol="0" anchor="ctr"/>
+          <a:lstStyle/>
+          <a:p>
+            <a:pPr marL="0" lvl="1" defTabSz="672130"/>
+            <a:r>
+              <a:rPr lang="pt-BR" sz="1400" b="1" dirty="0">
+                <a:solidFill>
+                  <a:schemeClr val="tx1"/>
+                </a:solidFill>
+                <a:latin typeface="Arial" panose="020B0604020202020204" pitchFamily="34" charset="0"/>
+                <a:cs typeface="Arial" panose="020B0604020202020204" pitchFamily="34" charset="0"/>
+              </a:rPr>
+              <a:t>Frente </a:t>
+            </a:r>
+            <a:r>
+              <a:rPr lang="pt-BR" sz="1400" b="1" dirty="0" err="1">
+                <a:solidFill>
+                  <a:schemeClr val="tx1"/>
+                </a:solidFill>
+                <a:latin typeface="Arial" panose="020B0604020202020204" pitchFamily="34" charset="0"/>
+                <a:cs typeface="Arial" panose="020B0604020202020204" pitchFamily="34" charset="0"/>
+              </a:rPr>
+              <a:t>Backend</a:t>
+            </a:r>
+            <a:endParaRPr lang="pt-BR" sz="1400" b="1" dirty="0">
+              <a:solidFill>
+                <a:schemeClr val="tx1"/>
+              </a:solidFill>
+              <a:latin typeface="Arial" panose="020B0604020202020204" pitchFamily="34" charset="0"/>
+              <a:cs typeface="Arial" panose="020B0604020202020204" pitchFamily="34" charset="0"/>
+            </a:endParaRPr>
+          </a:p>
+          <a:p>
+            <a:pPr marL="285750" lvl="1" indent="-285750" defTabSz="672130">
+              <a:buFont typeface="Wingdings" panose="05000000000000000000" pitchFamily="2" charset="2"/>
+              <a:buChar char="§"/>
+            </a:pPr>
+            <a:r>
+              <a:rPr lang="pt-BR" sz="1400" b="1" dirty="0">
+                <a:solidFill>
+                  <a:schemeClr val="tx1"/>
+                </a:solidFill>
+                <a:latin typeface="Arial" panose="020B0604020202020204" pitchFamily="34" charset="0"/>
+                <a:cs typeface="Arial" panose="020B0604020202020204" pitchFamily="34" charset="0"/>
+              </a:rPr>
+              <a:t>A</a:t>
+            </a:r>
+          </a:p>
+          <a:p>
+            <a:pPr marL="0" lvl="1" defTabSz="672130"/>
+            <a:r>
+              <a:rPr lang="pt-BR" sz="1400" b="1" dirty="0">
+                <a:solidFill>
+                  <a:schemeClr val="tx1"/>
+                </a:solidFill>
+                <a:latin typeface="Arial" panose="020B0604020202020204" pitchFamily="34" charset="0"/>
+                <a:cs typeface="Arial" panose="020B0604020202020204" pitchFamily="34" charset="0"/>
+              </a:rPr>
+              <a:t>Frente Front-</a:t>
+            </a:r>
+            <a:r>
+              <a:rPr lang="pt-BR" sz="1400" b="1" dirty="0" err="1">
+                <a:solidFill>
+                  <a:schemeClr val="tx1"/>
+                </a:solidFill>
+                <a:latin typeface="Arial" panose="020B0604020202020204" pitchFamily="34" charset="0"/>
+                <a:cs typeface="Arial" panose="020B0604020202020204" pitchFamily="34" charset="0"/>
+              </a:rPr>
+              <a:t>end</a:t>
+            </a:r>
+            <a:endParaRPr lang="pt-BR" sz="1400" b="1" dirty="0">
+              <a:solidFill>
+                <a:schemeClr val="tx1"/>
+              </a:solidFill>
+              <a:latin typeface="Arial" panose="020B0604020202020204" pitchFamily="34" charset="0"/>
+              <a:cs typeface="Arial" panose="020B0604020202020204" pitchFamily="34" charset="0"/>
+            </a:endParaRPr>
+          </a:p>
+          <a:p>
+            <a:pPr marL="252049" lvl="1" indent="-252049">
+              <a:buFont typeface="Wingdings" panose="05000000000000000000" pitchFamily="2" charset="2"/>
+              <a:buChar char="§"/>
+            </a:pPr>
+            <a:r>
+              <a:rPr lang="pt-BR" sz="1400" b="1" dirty="0">
+                <a:solidFill>
+                  <a:schemeClr val="tx1"/>
+                </a:solidFill>
+                <a:latin typeface="Arial" panose="020B0604020202020204" pitchFamily="34" charset="0"/>
+                <a:cs typeface="Arial" panose="020B0604020202020204" pitchFamily="34" charset="0"/>
+              </a:rPr>
+              <a:t>F</a:t>
+            </a:r>
+          </a:p>
+          <a:p>
+            <a:pPr marL="0" lvl="1" defTabSz="672130"/>
+            <a:endParaRPr lang="pt-BR" sz="1600" b="1" dirty="0">
+              <a:solidFill>
+                <a:schemeClr val="tx1"/>
+              </a:solidFill>
+              <a:latin typeface="Calibri" panose="020F0502020204030204" pitchFamily="34" charset="0"/>
+              <a:cs typeface="Simplon BP Regular"/>
+            </a:endParaRPr>
+          </a:p>
+          <a:p>
+            <a:pPr marL="0" lvl="1" defTabSz="672130"/>
+            <a:r>
+              <a:rPr lang="pt-BR" sz="1400" b="1" dirty="0">
+                <a:solidFill>
+                  <a:schemeClr val="tx1"/>
+                </a:solidFill>
+                <a:latin typeface="Arial" panose="020B0604020202020204" pitchFamily="34" charset="0"/>
+                <a:cs typeface="Arial" panose="020B0604020202020204" pitchFamily="34" charset="0"/>
+              </a:rPr>
+              <a:t>Frente Negócios</a:t>
+            </a:r>
+          </a:p>
+          <a:p>
+            <a:pPr marL="285750" lvl="1" indent="-285750" defTabSz="672130">
+              <a:buFont typeface="Wingdings" panose="05000000000000000000" pitchFamily="2" charset="2"/>
+              <a:buChar char="§"/>
+            </a:pPr>
+            <a:r>
+              <a:rPr lang="pt-BR" sz="1400" b="1" dirty="0">
+                <a:solidFill>
+                  <a:schemeClr val="tx1"/>
+                </a:solidFill>
+                <a:latin typeface="Arial" panose="020B0604020202020204" pitchFamily="34" charset="0"/>
+                <a:cs typeface="Arial" panose="020B0604020202020204" pitchFamily="34" charset="0"/>
+              </a:rPr>
+              <a:t>D</a:t>
+            </a:r>
+          </a:p>
+        </p:txBody>
+      </p:sp>
+      <p:sp>
+        <p:nvSpPr>
+          <p:cNvPr id="5" name="Retângulo 4">
+            <a:extLst>
+              <a:ext uri="{FF2B5EF4-FFF2-40B4-BE49-F238E27FC236}">
+                <a16:creationId xmlns:a16="http://schemas.microsoft.com/office/drawing/2014/main" id="{A1C14918-6027-46B3-96BF-C5F7FDEC3276}"/>
+              </a:ext>
+            </a:extLst>
+          </p:cNvPr>
+          <p:cNvSpPr/>
+          <p:nvPr/>
+        </p:nvSpPr>
+        <p:spPr>
+          <a:xfrm>
+            <a:off x="8017619" y="180231"/>
+            <a:ext cx="4937689" cy="618769"/>
+          </a:xfrm>
+          <a:prstGeom prst="rect">
+            <a:avLst/>
+          </a:prstGeom>
+          <a:noFill/>
+          <a:ln w="6350">
+            <a:solidFill>
+              <a:schemeClr val="bg1">
+                <a:lumMod val="75000"/>
+              </a:schemeClr>
+            </a:solidFill>
+          </a:ln>
+        </p:spPr>
+        <p:style>
+          <a:lnRef idx="2">
+            <a:schemeClr val="accent1">
+              <a:shade val="50000"/>
+            </a:schemeClr>
+          </a:lnRef>
+          <a:fillRef idx="1">
+            <a:schemeClr val="accent1"/>
+          </a:fillRef>
+          <a:effectRef idx="0">
+            <a:schemeClr val="accent1"/>
+          </a:effectRef>
+          <a:fontRef idx="minor">
+            <a:schemeClr val="lt1"/>
+          </a:fontRef>
+        </p:style>
+        <p:txBody>
+          <a:bodyPr rtlCol="0" anchor="ctr"/>
+          <a:lstStyle/>
+          <a:p>
+            <a:pPr algn="ctr"/>
+            <a:endParaRPr lang="pt-BR"/>
+          </a:p>
+        </p:txBody>
+      </p:sp>
+      <p:sp>
+        <p:nvSpPr>
+          <p:cNvPr id="8" name="TextBox 138">
+            <a:extLst>
+              <a:ext uri="{FF2B5EF4-FFF2-40B4-BE49-F238E27FC236}">
+                <a16:creationId xmlns:a16="http://schemas.microsoft.com/office/drawing/2014/main" id="{5CE7D08C-795B-4BF1-97F6-F9773F4E9F4C}"/>
+              </a:ext>
+            </a:extLst>
+          </p:cNvPr>
+          <p:cNvSpPr txBox="1"/>
+          <p:nvPr/>
+        </p:nvSpPr>
+        <p:spPr>
+          <a:xfrm>
+            <a:off x="9715810" y="51570"/>
+            <a:ext cx="1478088" cy="211688"/>
+          </a:xfrm>
+          <a:prstGeom prst="rect">
+            <a:avLst/>
+          </a:prstGeom>
+          <a:solidFill>
+            <a:schemeClr val="bg1"/>
+          </a:solidFill>
+          <a:ln w="12700">
+            <a:noFill/>
+          </a:ln>
+        </p:spPr>
+        <p:style>
+          <a:lnRef idx="2">
+            <a:schemeClr val="accent4"/>
+          </a:lnRef>
+          <a:fillRef idx="1">
+            <a:schemeClr val="lt1"/>
+          </a:fillRef>
+          <a:effectRef idx="0">
+            <a:schemeClr val="accent4"/>
+          </a:effectRef>
+          <a:fontRef idx="minor">
+            <a:schemeClr val="dk1"/>
+          </a:fontRef>
+        </p:style>
+        <p:txBody>
+          <a:bodyPr wrap="none" lIns="52922" tIns="52922" rIns="52922" bIns="0" rtlCol="0" anchor="b"/>
+          <a:lstStyle>
+            <a:defPPr>
+              <a:defRPr lang="en-US"/>
+            </a:defPPr>
+            <a:lvl1pPr algn="ctr">
+              <a:defRPr sz="1000" b="1">
+                <a:latin typeface="Simplon BP Regular"/>
+                <a:cs typeface="Simplon BP Regular"/>
+              </a:defRPr>
+            </a:lvl1pPr>
+            <a:lvl2pPr>
+              <a:defRPr>
+                <a:solidFill>
+                  <a:schemeClr val="dk1"/>
+                </a:solidFill>
+              </a:defRPr>
+            </a:lvl2pPr>
+            <a:lvl3pPr>
+              <a:defRPr>
+                <a:solidFill>
+                  <a:schemeClr val="dk1"/>
+                </a:solidFill>
+              </a:defRPr>
+            </a:lvl3pPr>
+            <a:lvl4pPr>
+              <a:defRPr>
+                <a:solidFill>
+                  <a:schemeClr val="dk1"/>
+                </a:solidFill>
+              </a:defRPr>
+            </a:lvl4pPr>
+            <a:lvl5pPr>
+              <a:defRPr>
+                <a:solidFill>
+                  <a:schemeClr val="dk1"/>
+                </a:solidFill>
+              </a:defRPr>
+            </a:lvl5pPr>
+            <a:lvl6pPr>
+              <a:defRPr>
+                <a:solidFill>
+                  <a:schemeClr val="dk1"/>
+                </a:solidFill>
+              </a:defRPr>
+            </a:lvl6pPr>
+            <a:lvl7pPr>
+              <a:defRPr>
+                <a:solidFill>
+                  <a:schemeClr val="dk1"/>
+                </a:solidFill>
+              </a:defRPr>
+            </a:lvl7pPr>
+            <a:lvl8pPr>
+              <a:defRPr>
+                <a:solidFill>
+                  <a:schemeClr val="dk1"/>
+                </a:solidFill>
+              </a:defRPr>
+            </a:lvl8pPr>
+            <a:lvl9pPr>
+              <a:defRPr>
+                <a:solidFill>
+                  <a:schemeClr val="dk1"/>
+                </a:solidFill>
+              </a:defRPr>
+            </a:lvl9pPr>
+          </a:lstStyle>
+          <a:p>
+            <a:pPr defTabSz="672130"/>
+            <a:r>
+              <a:rPr lang="en-US" sz="1176" b="0" dirty="0">
+                <a:solidFill>
+                  <a:prstClr val="black"/>
+                </a:solidFill>
+                <a:latin typeface="Simplon BP Bold" pitchFamily="2" charset="0"/>
+              </a:rPr>
+              <a:t>    </a:t>
+            </a:r>
+            <a:r>
+              <a:rPr lang="en-US" sz="1176" b="0" dirty="0" err="1">
+                <a:solidFill>
+                  <a:prstClr val="black"/>
+                </a:solidFill>
+                <a:latin typeface="Simplon BP Bold" pitchFamily="2" charset="0"/>
+              </a:rPr>
+              <a:t>Farol</a:t>
+            </a:r>
+            <a:r>
+              <a:rPr lang="en-US" sz="1176" b="0" dirty="0">
+                <a:solidFill>
+                  <a:prstClr val="black"/>
+                </a:solidFill>
+                <a:latin typeface="Simplon BP Bold" pitchFamily="2" charset="0"/>
+              </a:rPr>
+              <a:t> do </a:t>
+            </a:r>
+            <a:r>
+              <a:rPr lang="en-US" sz="1176" b="0" dirty="0" err="1">
+                <a:solidFill>
+                  <a:prstClr val="black"/>
+                </a:solidFill>
+                <a:latin typeface="Simplon BP Bold" pitchFamily="2" charset="0"/>
+              </a:rPr>
+              <a:t>Projeto</a:t>
+            </a:r>
+            <a:r>
+              <a:rPr lang="en-US" sz="1176" b="0" dirty="0">
+                <a:solidFill>
+                  <a:prstClr val="black"/>
+                </a:solidFill>
+                <a:latin typeface="Simplon BP Bold" pitchFamily="2" charset="0"/>
+              </a:rPr>
+              <a:t>   </a:t>
+            </a:r>
+          </a:p>
+        </p:txBody>
+      </p:sp>
+      <p:sp>
+        <p:nvSpPr>
+          <p:cNvPr id="21" name="Oval 134">
+            <a:extLst>
+              <a:ext uri="{FF2B5EF4-FFF2-40B4-BE49-F238E27FC236}">
+                <a16:creationId xmlns:a16="http://schemas.microsoft.com/office/drawing/2014/main" id="{C7687DA3-5EC5-4177-9DBB-6A09DC7F77ED}"/>
+              </a:ext>
+            </a:extLst>
+          </p:cNvPr>
+          <p:cNvSpPr>
+            <a:spLocks noChangeAspect="1"/>
+          </p:cNvSpPr>
+          <p:nvPr/>
+        </p:nvSpPr>
+        <p:spPr>
+          <a:xfrm>
+            <a:off x="10156945" y="362281"/>
+            <a:ext cx="211404" cy="211689"/>
+          </a:xfrm>
+          <a:prstGeom prst="ellipse">
+            <a:avLst/>
+          </a:prstGeom>
+          <a:solidFill>
+            <a:srgbClr val="1BCF13"/>
+          </a:solidFill>
+          <a:ln w="12700">
+            <a:solidFill>
+              <a:schemeClr val="accent3"/>
+            </a:solidFill>
+          </a:ln>
+        </p:spPr>
+        <p:style>
+          <a:lnRef idx="2">
+            <a:schemeClr val="accent1">
+              <a:shade val="50000"/>
+            </a:schemeClr>
+          </a:lnRef>
+          <a:fillRef idx="1">
+            <a:schemeClr val="accent1"/>
+          </a:fillRef>
+          <a:effectRef idx="0">
+            <a:schemeClr val="accent1"/>
+          </a:effectRef>
+          <a:fontRef idx="minor">
+            <a:schemeClr val="lt1"/>
+          </a:fontRef>
+        </p:style>
+        <p:txBody>
+          <a:bodyPr wrap="none" lIns="52922" tIns="52922" rIns="52922" rtlCol="0" anchor="ctr"/>
+          <a:lstStyle/>
+          <a:p>
+            <a:pPr algn="ctr" defTabSz="672130"/>
+            <a:endParaRPr lang="en-US" sz="1176" dirty="0">
+              <a:solidFill>
+                <a:prstClr val="black"/>
+              </a:solidFill>
+              <a:latin typeface="Simplon BP Regular"/>
+              <a:cs typeface="Simplon BP Regular"/>
+            </a:endParaRPr>
+          </a:p>
+        </p:txBody>
+      </p:sp>
+      <p:sp>
+        <p:nvSpPr>
+          <p:cNvPr id="22" name="Oval 134">
+            <a:extLst>
+              <a:ext uri="{FF2B5EF4-FFF2-40B4-BE49-F238E27FC236}">
+                <a16:creationId xmlns:a16="http://schemas.microsoft.com/office/drawing/2014/main" id="{B363CBDD-9D88-41D9-9F1B-E6F757DF80B1}"/>
+              </a:ext>
+            </a:extLst>
+          </p:cNvPr>
+          <p:cNvSpPr>
+            <a:spLocks noChangeAspect="1"/>
+          </p:cNvSpPr>
+          <p:nvPr/>
+        </p:nvSpPr>
+        <p:spPr>
+          <a:xfrm>
+            <a:off x="12180394" y="284502"/>
+            <a:ext cx="211404" cy="211689"/>
+          </a:xfrm>
+          <a:prstGeom prst="ellipse">
+            <a:avLst/>
+          </a:prstGeom>
+          <a:solidFill>
+            <a:srgbClr val="1BCF13"/>
+          </a:solidFill>
+          <a:ln w="12700">
+            <a:solidFill>
+              <a:schemeClr val="accent3"/>
+            </a:solidFill>
+          </a:ln>
+        </p:spPr>
+        <p:style>
+          <a:lnRef idx="2">
+            <a:schemeClr val="accent1">
+              <a:shade val="50000"/>
+            </a:schemeClr>
+          </a:lnRef>
+          <a:fillRef idx="1">
+            <a:schemeClr val="accent1"/>
+          </a:fillRef>
+          <a:effectRef idx="0">
+            <a:schemeClr val="accent1"/>
+          </a:effectRef>
+          <a:fontRef idx="minor">
+            <a:schemeClr val="lt1"/>
+          </a:fontRef>
+        </p:style>
+        <p:txBody>
+          <a:bodyPr wrap="none" lIns="52922" tIns="52922" rIns="52922" rtlCol="0" anchor="ctr"/>
+          <a:lstStyle/>
+          <a:p>
+            <a:pPr algn="ctr" defTabSz="672130"/>
+            <a:endParaRPr lang="en-US" sz="1176" dirty="0">
+              <a:solidFill>
+                <a:prstClr val="black"/>
+              </a:solidFill>
+              <a:latin typeface="Simplon BP Regular"/>
+              <a:cs typeface="Simplon BP Regular"/>
+            </a:endParaRPr>
+          </a:p>
+        </p:txBody>
+      </p:sp>
+      <p:sp>
+        <p:nvSpPr>
+          <p:cNvPr id="23" name="Oval 134">
+            <a:extLst>
+              <a:ext uri="{FF2B5EF4-FFF2-40B4-BE49-F238E27FC236}">
+                <a16:creationId xmlns:a16="http://schemas.microsoft.com/office/drawing/2014/main" id="{F42F78D9-B5A8-4A97-8925-8B5904C502F3}"/>
+              </a:ext>
+            </a:extLst>
+          </p:cNvPr>
+          <p:cNvSpPr>
+            <a:spLocks noChangeAspect="1"/>
+          </p:cNvSpPr>
+          <p:nvPr/>
+        </p:nvSpPr>
+        <p:spPr>
+          <a:xfrm>
+            <a:off x="11262832" y="305415"/>
+            <a:ext cx="211404" cy="211689"/>
+          </a:xfrm>
+          <a:prstGeom prst="ellipse">
+            <a:avLst/>
+          </a:prstGeom>
+          <a:solidFill>
+            <a:srgbClr val="1BCF13"/>
+          </a:solidFill>
+          <a:ln w="12700">
+            <a:solidFill>
+              <a:schemeClr val="accent3"/>
+            </a:solidFill>
+          </a:ln>
+        </p:spPr>
+        <p:style>
+          <a:lnRef idx="2">
+            <a:schemeClr val="accent1">
+              <a:shade val="50000"/>
+            </a:schemeClr>
+          </a:lnRef>
+          <a:fillRef idx="1">
+            <a:schemeClr val="accent1"/>
+          </a:fillRef>
+          <a:effectRef idx="0">
+            <a:schemeClr val="accent1"/>
+          </a:effectRef>
+          <a:fontRef idx="minor">
+            <a:schemeClr val="lt1"/>
+          </a:fontRef>
+        </p:style>
+        <p:txBody>
+          <a:bodyPr wrap="none" lIns="52922" tIns="52922" rIns="52922" rtlCol="0" anchor="ctr"/>
+          <a:lstStyle/>
+          <a:p>
+            <a:pPr algn="ctr" defTabSz="672130"/>
+            <a:endParaRPr lang="en-US" sz="1176" dirty="0">
+              <a:solidFill>
+                <a:prstClr val="black"/>
+              </a:solidFill>
+              <a:latin typeface="Simplon BP Regular"/>
+              <a:cs typeface="Simplon BP Regular"/>
+            </a:endParaRPr>
+          </a:p>
+        </p:txBody>
+      </p:sp>
+      <p:sp>
+        <p:nvSpPr>
+          <p:cNvPr id="24" name="Oval 134">
+            <a:extLst>
+              <a:ext uri="{FF2B5EF4-FFF2-40B4-BE49-F238E27FC236}">
+                <a16:creationId xmlns:a16="http://schemas.microsoft.com/office/drawing/2014/main" id="{1EBE2388-56B1-476A-9F0A-E2D66925E9B1}"/>
+              </a:ext>
+            </a:extLst>
+          </p:cNvPr>
+          <p:cNvSpPr>
+            <a:spLocks noChangeAspect="1"/>
+          </p:cNvSpPr>
+          <p:nvPr/>
+        </p:nvSpPr>
+        <p:spPr>
+          <a:xfrm>
+            <a:off x="9275679" y="332030"/>
+            <a:ext cx="211404" cy="211689"/>
+          </a:xfrm>
+          <a:prstGeom prst="ellipse">
+            <a:avLst/>
+          </a:prstGeom>
+          <a:solidFill>
+            <a:srgbClr val="1BCF13"/>
+          </a:solidFill>
+          <a:ln w="12700">
+            <a:solidFill>
+              <a:schemeClr val="accent3"/>
+            </a:solidFill>
+          </a:ln>
+        </p:spPr>
+        <p:style>
+          <a:lnRef idx="2">
+            <a:schemeClr val="accent1">
+              <a:shade val="50000"/>
+            </a:schemeClr>
+          </a:lnRef>
+          <a:fillRef idx="1">
+            <a:schemeClr val="accent1"/>
+          </a:fillRef>
+          <a:effectRef idx="0">
+            <a:schemeClr val="accent1"/>
+          </a:effectRef>
+          <a:fontRef idx="minor">
+            <a:schemeClr val="lt1"/>
+          </a:fontRef>
+        </p:style>
+        <p:txBody>
+          <a:bodyPr wrap="none" lIns="52922" tIns="52922" rIns="52922" rtlCol="0" anchor="ctr"/>
+          <a:lstStyle/>
+          <a:p>
+            <a:pPr algn="ctr" defTabSz="672130"/>
+            <a:endParaRPr lang="en-US" sz="1176" dirty="0">
+              <a:solidFill>
+                <a:prstClr val="black"/>
+              </a:solidFill>
+              <a:latin typeface="Simplon BP Regular"/>
+              <a:cs typeface="Simplon BP Regular"/>
+            </a:endParaRPr>
+          </a:p>
+        </p:txBody>
+      </p:sp>
+    </p:spTree>
+    <p:extLst>
+      <p:ext uri="{BB962C8B-B14F-4D97-AF65-F5344CB8AC3E}">
+        <p14:creationId xmlns:p14="http://schemas.microsoft.com/office/powerpoint/2010/main" val="650426979"/>
       </p:ext>
     </p:extLst>
   </p:cSld>
@@ -33242,6 +36741,15 @@
 </file>
 
 <file path=customXml/item2.xml><?xml version="1.0" encoding="utf-8"?>
+<?mso-contentType ?>
+<FormTemplates xmlns="http://schemas.microsoft.com/sharepoint/v3/contenttype/forms">
+  <Display>DocumentLibraryForm</Display>
+  <Edit>DocumentLibraryForm</Edit>
+  <New>DocumentLibraryForm</New>
+</FormTemplates>
+</file>
+
+<file path=customXml/item3.xml><?xml version="1.0" encoding="utf-8"?>
 <p:properties xmlns:p="http://schemas.microsoft.com/office/2006/metadata/properties" xmlns:xsi="http://www.w3.org/2001/XMLSchema-instance" xmlns:pc="http://schemas.microsoft.com/office/infopath/2007/PartnerControls">
   <documentManagement>
     <Is_Collaboration_Space_Locked xmlns="bbcd8c33-6940-4d4c-a587-bbc736ca1e4d" xsi:nil="true"/>
@@ -33293,15 +36801,6 @@
 </p:properties>
 </file>
 
-<file path=customXml/item3.xml><?xml version="1.0" encoding="utf-8"?>
-<?mso-contentType ?>
-<FormTemplates xmlns="http://schemas.microsoft.com/sharepoint/v3/contenttype/forms">
-  <Display>DocumentLibraryForm</Display>
-  <Edit>DocumentLibraryForm</Edit>
-  <New>DocumentLibraryForm</New>
-</FormTemplates>
-</file>
-
 <file path=customXml/itemProps1.xml><?xml version="1.0" encoding="utf-8"?>
 <ds:datastoreItem xmlns:ds="http://schemas.openxmlformats.org/officeDocument/2006/customXml" ds:itemID="{3BE6CAF6-1F55-4A70-B10C-21633F74987A}">
   <ds:schemaRefs>
@@ -33322,6 +36821,14 @@
 </file>
 
 <file path=customXml/itemProps2.xml><?xml version="1.0" encoding="utf-8"?>
+<ds:datastoreItem xmlns:ds="http://schemas.openxmlformats.org/officeDocument/2006/customXml" ds:itemID="{E2481852-F24E-4532-AF30-C154D705D105}">
+  <ds:schemaRefs>
+    <ds:schemaRef ds:uri="http://schemas.microsoft.com/sharepoint/v3/contenttype/forms"/>
+  </ds:schemaRefs>
+</ds:datastoreItem>
+</file>
+
+<file path=customXml/itemProps3.xml><?xml version="1.0" encoding="utf-8"?>
 <ds:datastoreItem xmlns:ds="http://schemas.openxmlformats.org/officeDocument/2006/customXml" ds:itemID="{4B31267F-D399-4A8A-87F8-B75F56828412}">
   <ds:schemaRefs>
     <ds:schemaRef ds:uri="http://www.w3.org/XML/1998/namespace"/>
@@ -33336,12 +36843,4 @@
     <ds:schemaRef ds:uri="http://purl.org/dc/terms/"/>
   </ds:schemaRefs>
 </ds:datastoreItem>
-</file>
-
-<file path=customXml/itemProps3.xml><?xml version="1.0" encoding="utf-8"?>
-<ds:datastoreItem xmlns:ds="http://schemas.openxmlformats.org/officeDocument/2006/customXml" ds:itemID="{E2481852-F24E-4532-AF30-C154D705D105}">
-  <ds:schemaRefs>
-    <ds:schemaRef ds:uri="http://schemas.microsoft.com/sharepoint/v3/contenttype/forms"/>
-  </ds:schemaRefs>
-</ds:datastoreItem>
 </file>
</xml_diff>

<commit_message>
Atualização diagrama de software
</commit_message>
<xml_diff>
--- a/Documentação/Status_Report/Mod_Status_Report-PI20202.pptx
+++ b/Documentação/Status_Report/Mod_Status_Report-PI20202.pptx
@@ -1218,7 +1218,7 @@
             <a:fld id="{C3CD65D1-5C11-455D-9F9A-0E035F00A0DA}" type="datetimeFigureOut">
               <a:rPr lang="pt-BR" smtClean="0"/>
               <a:pPr/>
-              <a:t>07/04/2021</a:t>
+              <a:t>08/04/2021</a:t>
             </a:fld>
             <a:endParaRPr lang="pt-BR"/>
           </a:p>
@@ -1386,7 +1386,7 @@
             <a:fld id="{A05DA3EF-18EA-43DE-B1BB-402A3C558822}" type="datetimeFigureOut">
               <a:rPr lang="pt-BR" smtClean="0"/>
               <a:pPr/>
-              <a:t>07/04/2021</a:t>
+              <a:t>08/04/2021</a:t>
             </a:fld>
             <a:endParaRPr lang="pt-BR"/>
           </a:p>
@@ -2290,7 +2290,7 @@
     </p:spTree>
     <p:extLst>
       <p:ext uri="{BB962C8B-B14F-4D97-AF65-F5344CB8AC3E}">
-        <p14:creationId xmlns:p14="http://schemas.microsoft.com/office/powerpoint/2010/main" val="3729790817"/>
+        <p14:creationId xmlns:p14="http://schemas.microsoft.com/office/powerpoint/2010/main" val="1699401249"/>
       </p:ext>
     </p:extLst>
   </p:cSld>
@@ -33351,7 +33351,7 @@
         </p:nvSpPr>
         <p:spPr>
           <a:xfrm>
-            <a:off x="469692" y="185232"/>
+            <a:off x="469692" y="182603"/>
             <a:ext cx="12098020" cy="800352"/>
           </a:xfrm>
         </p:spPr>
@@ -34194,8 +34194,159 @@
                 <a:latin typeface="Arial" panose="020B0604020202020204" pitchFamily="34" charset="0"/>
                 <a:cs typeface="Arial" panose="020B0604020202020204" pitchFamily="34" charset="0"/>
               </a:rPr>
-              <a:t>F</a:t>
+              <a:t>Finalizamos a conexão com o SQL</a:t>
             </a:r>
+          </a:p>
+          <a:p>
+            <a:pPr marL="252049" indent="-252049" fontAlgn="base">
+              <a:spcBef>
+                <a:spcPct val="0"/>
+              </a:spcBef>
+              <a:buFont typeface="Wingdings" panose="05000000000000000000" pitchFamily="2" charset="2"/>
+              <a:buChar char="ü"/>
+              <a:defRPr/>
+            </a:pPr>
+            <a:r>
+              <a:rPr lang="pt-BR" sz="1600" b="1" dirty="0">
+                <a:solidFill>
+                  <a:schemeClr val="tx1"/>
+                </a:solidFill>
+                <a:latin typeface="Arial" panose="020B0604020202020204" pitchFamily="34" charset="0"/>
+                <a:cs typeface="Arial" panose="020B0604020202020204" pitchFamily="34" charset="0"/>
+              </a:rPr>
+              <a:t>Finalizamos a arquitetura inicial da API</a:t>
+            </a:r>
+          </a:p>
+          <a:p>
+            <a:pPr marL="252049" indent="-252049" fontAlgn="base">
+              <a:spcBef>
+                <a:spcPct val="0"/>
+              </a:spcBef>
+              <a:buFont typeface="Wingdings" panose="05000000000000000000" pitchFamily="2" charset="2"/>
+              <a:buChar char="ü"/>
+              <a:defRPr/>
+            </a:pPr>
+            <a:r>
+              <a:rPr lang="pt-BR" sz="1600" b="1" dirty="0">
+                <a:solidFill>
+                  <a:schemeClr val="tx1"/>
+                </a:solidFill>
+                <a:latin typeface="Arial" panose="020B0604020202020204" pitchFamily="34" charset="0"/>
+                <a:cs typeface="Arial" panose="020B0604020202020204" pitchFamily="34" charset="0"/>
+              </a:rPr>
+              <a:t>Finalizamos o Diagrama Macro de Solução de Software - Container</a:t>
+            </a:r>
+          </a:p>
+          <a:p>
+            <a:pPr marL="252049" indent="-252049" fontAlgn="base">
+              <a:spcBef>
+                <a:spcPct val="0"/>
+              </a:spcBef>
+              <a:buFont typeface="Wingdings" panose="05000000000000000000" pitchFamily="2" charset="2"/>
+              <a:buChar char="ü"/>
+              <a:defRPr/>
+            </a:pPr>
+            <a:r>
+              <a:rPr lang="pt-BR" sz="1600" b="1" dirty="0">
+                <a:solidFill>
+                  <a:schemeClr val="tx1"/>
+                </a:solidFill>
+                <a:latin typeface="Arial" panose="020B0604020202020204" pitchFamily="34" charset="0"/>
+                <a:cs typeface="Arial" panose="020B0604020202020204" pitchFamily="34" charset="0"/>
+              </a:rPr>
+              <a:t>Finalizamos a tela de feed do sistema </a:t>
+            </a:r>
+          </a:p>
+          <a:p>
+            <a:pPr marL="252049" indent="-252049" fontAlgn="base">
+              <a:spcBef>
+                <a:spcPct val="0"/>
+              </a:spcBef>
+              <a:buFont typeface="Wingdings" panose="05000000000000000000" pitchFamily="2" charset="2"/>
+              <a:buChar char="ü"/>
+              <a:defRPr/>
+            </a:pPr>
+            <a:r>
+              <a:rPr lang="pt-BR" sz="1600" b="1" dirty="0">
+                <a:solidFill>
+                  <a:schemeClr val="tx1"/>
+                </a:solidFill>
+                <a:latin typeface="Arial" panose="020B0604020202020204" pitchFamily="34" charset="0"/>
+                <a:cs typeface="Arial" panose="020B0604020202020204" pitchFamily="34" charset="0"/>
+              </a:rPr>
+              <a:t>Colocamos a tela de login e cadastro em </a:t>
+            </a:r>
+            <a:r>
+              <a:rPr lang="pt-BR" sz="1600" b="1" dirty="0" err="1">
+                <a:solidFill>
+                  <a:schemeClr val="tx1"/>
+                </a:solidFill>
+                <a:latin typeface="Arial" panose="020B0604020202020204" pitchFamily="34" charset="0"/>
+                <a:cs typeface="Arial" panose="020B0604020202020204" pitchFamily="34" charset="0"/>
+              </a:rPr>
+              <a:t>React</a:t>
+            </a:r>
+            <a:endParaRPr lang="pt-BR" sz="1600" b="1" dirty="0">
+              <a:solidFill>
+                <a:schemeClr val="tx1"/>
+              </a:solidFill>
+              <a:latin typeface="Arial" panose="020B0604020202020204" pitchFamily="34" charset="0"/>
+              <a:cs typeface="Arial" panose="020B0604020202020204" pitchFamily="34" charset="0"/>
+            </a:endParaRPr>
+          </a:p>
+          <a:p>
+            <a:pPr marL="252049" indent="-252049" fontAlgn="base">
+              <a:spcBef>
+                <a:spcPct val="0"/>
+              </a:spcBef>
+              <a:buFont typeface="Wingdings" panose="05000000000000000000" pitchFamily="2" charset="2"/>
+              <a:buChar char="ü"/>
+              <a:defRPr/>
+            </a:pPr>
+            <a:r>
+              <a:rPr lang="pt-BR" sz="1600" b="1" dirty="0">
+                <a:solidFill>
+                  <a:schemeClr val="tx1"/>
+                </a:solidFill>
+                <a:latin typeface="Arial" panose="020B0604020202020204" pitchFamily="34" charset="0"/>
+                <a:cs typeface="Arial" panose="020B0604020202020204" pitchFamily="34" charset="0"/>
+              </a:rPr>
+              <a:t>Atualizamos o Diagrama de Classe</a:t>
+            </a:r>
+          </a:p>
+          <a:p>
+            <a:pPr marL="252049" indent="-252049" fontAlgn="base">
+              <a:spcBef>
+                <a:spcPct val="0"/>
+              </a:spcBef>
+              <a:buFont typeface="Wingdings" panose="05000000000000000000" pitchFamily="2" charset="2"/>
+              <a:buChar char="ü"/>
+              <a:defRPr/>
+            </a:pPr>
+            <a:endParaRPr lang="pt-BR" sz="1600" b="1" dirty="0">
+              <a:solidFill>
+                <a:schemeClr val="tx1"/>
+              </a:solidFill>
+              <a:latin typeface="Arial" panose="020B0604020202020204" pitchFamily="34" charset="0"/>
+              <a:cs typeface="Arial" panose="020B0604020202020204" pitchFamily="34" charset="0"/>
+            </a:endParaRPr>
+          </a:p>
+          <a:p>
+            <a:pPr marL="252049" indent="-252049" fontAlgn="base">
+              <a:spcBef>
+                <a:spcPct val="0"/>
+              </a:spcBef>
+              <a:buFont typeface="Wingdings" panose="05000000000000000000" pitchFamily="2" charset="2"/>
+              <a:buChar char="ü"/>
+              <a:defRPr/>
+            </a:pPr>
+            <a:endParaRPr lang="pt-BR" sz="1600" b="1" dirty="0">
+              <a:solidFill>
+                <a:schemeClr val="tx1"/>
+              </a:solidFill>
+              <a:latin typeface="Arial" panose="020B0604020202020204" pitchFamily="34" charset="0"/>
+              <a:cs typeface="Arial" panose="020B0604020202020204" pitchFamily="34" charset="0"/>
+            </a:endParaRPr>
           </a:p>
           <a:p>
             <a:pPr marL="0" lvl="1" defTabSz="672130"/>
@@ -34226,7 +34377,7 @@
         <p:spPr>
           <a:xfrm>
             <a:off x="463325" y="5216027"/>
-            <a:ext cx="11854636" cy="2226277"/>
+            <a:ext cx="11854636" cy="2345236"/>
           </a:xfrm>
           <a:prstGeom prst="rect">
             <a:avLst/>
@@ -34300,7 +34451,59 @@
                 <a:latin typeface="Arial" panose="020B0604020202020204" pitchFamily="34" charset="0"/>
                 <a:cs typeface="Arial" panose="020B0604020202020204" pitchFamily="34" charset="0"/>
               </a:rPr>
-              <a:t>A</a:t>
+              <a:t>Login/</a:t>
+            </a:r>
+            <a:r>
+              <a:rPr lang="pt-BR" sz="1400" b="1" dirty="0" err="1">
+                <a:solidFill>
+                  <a:schemeClr val="tx1"/>
+                </a:solidFill>
+                <a:latin typeface="Arial" panose="020B0604020202020204" pitchFamily="34" charset="0"/>
+                <a:cs typeface="Arial" panose="020B0604020202020204" pitchFamily="34" charset="0"/>
+              </a:rPr>
+              <a:t>LogOff</a:t>
+            </a:r>
+            <a:r>
+              <a:rPr lang="pt-BR" sz="1400" b="1" dirty="0">
+                <a:solidFill>
+                  <a:schemeClr val="tx1"/>
+                </a:solidFill>
+                <a:latin typeface="Arial" panose="020B0604020202020204" pitchFamily="34" charset="0"/>
+                <a:cs typeface="Arial" panose="020B0604020202020204" pitchFamily="34" charset="0"/>
+              </a:rPr>
+              <a:t> ORM</a:t>
+            </a:r>
+          </a:p>
+          <a:p>
+            <a:pPr marL="285750" lvl="1" indent="-285750" defTabSz="672130">
+              <a:buFont typeface="Wingdings" panose="05000000000000000000" pitchFamily="2" charset="2"/>
+              <a:buChar char="§"/>
+            </a:pPr>
+            <a:r>
+              <a:rPr lang="pt-BR" sz="1400" b="1" dirty="0">
+                <a:solidFill>
+                  <a:schemeClr val="tx1"/>
+                </a:solidFill>
+                <a:latin typeface="Arial" panose="020B0604020202020204" pitchFamily="34" charset="0"/>
+                <a:cs typeface="Arial" panose="020B0604020202020204" pitchFamily="34" charset="0"/>
+              </a:rPr>
+              <a:t>Iniciar os CRUDS</a:t>
+            </a:r>
+          </a:p>
+          <a:p>
+            <a:pPr marL="285750" lvl="1" indent="-285750" defTabSz="672130">
+              <a:buFont typeface="Wingdings" panose="05000000000000000000" pitchFamily="2" charset="2"/>
+              <a:buChar char="§"/>
+            </a:pPr>
+            <a:r>
+              <a:rPr lang="pt-BR" sz="1400" b="1" dirty="0">
+                <a:solidFill>
+                  <a:schemeClr val="tx1"/>
+                </a:solidFill>
+                <a:latin typeface="Arial" panose="020B0604020202020204" pitchFamily="34" charset="0"/>
+                <a:cs typeface="Arial" panose="020B0604020202020204" pitchFamily="34" charset="0"/>
+              </a:rPr>
+              <a:t>Iniciar exportação do CSV</a:t>
             </a:r>
           </a:p>
           <a:p>
@@ -34346,7 +34549,7 @@
                 <a:latin typeface="Arial" panose="020B0604020202020204" pitchFamily="34" charset="0"/>
                 <a:cs typeface="Arial" panose="020B0604020202020204" pitchFamily="34" charset="0"/>
               </a:rPr>
-              <a:t>F</a:t>
+              <a:t>Finalizar 3 telas finais do sistema</a:t>
             </a:r>
           </a:p>
           <a:p>
@@ -34385,8 +34588,18 @@
                 <a:latin typeface="Arial" panose="020B0604020202020204" pitchFamily="34" charset="0"/>
                 <a:cs typeface="Arial" panose="020B0604020202020204" pitchFamily="34" charset="0"/>
               </a:rPr>
-              <a:t>D</a:t>
+              <a:t>Diagrama de solução de software – Componentes Micro</a:t>
             </a:r>
+          </a:p>
+          <a:p>
+            <a:pPr marL="0" lvl="1" defTabSz="672130"/>
+            <a:endParaRPr lang="pt-BR" sz="1400" b="1" dirty="0">
+              <a:solidFill>
+                <a:schemeClr val="tx1"/>
+              </a:solidFill>
+              <a:latin typeface="Arial" panose="020B0604020202020204" pitchFamily="34" charset="0"/>
+              <a:cs typeface="Arial" panose="020B0604020202020204" pitchFamily="34" charset="0"/>
+            </a:endParaRPr>
           </a:p>
         </p:txBody>
       </p:sp>
@@ -34855,7 +35068,7 @@
     </p:spTree>
     <p:extLst>
       <p:ext uri="{BB962C8B-B14F-4D97-AF65-F5344CB8AC3E}">
-        <p14:creationId xmlns:p14="http://schemas.microsoft.com/office/powerpoint/2010/main" val="650426979"/>
+        <p14:creationId xmlns:p14="http://schemas.microsoft.com/office/powerpoint/2010/main" val="1523586749"/>
       </p:ext>
     </p:extLst>
   </p:cSld>
@@ -36324,6 +36537,67 @@
 </file>
 
 <file path=customXml/item1.xml><?xml version="1.0" encoding="utf-8"?>
+<p:properties xmlns:p="http://schemas.microsoft.com/office/2006/metadata/properties" xmlns:xsi="http://www.w3.org/2001/XMLSchema-instance" xmlns:pc="http://schemas.microsoft.com/office/infopath/2007/PartnerControls">
+  <documentManagement>
+    <Is_Collaboration_Space_Locked xmlns="bbcd8c33-6940-4d4c-a587-bbc736ca1e4d" xsi:nil="true"/>
+    <TeamsChannelId xmlns="bbcd8c33-6940-4d4c-a587-bbc736ca1e4d" xsi:nil="true"/>
+    <Self_Registration_Enabled xmlns="bbcd8c33-6940-4d4c-a587-bbc736ca1e4d" xsi:nil="true"/>
+    <Math_Settings xmlns="bbcd8c33-6940-4d4c-a587-bbc736ca1e4d" xsi:nil="true"/>
+    <AppVersion xmlns="bbcd8c33-6940-4d4c-a587-bbc736ca1e4d" xsi:nil="true"/>
+    <Invited_Teachers xmlns="bbcd8c33-6940-4d4c-a587-bbc736ca1e4d" xsi:nil="true"/>
+    <LMS_Mappings xmlns="bbcd8c33-6940-4d4c-a587-bbc736ca1e4d" xsi:nil="true"/>
+    <IsNotebookLocked xmlns="bbcd8c33-6940-4d4c-a587-bbc736ca1e4d" xsi:nil="true"/>
+    <NotebookType xmlns="bbcd8c33-6940-4d4c-a587-bbc736ca1e4d" xsi:nil="true"/>
+    <Templates xmlns="bbcd8c33-6940-4d4c-a587-bbc736ca1e4d" xsi:nil="true"/>
+    <Owner xmlns="bbcd8c33-6940-4d4c-a587-bbc736ca1e4d">
+      <UserInfo>
+        <DisplayName/>
+        <AccountId xsi:nil="true"/>
+        <AccountType/>
+      </UserInfo>
+    </Owner>
+    <Teachers xmlns="bbcd8c33-6940-4d4c-a587-bbc736ca1e4d">
+      <UserInfo>
+        <DisplayName/>
+        <AccountId xsi:nil="true"/>
+        <AccountType/>
+      </UserInfo>
+    </Teachers>
+    <Students xmlns="bbcd8c33-6940-4d4c-a587-bbc736ca1e4d">
+      <UserInfo>
+        <DisplayName/>
+        <AccountId xsi:nil="true"/>
+        <AccountType/>
+      </UserInfo>
+    </Students>
+    <Student_Groups xmlns="bbcd8c33-6940-4d4c-a587-bbc736ca1e4d">
+      <UserInfo>
+        <DisplayName/>
+        <AccountId xsi:nil="true"/>
+        <AccountType/>
+      </UserInfo>
+    </Student_Groups>
+    <Distribution_Groups xmlns="bbcd8c33-6940-4d4c-a587-bbc736ca1e4d" xsi:nil="true"/>
+    <Self_Registration_Enabled0 xmlns="bbcd8c33-6940-4d4c-a587-bbc736ca1e4d" xsi:nil="true"/>
+    <Has_Teacher_Only_SectionGroup xmlns="bbcd8c33-6940-4d4c-a587-bbc736ca1e4d" xsi:nil="true"/>
+    <DefaultSectionNames xmlns="bbcd8c33-6940-4d4c-a587-bbc736ca1e4d" xsi:nil="true"/>
+    <Invited_Students xmlns="bbcd8c33-6940-4d4c-a587-bbc736ca1e4d" xsi:nil="true"/>
+    <FolderType xmlns="bbcd8c33-6940-4d4c-a587-bbc736ca1e4d" xsi:nil="true"/>
+    <CultureName xmlns="bbcd8c33-6940-4d4c-a587-bbc736ca1e4d" xsi:nil="true"/>
+  </documentManagement>
+</p:properties>
+</file>
+
+<file path=customXml/item2.xml><?xml version="1.0" encoding="utf-8"?>
+<?mso-contentType ?>
+<FormTemplates xmlns="http://schemas.microsoft.com/sharepoint/v3/contenttype/forms">
+  <Display>DocumentLibraryForm</Display>
+  <Edit>DocumentLibraryForm</Edit>
+  <New>DocumentLibraryForm</New>
+</FormTemplates>
+</file>
+
+<file path=customXml/item3.xml><?xml version="1.0" encoding="utf-8"?>
 <ct:contentTypeSchema xmlns:ct="http://schemas.microsoft.com/office/2006/metadata/contentType" xmlns:ma="http://schemas.microsoft.com/office/2006/metadata/properties/metaAttributes" ct:_="" ma:_="" ma:contentTypeName="Document" ma:contentTypeID="0x0101001132905C37EA9847A7207C4BBCCCD8F4" ma:contentTypeVersion="34" ma:contentTypeDescription="Create a new document." ma:contentTypeScope="" ma:versionID="2f28daba72ca6e92be87ea70ebe5bb94">
   <xsd:schema xmlns:xsd="http://www.w3.org/2001/XMLSchema" xmlns:xs="http://www.w3.org/2001/XMLSchema" xmlns:p="http://schemas.microsoft.com/office/2006/metadata/properties" xmlns:ns3="4327b14a-fe89-488e-9f6d-9658cacf372b" xmlns:ns4="bbcd8c33-6940-4d4c-a587-bbc736ca1e4d" targetNamespace="http://schemas.microsoft.com/office/2006/metadata/properties" ma:root="true" ma:fieldsID="df18e839ce2650f1975b41376e6cdb6b" ns3:_="" ns4:_="">
     <xsd:import namespace="4327b14a-fe89-488e-9f6d-9658cacf372b"/>
@@ -36740,68 +37014,32 @@
 </ct:contentTypeSchema>
 </file>
 
-<file path=customXml/item2.xml><?xml version="1.0" encoding="utf-8"?>
-<?mso-contentType ?>
-<FormTemplates xmlns="http://schemas.microsoft.com/sharepoint/v3/contenttype/forms">
-  <Display>DocumentLibraryForm</Display>
-  <Edit>DocumentLibraryForm</Edit>
-  <New>DocumentLibraryForm</New>
-</FormTemplates>
+<file path=customXml/itemProps1.xml><?xml version="1.0" encoding="utf-8"?>
+<ds:datastoreItem xmlns:ds="http://schemas.openxmlformats.org/officeDocument/2006/customXml" ds:itemID="{4B31267F-D399-4A8A-87F8-B75F56828412}">
+  <ds:schemaRefs>
+    <ds:schemaRef ds:uri="http://www.w3.org/XML/1998/namespace"/>
+    <ds:schemaRef ds:uri="http://schemas.microsoft.com/office/2006/documentManagement/types"/>
+    <ds:schemaRef ds:uri="bbcd8c33-6940-4d4c-a587-bbc736ca1e4d"/>
+    <ds:schemaRef ds:uri="http://purl.org/dc/elements/1.1/"/>
+    <ds:schemaRef ds:uri="http://purl.org/dc/dcmitype/"/>
+    <ds:schemaRef ds:uri="4327b14a-fe89-488e-9f6d-9658cacf372b"/>
+    <ds:schemaRef ds:uri="http://schemas.microsoft.com/office/infopath/2007/PartnerControls"/>
+    <ds:schemaRef ds:uri="http://schemas.openxmlformats.org/package/2006/metadata/core-properties"/>
+    <ds:schemaRef ds:uri="http://schemas.microsoft.com/office/2006/metadata/properties"/>
+    <ds:schemaRef ds:uri="http://purl.org/dc/terms/"/>
+  </ds:schemaRefs>
+</ds:datastoreItem>
 </file>
 
-<file path=customXml/item3.xml><?xml version="1.0" encoding="utf-8"?>
-<p:properties xmlns:p="http://schemas.microsoft.com/office/2006/metadata/properties" xmlns:xsi="http://www.w3.org/2001/XMLSchema-instance" xmlns:pc="http://schemas.microsoft.com/office/infopath/2007/PartnerControls">
-  <documentManagement>
-    <Is_Collaboration_Space_Locked xmlns="bbcd8c33-6940-4d4c-a587-bbc736ca1e4d" xsi:nil="true"/>
-    <TeamsChannelId xmlns="bbcd8c33-6940-4d4c-a587-bbc736ca1e4d" xsi:nil="true"/>
-    <Self_Registration_Enabled xmlns="bbcd8c33-6940-4d4c-a587-bbc736ca1e4d" xsi:nil="true"/>
-    <Math_Settings xmlns="bbcd8c33-6940-4d4c-a587-bbc736ca1e4d" xsi:nil="true"/>
-    <AppVersion xmlns="bbcd8c33-6940-4d4c-a587-bbc736ca1e4d" xsi:nil="true"/>
-    <Invited_Teachers xmlns="bbcd8c33-6940-4d4c-a587-bbc736ca1e4d" xsi:nil="true"/>
-    <LMS_Mappings xmlns="bbcd8c33-6940-4d4c-a587-bbc736ca1e4d" xsi:nil="true"/>
-    <IsNotebookLocked xmlns="bbcd8c33-6940-4d4c-a587-bbc736ca1e4d" xsi:nil="true"/>
-    <NotebookType xmlns="bbcd8c33-6940-4d4c-a587-bbc736ca1e4d" xsi:nil="true"/>
-    <Templates xmlns="bbcd8c33-6940-4d4c-a587-bbc736ca1e4d" xsi:nil="true"/>
-    <Owner xmlns="bbcd8c33-6940-4d4c-a587-bbc736ca1e4d">
-      <UserInfo>
-        <DisplayName/>
-        <AccountId xsi:nil="true"/>
-        <AccountType/>
-      </UserInfo>
-    </Owner>
-    <Teachers xmlns="bbcd8c33-6940-4d4c-a587-bbc736ca1e4d">
-      <UserInfo>
-        <DisplayName/>
-        <AccountId xsi:nil="true"/>
-        <AccountType/>
-      </UserInfo>
-    </Teachers>
-    <Students xmlns="bbcd8c33-6940-4d4c-a587-bbc736ca1e4d">
-      <UserInfo>
-        <DisplayName/>
-        <AccountId xsi:nil="true"/>
-        <AccountType/>
-      </UserInfo>
-    </Students>
-    <Student_Groups xmlns="bbcd8c33-6940-4d4c-a587-bbc736ca1e4d">
-      <UserInfo>
-        <DisplayName/>
-        <AccountId xsi:nil="true"/>
-        <AccountType/>
-      </UserInfo>
-    </Student_Groups>
-    <Distribution_Groups xmlns="bbcd8c33-6940-4d4c-a587-bbc736ca1e4d" xsi:nil="true"/>
-    <Self_Registration_Enabled0 xmlns="bbcd8c33-6940-4d4c-a587-bbc736ca1e4d" xsi:nil="true"/>
-    <Has_Teacher_Only_SectionGroup xmlns="bbcd8c33-6940-4d4c-a587-bbc736ca1e4d" xsi:nil="true"/>
-    <DefaultSectionNames xmlns="bbcd8c33-6940-4d4c-a587-bbc736ca1e4d" xsi:nil="true"/>
-    <Invited_Students xmlns="bbcd8c33-6940-4d4c-a587-bbc736ca1e4d" xsi:nil="true"/>
-    <FolderType xmlns="bbcd8c33-6940-4d4c-a587-bbc736ca1e4d" xsi:nil="true"/>
-    <CultureName xmlns="bbcd8c33-6940-4d4c-a587-bbc736ca1e4d" xsi:nil="true"/>
-  </documentManagement>
-</p:properties>
+<file path=customXml/itemProps2.xml><?xml version="1.0" encoding="utf-8"?>
+<ds:datastoreItem xmlns:ds="http://schemas.openxmlformats.org/officeDocument/2006/customXml" ds:itemID="{E2481852-F24E-4532-AF30-C154D705D105}">
+  <ds:schemaRefs>
+    <ds:schemaRef ds:uri="http://schemas.microsoft.com/sharepoint/v3/contenttype/forms"/>
+  </ds:schemaRefs>
+</ds:datastoreItem>
 </file>
 
-<file path=customXml/itemProps1.xml><?xml version="1.0" encoding="utf-8"?>
+<file path=customXml/itemProps3.xml><?xml version="1.0" encoding="utf-8"?>
 <ds:datastoreItem xmlns:ds="http://schemas.openxmlformats.org/officeDocument/2006/customXml" ds:itemID="{3BE6CAF6-1F55-4A70-B10C-21633F74987A}">
   <ds:schemaRefs>
     <ds:schemaRef ds:uri="http://schemas.microsoft.com/office/2006/metadata/contentType"/>
@@ -36818,29 +37056,4 @@
     <ds:schemaRef ds:uri="http://schemas.microsoft.com/internal/obd"/>
   </ds:schemaRefs>
 </ds:datastoreItem>
-</file>
-
-<file path=customXml/itemProps2.xml><?xml version="1.0" encoding="utf-8"?>
-<ds:datastoreItem xmlns:ds="http://schemas.openxmlformats.org/officeDocument/2006/customXml" ds:itemID="{E2481852-F24E-4532-AF30-C154D705D105}">
-  <ds:schemaRefs>
-    <ds:schemaRef ds:uri="http://schemas.microsoft.com/sharepoint/v3/contenttype/forms"/>
-  </ds:schemaRefs>
-</ds:datastoreItem>
-</file>
-
-<file path=customXml/itemProps3.xml><?xml version="1.0" encoding="utf-8"?>
-<ds:datastoreItem xmlns:ds="http://schemas.openxmlformats.org/officeDocument/2006/customXml" ds:itemID="{4B31267F-D399-4A8A-87F8-B75F56828412}">
-  <ds:schemaRefs>
-    <ds:schemaRef ds:uri="http://www.w3.org/XML/1998/namespace"/>
-    <ds:schemaRef ds:uri="http://schemas.microsoft.com/office/2006/documentManagement/types"/>
-    <ds:schemaRef ds:uri="bbcd8c33-6940-4d4c-a587-bbc736ca1e4d"/>
-    <ds:schemaRef ds:uri="http://purl.org/dc/elements/1.1/"/>
-    <ds:schemaRef ds:uri="http://purl.org/dc/dcmitype/"/>
-    <ds:schemaRef ds:uri="4327b14a-fe89-488e-9f6d-9658cacf372b"/>
-    <ds:schemaRef ds:uri="http://schemas.microsoft.com/office/infopath/2007/PartnerControls"/>
-    <ds:schemaRef ds:uri="http://schemas.openxmlformats.org/package/2006/metadata/core-properties"/>
-    <ds:schemaRef ds:uri="http://schemas.microsoft.com/office/2006/metadata/properties"/>
-    <ds:schemaRef ds:uri="http://purl.org/dc/terms/"/>
-  </ds:schemaRefs>
-</ds:datastoreItem>
 </file>
</xml_diff>